<commit_message>
minor cganges in presentation
</commit_message>
<xml_diff>
--- a/materials/presentation/presentation.pptx
+++ b/materials/presentation/presentation.pptx
@@ -7885,8 +7885,8 @@
         </p:blipFill>
         <p:spPr>
           <a:xfrm>
-            <a:off x="2286000" y="1270850"/>
-            <a:ext cx="4572000" cy="3429000"/>
+            <a:off x="2286000" y="1924175"/>
+            <a:ext cx="4572000" cy="2296425"/>
           </a:xfrm>
           <a:prstGeom prst="rect">
             <a:avLst/>
@@ -7989,6 +7989,285 @@
 </file>
 
 <file path=ppt/theme/theme1.xml><?xml version="1.0" encoding="utf-8"?>
+<a:theme xmlns:a="http://schemas.openxmlformats.org/drawingml/2006/main" xmlns:r="http://schemas.openxmlformats.org/officeDocument/2006/relationships" name="Material">
+  <a:themeElements>
+    <a:clrScheme name="Material">
+      <a:dk1>
+        <a:srgbClr val="4285F4"/>
+      </a:dk1>
+      <a:lt1>
+        <a:srgbClr val="FFFFFF"/>
+      </a:lt1>
+      <a:dk2>
+        <a:srgbClr val="424242"/>
+      </a:dk2>
+      <a:lt2>
+        <a:srgbClr val="737373"/>
+      </a:lt2>
+      <a:accent1>
+        <a:srgbClr val="0277BD"/>
+      </a:accent1>
+      <a:accent2>
+        <a:srgbClr val="0F9D58"/>
+      </a:accent2>
+      <a:accent3>
+        <a:srgbClr val="DB4437"/>
+      </a:accent3>
+      <a:accent4>
+        <a:srgbClr val="FAFAFA"/>
+      </a:accent4>
+      <a:accent5>
+        <a:srgbClr val="1A237E"/>
+      </a:accent5>
+      <a:accent6>
+        <a:srgbClr val="F4B400"/>
+      </a:accent6>
+      <a:hlink>
+        <a:srgbClr val="1A237E"/>
+      </a:hlink>
+      <a:folHlink>
+        <a:srgbClr val="1A237E"/>
+      </a:folHlink>
+    </a:clrScheme>
+    <a:fontScheme name="Office">
+      <a:majorFont>
+        <a:latin typeface="Arial"/>
+        <a:ea typeface=""/>
+        <a:cs typeface=""/>
+        <a:font script="Jpan" typeface="ＭＳ Ｐゴシック"/>
+        <a:font script="Hang" typeface="맑은 고딕"/>
+        <a:font script="Hans" typeface="宋体"/>
+        <a:font script="Hant" typeface="新細明體"/>
+        <a:font script="Arab" typeface="Times New Roman"/>
+        <a:font script="Hebr" typeface="Times New Roman"/>
+        <a:font script="Thai" typeface="Angsana New"/>
+        <a:font script="Ethi" typeface="Nyala"/>
+        <a:font script="Beng" typeface="Vrinda"/>
+        <a:font script="Gujr" typeface="Shruti"/>
+        <a:font script="Khmr" typeface="MoolBoran"/>
+        <a:font script="Knda" typeface="Tunga"/>
+        <a:font script="Guru" typeface="Raavi"/>
+        <a:font script="Cans" typeface="Euphemia"/>
+        <a:font script="Cher" typeface="Plantagenet Cherokee"/>
+        <a:font script="Yiii" typeface="Microsoft Yi Baiti"/>
+        <a:font script="Tibt" typeface="Microsoft Himalaya"/>
+        <a:font script="Thaa" typeface="MV Boli"/>
+        <a:font script="Deva" typeface="Mangal"/>
+        <a:font script="Telu" typeface="Gautami"/>
+        <a:font script="Taml" typeface="Latha"/>
+        <a:font script="Syrc" typeface="Estrangelo Edessa"/>
+        <a:font script="Orya" typeface="Kalinga"/>
+        <a:font script="Mlym" typeface="Kartika"/>
+        <a:font script="Laoo" typeface="DokChampa"/>
+        <a:font script="Sinh" typeface="Iskoola Pota"/>
+        <a:font script="Mong" typeface="Mongolian Baiti"/>
+        <a:font script="Viet" typeface="Times New Roman"/>
+        <a:font script="Uigh" typeface="Microsoft Uighur"/>
+        <a:font script="Geor" typeface="Sylfaen"/>
+      </a:majorFont>
+      <a:minorFont>
+        <a:latin typeface="Arial"/>
+        <a:ea typeface=""/>
+        <a:cs typeface=""/>
+        <a:font script="Jpan" typeface="ＭＳ Ｐゴシック"/>
+        <a:font script="Hang" typeface="맑은 고딕"/>
+        <a:font script="Hans" typeface="宋体"/>
+        <a:font script="Hant" typeface="新細明體"/>
+        <a:font script="Arab" typeface="Arial"/>
+        <a:font script="Hebr" typeface="Arial"/>
+        <a:font script="Thai" typeface="Cordia New"/>
+        <a:font script="Ethi" typeface="Nyala"/>
+        <a:font script="Beng" typeface="Vrinda"/>
+        <a:font script="Gujr" typeface="Shruti"/>
+        <a:font script="Khmr" typeface="DaunPenh"/>
+        <a:font script="Knda" typeface="Tunga"/>
+        <a:font script="Guru" typeface="Raavi"/>
+        <a:font script="Cans" typeface="Euphemia"/>
+        <a:font script="Cher" typeface="Plantagenet Cherokee"/>
+        <a:font script="Yiii" typeface="Microsoft Yi Baiti"/>
+        <a:font script="Tibt" typeface="Microsoft Himalaya"/>
+        <a:font script="Thaa" typeface="MV Boli"/>
+        <a:font script="Deva" typeface="Mangal"/>
+        <a:font script="Telu" typeface="Gautami"/>
+        <a:font script="Taml" typeface="Latha"/>
+        <a:font script="Syrc" typeface="Estrangelo Edessa"/>
+        <a:font script="Orya" typeface="Kalinga"/>
+        <a:font script="Mlym" typeface="Kartika"/>
+        <a:font script="Laoo" typeface="DokChampa"/>
+        <a:font script="Sinh" typeface="Iskoola Pota"/>
+        <a:font script="Mong" typeface="Mongolian Baiti"/>
+        <a:font script="Viet" typeface="Arial"/>
+        <a:font script="Uigh" typeface="Microsoft Uighur"/>
+        <a:font script="Geor" typeface="Sylfaen"/>
+      </a:minorFont>
+    </a:fontScheme>
+    <a:fmtScheme name="Office">
+      <a:fillStyleLst>
+        <a:solidFill>
+          <a:schemeClr val="phClr"/>
+        </a:solidFill>
+        <a:gradFill rotWithShape="1">
+          <a:gsLst>
+            <a:gs pos="0">
+              <a:schemeClr val="phClr">
+                <a:tint val="50000"/>
+                <a:satMod val="300000"/>
+              </a:schemeClr>
+            </a:gs>
+            <a:gs pos="35000">
+              <a:schemeClr val="phClr">
+                <a:tint val="37000"/>
+                <a:satMod val="300000"/>
+              </a:schemeClr>
+            </a:gs>
+            <a:gs pos="100000">
+              <a:schemeClr val="phClr">
+                <a:tint val="15000"/>
+                <a:satMod val="350000"/>
+              </a:schemeClr>
+            </a:gs>
+          </a:gsLst>
+          <a:lin ang="16200000" scaled="1"/>
+        </a:gradFill>
+        <a:gradFill rotWithShape="1">
+          <a:gsLst>
+            <a:gs pos="0">
+              <a:schemeClr val="phClr">
+                <a:tint val="100000"/>
+                <a:shade val="100000"/>
+                <a:satMod val="130000"/>
+              </a:schemeClr>
+            </a:gs>
+            <a:gs pos="100000">
+              <a:schemeClr val="phClr">
+                <a:tint val="50000"/>
+                <a:shade val="100000"/>
+                <a:satMod val="350000"/>
+              </a:schemeClr>
+            </a:gs>
+          </a:gsLst>
+          <a:lin ang="16200000" scaled="0"/>
+        </a:gradFill>
+      </a:fillStyleLst>
+      <a:lnStyleLst>
+        <a:ln w="9525" cap="flat" cmpd="sng" algn="ctr">
+          <a:solidFill>
+            <a:schemeClr val="phClr">
+              <a:shade val="95000"/>
+              <a:satMod val="105000"/>
+            </a:schemeClr>
+          </a:solidFill>
+          <a:prstDash val="solid"/>
+        </a:ln>
+        <a:ln w="25400" cap="flat" cmpd="sng" algn="ctr">
+          <a:solidFill>
+            <a:schemeClr val="phClr"/>
+          </a:solidFill>
+          <a:prstDash val="solid"/>
+        </a:ln>
+        <a:ln w="38100" cap="flat" cmpd="sng" algn="ctr">
+          <a:solidFill>
+            <a:schemeClr val="phClr"/>
+          </a:solidFill>
+          <a:prstDash val="solid"/>
+        </a:ln>
+      </a:lnStyleLst>
+      <a:effectStyleLst>
+        <a:effectStyle>
+          <a:effectLst>
+            <a:outerShdw blurRad="40000" dist="20000" dir="5400000" rotWithShape="0">
+              <a:srgbClr val="000000">
+                <a:alpha val="38000"/>
+              </a:srgbClr>
+            </a:outerShdw>
+          </a:effectLst>
+        </a:effectStyle>
+        <a:effectStyle>
+          <a:effectLst>
+            <a:outerShdw blurRad="40000" dist="23000" dir="5400000" rotWithShape="0">
+              <a:srgbClr val="000000">
+                <a:alpha val="35000"/>
+              </a:srgbClr>
+            </a:outerShdw>
+          </a:effectLst>
+        </a:effectStyle>
+        <a:effectStyle>
+          <a:effectLst>
+            <a:outerShdw blurRad="40000" dist="23000" dir="5400000" rotWithShape="0">
+              <a:srgbClr val="000000">
+                <a:alpha val="35000"/>
+              </a:srgbClr>
+            </a:outerShdw>
+          </a:effectLst>
+          <a:scene3d>
+            <a:camera prst="orthographicFront">
+              <a:rot lat="0" lon="0" rev="0"/>
+            </a:camera>
+            <a:lightRig rig="threePt" dir="t">
+              <a:rot lat="0" lon="0" rev="1200000"/>
+            </a:lightRig>
+          </a:scene3d>
+          <a:sp3d>
+            <a:bevelT w="63500" h="25400"/>
+          </a:sp3d>
+        </a:effectStyle>
+      </a:effectStyleLst>
+      <a:bgFillStyleLst>
+        <a:solidFill>
+          <a:schemeClr val="phClr"/>
+        </a:solidFill>
+        <a:gradFill rotWithShape="1">
+          <a:gsLst>
+            <a:gs pos="0">
+              <a:schemeClr val="phClr">
+                <a:tint val="40000"/>
+                <a:satMod val="350000"/>
+              </a:schemeClr>
+            </a:gs>
+            <a:gs pos="40000">
+              <a:schemeClr val="phClr">
+                <a:tint val="45000"/>
+                <a:shade val="99000"/>
+                <a:satMod val="350000"/>
+              </a:schemeClr>
+            </a:gs>
+            <a:gs pos="100000">
+              <a:schemeClr val="phClr">
+                <a:shade val="20000"/>
+                <a:satMod val="255000"/>
+              </a:schemeClr>
+            </a:gs>
+          </a:gsLst>
+          <a:path path="circle">
+            <a:fillToRect l="50000" t="-80000" r="50000" b="180000"/>
+          </a:path>
+        </a:gradFill>
+        <a:gradFill rotWithShape="1">
+          <a:gsLst>
+            <a:gs pos="0">
+              <a:schemeClr val="phClr">
+                <a:tint val="80000"/>
+                <a:satMod val="300000"/>
+              </a:schemeClr>
+            </a:gs>
+            <a:gs pos="100000">
+              <a:schemeClr val="phClr">
+                <a:shade val="30000"/>
+                <a:satMod val="200000"/>
+              </a:schemeClr>
+            </a:gs>
+          </a:gsLst>
+          <a:path path="circle">
+            <a:fillToRect l="50000" t="50000" r="50000" b="50000"/>
+          </a:path>
+        </a:gradFill>
+      </a:bgFillStyleLst>
+    </a:fmtScheme>
+  </a:themeElements>
+</a:theme>
+</file>
+
+<file path=ppt/theme/theme2.xml><?xml version="1.0" encoding="utf-8"?>
 <a:theme xmlns:a="http://schemas.openxmlformats.org/drawingml/2006/main" xmlns:r="http://schemas.openxmlformats.org/officeDocument/2006/relationships">
   <a:themeElements>
     <a:clrScheme name="Default">
@@ -8265,283 +8544,4 @@
     </a:fmtScheme>
   </a:themeElements>
 </a:theme>
-</file>
-
-<file path=ppt/theme/theme2.xml><?xml version="1.0" encoding="utf-8"?>
-<a:theme xmlns:a="http://schemas.openxmlformats.org/drawingml/2006/main" xmlns:r="http://schemas.openxmlformats.org/officeDocument/2006/relationships" name="Material">
-  <a:themeElements>
-    <a:clrScheme name="Material">
-      <a:dk1>
-        <a:srgbClr val="4285F4"/>
-      </a:dk1>
-      <a:lt1>
-        <a:srgbClr val="FFFFFF"/>
-      </a:lt1>
-      <a:dk2>
-        <a:srgbClr val="424242"/>
-      </a:dk2>
-      <a:lt2>
-        <a:srgbClr val="737373"/>
-      </a:lt2>
-      <a:accent1>
-        <a:srgbClr val="0277BD"/>
-      </a:accent1>
-      <a:accent2>
-        <a:srgbClr val="0F9D58"/>
-      </a:accent2>
-      <a:accent3>
-        <a:srgbClr val="DB4437"/>
-      </a:accent3>
-      <a:accent4>
-        <a:srgbClr val="FAFAFA"/>
-      </a:accent4>
-      <a:accent5>
-        <a:srgbClr val="1A237E"/>
-      </a:accent5>
-      <a:accent6>
-        <a:srgbClr val="F4B400"/>
-      </a:accent6>
-      <a:hlink>
-        <a:srgbClr val="1A237E"/>
-      </a:hlink>
-      <a:folHlink>
-        <a:srgbClr val="1A237E"/>
-      </a:folHlink>
-    </a:clrScheme>
-    <a:fontScheme name="Office">
-      <a:majorFont>
-        <a:latin typeface="Arial"/>
-        <a:ea typeface=""/>
-        <a:cs typeface=""/>
-        <a:font script="Jpan" typeface="ＭＳ Ｐゴシック"/>
-        <a:font script="Hang" typeface="맑은 고딕"/>
-        <a:font script="Hans" typeface="宋体"/>
-        <a:font script="Hant" typeface="新細明體"/>
-        <a:font script="Arab" typeface="Times New Roman"/>
-        <a:font script="Hebr" typeface="Times New Roman"/>
-        <a:font script="Thai" typeface="Angsana New"/>
-        <a:font script="Ethi" typeface="Nyala"/>
-        <a:font script="Beng" typeface="Vrinda"/>
-        <a:font script="Gujr" typeface="Shruti"/>
-        <a:font script="Khmr" typeface="MoolBoran"/>
-        <a:font script="Knda" typeface="Tunga"/>
-        <a:font script="Guru" typeface="Raavi"/>
-        <a:font script="Cans" typeface="Euphemia"/>
-        <a:font script="Cher" typeface="Plantagenet Cherokee"/>
-        <a:font script="Yiii" typeface="Microsoft Yi Baiti"/>
-        <a:font script="Tibt" typeface="Microsoft Himalaya"/>
-        <a:font script="Thaa" typeface="MV Boli"/>
-        <a:font script="Deva" typeface="Mangal"/>
-        <a:font script="Telu" typeface="Gautami"/>
-        <a:font script="Taml" typeface="Latha"/>
-        <a:font script="Syrc" typeface="Estrangelo Edessa"/>
-        <a:font script="Orya" typeface="Kalinga"/>
-        <a:font script="Mlym" typeface="Kartika"/>
-        <a:font script="Laoo" typeface="DokChampa"/>
-        <a:font script="Sinh" typeface="Iskoola Pota"/>
-        <a:font script="Mong" typeface="Mongolian Baiti"/>
-        <a:font script="Viet" typeface="Times New Roman"/>
-        <a:font script="Uigh" typeface="Microsoft Uighur"/>
-        <a:font script="Geor" typeface="Sylfaen"/>
-      </a:majorFont>
-      <a:minorFont>
-        <a:latin typeface="Arial"/>
-        <a:ea typeface=""/>
-        <a:cs typeface=""/>
-        <a:font script="Jpan" typeface="ＭＳ Ｐゴシック"/>
-        <a:font script="Hang" typeface="맑은 고딕"/>
-        <a:font script="Hans" typeface="宋体"/>
-        <a:font script="Hant" typeface="新細明體"/>
-        <a:font script="Arab" typeface="Arial"/>
-        <a:font script="Hebr" typeface="Arial"/>
-        <a:font script="Thai" typeface="Cordia New"/>
-        <a:font script="Ethi" typeface="Nyala"/>
-        <a:font script="Beng" typeface="Vrinda"/>
-        <a:font script="Gujr" typeface="Shruti"/>
-        <a:font script="Khmr" typeface="DaunPenh"/>
-        <a:font script="Knda" typeface="Tunga"/>
-        <a:font script="Guru" typeface="Raavi"/>
-        <a:font script="Cans" typeface="Euphemia"/>
-        <a:font script="Cher" typeface="Plantagenet Cherokee"/>
-        <a:font script="Yiii" typeface="Microsoft Yi Baiti"/>
-        <a:font script="Tibt" typeface="Microsoft Himalaya"/>
-        <a:font script="Thaa" typeface="MV Boli"/>
-        <a:font script="Deva" typeface="Mangal"/>
-        <a:font script="Telu" typeface="Gautami"/>
-        <a:font script="Taml" typeface="Latha"/>
-        <a:font script="Syrc" typeface="Estrangelo Edessa"/>
-        <a:font script="Orya" typeface="Kalinga"/>
-        <a:font script="Mlym" typeface="Kartika"/>
-        <a:font script="Laoo" typeface="DokChampa"/>
-        <a:font script="Sinh" typeface="Iskoola Pota"/>
-        <a:font script="Mong" typeface="Mongolian Baiti"/>
-        <a:font script="Viet" typeface="Arial"/>
-        <a:font script="Uigh" typeface="Microsoft Uighur"/>
-        <a:font script="Geor" typeface="Sylfaen"/>
-      </a:minorFont>
-    </a:fontScheme>
-    <a:fmtScheme name="Office">
-      <a:fillStyleLst>
-        <a:solidFill>
-          <a:schemeClr val="phClr"/>
-        </a:solidFill>
-        <a:gradFill rotWithShape="1">
-          <a:gsLst>
-            <a:gs pos="0">
-              <a:schemeClr val="phClr">
-                <a:tint val="50000"/>
-                <a:satMod val="300000"/>
-              </a:schemeClr>
-            </a:gs>
-            <a:gs pos="35000">
-              <a:schemeClr val="phClr">
-                <a:tint val="37000"/>
-                <a:satMod val="300000"/>
-              </a:schemeClr>
-            </a:gs>
-            <a:gs pos="100000">
-              <a:schemeClr val="phClr">
-                <a:tint val="15000"/>
-                <a:satMod val="350000"/>
-              </a:schemeClr>
-            </a:gs>
-          </a:gsLst>
-          <a:lin ang="16200000" scaled="1"/>
-        </a:gradFill>
-        <a:gradFill rotWithShape="1">
-          <a:gsLst>
-            <a:gs pos="0">
-              <a:schemeClr val="phClr">
-                <a:tint val="100000"/>
-                <a:shade val="100000"/>
-                <a:satMod val="130000"/>
-              </a:schemeClr>
-            </a:gs>
-            <a:gs pos="100000">
-              <a:schemeClr val="phClr">
-                <a:tint val="50000"/>
-                <a:shade val="100000"/>
-                <a:satMod val="350000"/>
-              </a:schemeClr>
-            </a:gs>
-          </a:gsLst>
-          <a:lin ang="16200000" scaled="0"/>
-        </a:gradFill>
-      </a:fillStyleLst>
-      <a:lnStyleLst>
-        <a:ln w="9525" cap="flat" cmpd="sng" algn="ctr">
-          <a:solidFill>
-            <a:schemeClr val="phClr">
-              <a:shade val="95000"/>
-              <a:satMod val="105000"/>
-            </a:schemeClr>
-          </a:solidFill>
-          <a:prstDash val="solid"/>
-        </a:ln>
-        <a:ln w="25400" cap="flat" cmpd="sng" algn="ctr">
-          <a:solidFill>
-            <a:schemeClr val="phClr"/>
-          </a:solidFill>
-          <a:prstDash val="solid"/>
-        </a:ln>
-        <a:ln w="38100" cap="flat" cmpd="sng" algn="ctr">
-          <a:solidFill>
-            <a:schemeClr val="phClr"/>
-          </a:solidFill>
-          <a:prstDash val="solid"/>
-        </a:ln>
-      </a:lnStyleLst>
-      <a:effectStyleLst>
-        <a:effectStyle>
-          <a:effectLst>
-            <a:outerShdw blurRad="40000" dist="20000" dir="5400000" rotWithShape="0">
-              <a:srgbClr val="000000">
-                <a:alpha val="38000"/>
-              </a:srgbClr>
-            </a:outerShdw>
-          </a:effectLst>
-        </a:effectStyle>
-        <a:effectStyle>
-          <a:effectLst>
-            <a:outerShdw blurRad="40000" dist="23000" dir="5400000" rotWithShape="0">
-              <a:srgbClr val="000000">
-                <a:alpha val="35000"/>
-              </a:srgbClr>
-            </a:outerShdw>
-          </a:effectLst>
-        </a:effectStyle>
-        <a:effectStyle>
-          <a:effectLst>
-            <a:outerShdw blurRad="40000" dist="23000" dir="5400000" rotWithShape="0">
-              <a:srgbClr val="000000">
-                <a:alpha val="35000"/>
-              </a:srgbClr>
-            </a:outerShdw>
-          </a:effectLst>
-          <a:scene3d>
-            <a:camera prst="orthographicFront">
-              <a:rot lat="0" lon="0" rev="0"/>
-            </a:camera>
-            <a:lightRig rig="threePt" dir="t">
-              <a:rot lat="0" lon="0" rev="1200000"/>
-            </a:lightRig>
-          </a:scene3d>
-          <a:sp3d>
-            <a:bevelT w="63500" h="25400"/>
-          </a:sp3d>
-        </a:effectStyle>
-      </a:effectStyleLst>
-      <a:bgFillStyleLst>
-        <a:solidFill>
-          <a:schemeClr val="phClr"/>
-        </a:solidFill>
-        <a:gradFill rotWithShape="1">
-          <a:gsLst>
-            <a:gs pos="0">
-              <a:schemeClr val="phClr">
-                <a:tint val="40000"/>
-                <a:satMod val="350000"/>
-              </a:schemeClr>
-            </a:gs>
-            <a:gs pos="40000">
-              <a:schemeClr val="phClr">
-                <a:tint val="45000"/>
-                <a:shade val="99000"/>
-                <a:satMod val="350000"/>
-              </a:schemeClr>
-            </a:gs>
-            <a:gs pos="100000">
-              <a:schemeClr val="phClr">
-                <a:shade val="20000"/>
-                <a:satMod val="255000"/>
-              </a:schemeClr>
-            </a:gs>
-          </a:gsLst>
-          <a:path path="circle">
-            <a:fillToRect l="50000" t="-80000" r="50000" b="180000"/>
-          </a:path>
-        </a:gradFill>
-        <a:gradFill rotWithShape="1">
-          <a:gsLst>
-            <a:gs pos="0">
-              <a:schemeClr val="phClr">
-                <a:tint val="80000"/>
-                <a:satMod val="300000"/>
-              </a:schemeClr>
-            </a:gs>
-            <a:gs pos="100000">
-              <a:schemeClr val="phClr">
-                <a:shade val="30000"/>
-                <a:satMod val="200000"/>
-              </a:schemeClr>
-            </a:gs>
-          </a:gsLst>
-          <a:path path="circle">
-            <a:fillToRect l="50000" t="50000" r="50000" b="50000"/>
-          </a:path>
-        </a:gradFill>
-      </a:bgFillStyleLst>
-    </a:fmtScheme>
-  </a:themeElements>
-</a:theme>
 </file>
</xml_diff>

<commit_message>
Api url for all user. Some minor changes for better looking site. Materials for presentation.
</commit_message>
<xml_diff>
--- a/materials/presentation/presentation.pptx
+++ b/materials/presentation/presentation.pptx
@@ -14,16 +14,33 @@
     <p:sldId id="259" r:id="rId9"/>
     <p:sldId id="260" r:id="rId10"/>
     <p:sldId id="261" r:id="rId11"/>
+    <p:sldId id="262" r:id="rId12"/>
+    <p:sldId id="263" r:id="rId13"/>
+    <p:sldId id="264" r:id="rId14"/>
+    <p:sldId id="265" r:id="rId15"/>
+    <p:sldId id="266" r:id="rId16"/>
+    <p:sldId id="267" r:id="rId17"/>
+    <p:sldId id="268" r:id="rId18"/>
+    <p:sldId id="269" r:id="rId19"/>
+    <p:sldId id="270" r:id="rId20"/>
+    <p:sldId id="271" r:id="rId21"/>
+    <p:sldId id="272" r:id="rId22"/>
+    <p:sldId id="273" r:id="rId23"/>
+    <p:sldId id="274" r:id="rId24"/>
+    <p:sldId id="275" r:id="rId25"/>
+    <p:sldId id="276" r:id="rId26"/>
+    <p:sldId id="277" r:id="rId27"/>
+    <p:sldId id="278" r:id="rId28"/>
   </p:sldIdLst>
   <p:sldSz cy="5143500" cx="9144000"/>
   <p:notesSz cx="6858000" cy="9144000"/>
   <p:embeddedFontLst>
     <p:embeddedFont>
       <p:font typeface="Roboto"/>
-      <p:regular r:id="rId12"/>
-      <p:bold r:id="rId13"/>
-      <p:italic r:id="rId14"/>
-      <p:boldItalic r:id="rId15"/>
+      <p:regular r:id="rId29"/>
+      <p:bold r:id="rId30"/>
+      <p:italic r:id="rId31"/>
+      <p:boldItalic r:id="rId32"/>
     </p:embeddedFont>
   </p:embeddedFontLst>
   <p:defaultTextStyle>
@@ -799,6 +816,996 @@
 </p:notes>
 </file>
 
+<file path=ppt/notesSlides/notesSlide10.xml><?xml version="1.0" encoding="utf-8"?>
+<p:notes xmlns:a="http://schemas.openxmlformats.org/drawingml/2006/main" xmlns:r="http://schemas.openxmlformats.org/officeDocument/2006/relationships" xmlns:mc="http://schemas.openxmlformats.org/markup-compatibility/2006" xmlns:mv="urn:schemas-microsoft-com:mac:vml" xmlns:p="http://schemas.openxmlformats.org/presentationml/2006/main" xmlns:c="http://schemas.openxmlformats.org/drawingml/2006/chart" xmlns:dgm="http://schemas.openxmlformats.org/drawingml/2006/diagram" xmlns:o="urn:schemas-microsoft-com:office:office" xmlns:v="urn:schemas-microsoft-com:vml" xmlns:pvml="urn:schemas-microsoft-com:office:powerpoint" xmlns:com="http://schemas.openxmlformats.org/drawingml/2006/compatibility" xmlns:p14="http://schemas.microsoft.com/office/powerpoint/2010/main" xmlns:p15="http://schemas.microsoft.com/office/powerpoint/2012/main" xmlns:ahyp="http://schemas.microsoft.com/office/drawing/2018/hyperlinkcolor" showMasterPhAnim="0" showMasterSp="0">
+  <p:cSld>
+    <p:spTree>
+      <p:nvGrpSpPr>
+        <p:cNvPr id="126" name="Shape 126"/>
+        <p:cNvGrpSpPr/>
+        <p:nvPr/>
+      </p:nvGrpSpPr>
+      <p:grpSpPr>
+        <a:xfrm>
+          <a:off x="0" y="0"/>
+          <a:ext cx="0" cy="0"/>
+          <a:chOff x="0" y="0"/>
+          <a:chExt cx="0" cy="0"/>
+        </a:xfrm>
+      </p:grpSpPr>
+      <p:sp>
+        <p:nvSpPr>
+          <p:cNvPr id="127" name="Google Shape;127;g11b3a1e9a09_0_28:notes"/>
+          <p:cNvSpPr/>
+          <p:nvPr>
+            <p:ph idx="2" type="sldImg"/>
+          </p:nvPr>
+        </p:nvSpPr>
+        <p:spPr>
+          <a:xfrm>
+            <a:off x="381300" y="685800"/>
+            <a:ext cx="6096000" cy="3429000"/>
+          </a:xfrm>
+          <a:custGeom>
+            <a:rect b="b" l="l" r="r" t="t"/>
+            <a:pathLst>
+              <a:path extrusionOk="0" h="120000" w="120000">
+                <a:moveTo>
+                  <a:pt x="0" y="0"/>
+                </a:moveTo>
+                <a:lnTo>
+                  <a:pt x="120000" y="0"/>
+                </a:lnTo>
+                <a:lnTo>
+                  <a:pt x="120000" y="120000"/>
+                </a:lnTo>
+                <a:lnTo>
+                  <a:pt x="0" y="120000"/>
+                </a:lnTo>
+                <a:close/>
+              </a:path>
+            </a:pathLst>
+          </a:custGeom>
+        </p:spPr>
+      </p:sp>
+      <p:sp>
+        <p:nvSpPr>
+          <p:cNvPr id="128" name="Google Shape;128;g11b3a1e9a09_0_28:notes"/>
+          <p:cNvSpPr txBox="1"/>
+          <p:nvPr>
+            <p:ph idx="1" type="body"/>
+          </p:nvPr>
+        </p:nvSpPr>
+        <p:spPr>
+          <a:xfrm>
+            <a:off x="685800" y="4343400"/>
+            <a:ext cx="5486400" cy="4114800"/>
+          </a:xfrm>
+          <a:prstGeom prst="rect">
+            <a:avLst/>
+          </a:prstGeom>
+        </p:spPr>
+        <p:txBody>
+          <a:bodyPr anchorCtr="0" anchor="t" bIns="91425" lIns="91425" spcFirstLastPara="1" rIns="91425" wrap="square" tIns="91425">
+            <a:noAutofit/>
+          </a:bodyPr>
+          <a:lstStyle/>
+          <a:p>
+            <a:pPr indent="0" lvl="0" marL="0" rtl="0" algn="l">
+              <a:spcBef>
+                <a:spcPts val="0"/>
+              </a:spcBef>
+              <a:spcAft>
+                <a:spcPts val="0"/>
+              </a:spcAft>
+              <a:buNone/>
+            </a:pPr>
+            <a:r>
+              <a:t/>
+            </a:r>
+            <a:endParaRPr/>
+          </a:p>
+        </p:txBody>
+      </p:sp>
+    </p:spTree>
+  </p:cSld>
+  <p:clrMapOvr>
+    <a:masterClrMapping/>
+  </p:clrMapOvr>
+</p:notes>
+</file>
+
+<file path=ppt/notesSlides/notesSlide11.xml><?xml version="1.0" encoding="utf-8"?>
+<p:notes xmlns:a="http://schemas.openxmlformats.org/drawingml/2006/main" xmlns:r="http://schemas.openxmlformats.org/officeDocument/2006/relationships" xmlns:mc="http://schemas.openxmlformats.org/markup-compatibility/2006" xmlns:mv="urn:schemas-microsoft-com:mac:vml" xmlns:p="http://schemas.openxmlformats.org/presentationml/2006/main" xmlns:c="http://schemas.openxmlformats.org/drawingml/2006/chart" xmlns:dgm="http://schemas.openxmlformats.org/drawingml/2006/diagram" xmlns:o="urn:schemas-microsoft-com:office:office" xmlns:v="urn:schemas-microsoft-com:vml" xmlns:pvml="urn:schemas-microsoft-com:office:powerpoint" xmlns:com="http://schemas.openxmlformats.org/drawingml/2006/compatibility" xmlns:p14="http://schemas.microsoft.com/office/powerpoint/2010/main" xmlns:p15="http://schemas.microsoft.com/office/powerpoint/2012/main" xmlns:ahyp="http://schemas.microsoft.com/office/drawing/2018/hyperlinkcolor" showMasterPhAnim="0" showMasterSp="0">
+  <p:cSld>
+    <p:spTree>
+      <p:nvGrpSpPr>
+        <p:cNvPr id="133" name="Shape 133"/>
+        <p:cNvGrpSpPr/>
+        <p:nvPr/>
+      </p:nvGrpSpPr>
+      <p:grpSpPr>
+        <a:xfrm>
+          <a:off x="0" y="0"/>
+          <a:ext cx="0" cy="0"/>
+          <a:chOff x="0" y="0"/>
+          <a:chExt cx="0" cy="0"/>
+        </a:xfrm>
+      </p:grpSpPr>
+      <p:sp>
+        <p:nvSpPr>
+          <p:cNvPr id="134" name="Google Shape;134;g11b3a1e9a09_0_35:notes"/>
+          <p:cNvSpPr/>
+          <p:nvPr>
+            <p:ph idx="2" type="sldImg"/>
+          </p:nvPr>
+        </p:nvSpPr>
+        <p:spPr>
+          <a:xfrm>
+            <a:off x="381300" y="685800"/>
+            <a:ext cx="6096000" cy="3429000"/>
+          </a:xfrm>
+          <a:custGeom>
+            <a:rect b="b" l="l" r="r" t="t"/>
+            <a:pathLst>
+              <a:path extrusionOk="0" h="120000" w="120000">
+                <a:moveTo>
+                  <a:pt x="0" y="0"/>
+                </a:moveTo>
+                <a:lnTo>
+                  <a:pt x="120000" y="0"/>
+                </a:lnTo>
+                <a:lnTo>
+                  <a:pt x="120000" y="120000"/>
+                </a:lnTo>
+                <a:lnTo>
+                  <a:pt x="0" y="120000"/>
+                </a:lnTo>
+                <a:close/>
+              </a:path>
+            </a:pathLst>
+          </a:custGeom>
+        </p:spPr>
+      </p:sp>
+      <p:sp>
+        <p:nvSpPr>
+          <p:cNvPr id="135" name="Google Shape;135;g11b3a1e9a09_0_35:notes"/>
+          <p:cNvSpPr txBox="1"/>
+          <p:nvPr>
+            <p:ph idx="1" type="body"/>
+          </p:nvPr>
+        </p:nvSpPr>
+        <p:spPr>
+          <a:xfrm>
+            <a:off x="685800" y="4343400"/>
+            <a:ext cx="5486400" cy="4114800"/>
+          </a:xfrm>
+          <a:prstGeom prst="rect">
+            <a:avLst/>
+          </a:prstGeom>
+        </p:spPr>
+        <p:txBody>
+          <a:bodyPr anchorCtr="0" anchor="t" bIns="91425" lIns="91425" spcFirstLastPara="1" rIns="91425" wrap="square" tIns="91425">
+            <a:noAutofit/>
+          </a:bodyPr>
+          <a:lstStyle/>
+          <a:p>
+            <a:pPr indent="0" lvl="0" marL="0" rtl="0" algn="l">
+              <a:spcBef>
+                <a:spcPts val="0"/>
+              </a:spcBef>
+              <a:spcAft>
+                <a:spcPts val="0"/>
+              </a:spcAft>
+              <a:buNone/>
+            </a:pPr>
+            <a:r>
+              <a:t/>
+            </a:r>
+            <a:endParaRPr/>
+          </a:p>
+        </p:txBody>
+      </p:sp>
+    </p:spTree>
+  </p:cSld>
+  <p:clrMapOvr>
+    <a:masterClrMapping/>
+  </p:clrMapOvr>
+</p:notes>
+</file>
+
+<file path=ppt/notesSlides/notesSlide12.xml><?xml version="1.0" encoding="utf-8"?>
+<p:notes xmlns:a="http://schemas.openxmlformats.org/drawingml/2006/main" xmlns:r="http://schemas.openxmlformats.org/officeDocument/2006/relationships" xmlns:mc="http://schemas.openxmlformats.org/markup-compatibility/2006" xmlns:mv="urn:schemas-microsoft-com:mac:vml" xmlns:p="http://schemas.openxmlformats.org/presentationml/2006/main" xmlns:c="http://schemas.openxmlformats.org/drawingml/2006/chart" xmlns:dgm="http://schemas.openxmlformats.org/drawingml/2006/diagram" xmlns:o="urn:schemas-microsoft-com:office:office" xmlns:v="urn:schemas-microsoft-com:vml" xmlns:pvml="urn:schemas-microsoft-com:office:powerpoint" xmlns:com="http://schemas.openxmlformats.org/drawingml/2006/compatibility" xmlns:p14="http://schemas.microsoft.com/office/powerpoint/2010/main" xmlns:p15="http://schemas.microsoft.com/office/powerpoint/2012/main" xmlns:ahyp="http://schemas.microsoft.com/office/drawing/2018/hyperlinkcolor" showMasterPhAnim="0" showMasterSp="0">
+  <p:cSld>
+    <p:spTree>
+      <p:nvGrpSpPr>
+        <p:cNvPr id="139" name="Shape 139"/>
+        <p:cNvGrpSpPr/>
+        <p:nvPr/>
+      </p:nvGrpSpPr>
+      <p:grpSpPr>
+        <a:xfrm>
+          <a:off x="0" y="0"/>
+          <a:ext cx="0" cy="0"/>
+          <a:chOff x="0" y="0"/>
+          <a:chExt cx="0" cy="0"/>
+        </a:xfrm>
+      </p:grpSpPr>
+      <p:sp>
+        <p:nvSpPr>
+          <p:cNvPr id="140" name="Google Shape;140;g11b3a1e9a09_0_40:notes"/>
+          <p:cNvSpPr/>
+          <p:nvPr>
+            <p:ph idx="2" type="sldImg"/>
+          </p:nvPr>
+        </p:nvSpPr>
+        <p:spPr>
+          <a:xfrm>
+            <a:off x="381300" y="685800"/>
+            <a:ext cx="6096000" cy="3429000"/>
+          </a:xfrm>
+          <a:custGeom>
+            <a:rect b="b" l="l" r="r" t="t"/>
+            <a:pathLst>
+              <a:path extrusionOk="0" h="120000" w="120000">
+                <a:moveTo>
+                  <a:pt x="0" y="0"/>
+                </a:moveTo>
+                <a:lnTo>
+                  <a:pt x="120000" y="0"/>
+                </a:lnTo>
+                <a:lnTo>
+                  <a:pt x="120000" y="120000"/>
+                </a:lnTo>
+                <a:lnTo>
+                  <a:pt x="0" y="120000"/>
+                </a:lnTo>
+                <a:close/>
+              </a:path>
+            </a:pathLst>
+          </a:custGeom>
+        </p:spPr>
+      </p:sp>
+      <p:sp>
+        <p:nvSpPr>
+          <p:cNvPr id="141" name="Google Shape;141;g11b3a1e9a09_0_40:notes"/>
+          <p:cNvSpPr txBox="1"/>
+          <p:nvPr>
+            <p:ph idx="1" type="body"/>
+          </p:nvPr>
+        </p:nvSpPr>
+        <p:spPr>
+          <a:xfrm>
+            <a:off x="685800" y="4343400"/>
+            <a:ext cx="5486400" cy="4114800"/>
+          </a:xfrm>
+          <a:prstGeom prst="rect">
+            <a:avLst/>
+          </a:prstGeom>
+        </p:spPr>
+        <p:txBody>
+          <a:bodyPr anchorCtr="0" anchor="t" bIns="91425" lIns="91425" spcFirstLastPara="1" rIns="91425" wrap="square" tIns="91425">
+            <a:noAutofit/>
+          </a:bodyPr>
+          <a:lstStyle/>
+          <a:p>
+            <a:pPr indent="0" lvl="0" marL="0" rtl="0" algn="l">
+              <a:spcBef>
+                <a:spcPts val="0"/>
+              </a:spcBef>
+              <a:spcAft>
+                <a:spcPts val="0"/>
+              </a:spcAft>
+              <a:buNone/>
+            </a:pPr>
+            <a:r>
+              <a:t/>
+            </a:r>
+            <a:endParaRPr/>
+          </a:p>
+        </p:txBody>
+      </p:sp>
+    </p:spTree>
+  </p:cSld>
+  <p:clrMapOvr>
+    <a:masterClrMapping/>
+  </p:clrMapOvr>
+</p:notes>
+</file>
+
+<file path=ppt/notesSlides/notesSlide13.xml><?xml version="1.0" encoding="utf-8"?>
+<p:notes xmlns:a="http://schemas.openxmlformats.org/drawingml/2006/main" xmlns:r="http://schemas.openxmlformats.org/officeDocument/2006/relationships" xmlns:mc="http://schemas.openxmlformats.org/markup-compatibility/2006" xmlns:mv="urn:schemas-microsoft-com:mac:vml" xmlns:p="http://schemas.openxmlformats.org/presentationml/2006/main" xmlns:c="http://schemas.openxmlformats.org/drawingml/2006/chart" xmlns:dgm="http://schemas.openxmlformats.org/drawingml/2006/diagram" xmlns:o="urn:schemas-microsoft-com:office:office" xmlns:v="urn:schemas-microsoft-com:vml" xmlns:pvml="urn:schemas-microsoft-com:office:powerpoint" xmlns:com="http://schemas.openxmlformats.org/drawingml/2006/compatibility" xmlns:p14="http://schemas.microsoft.com/office/powerpoint/2010/main" xmlns:p15="http://schemas.microsoft.com/office/powerpoint/2012/main" xmlns:ahyp="http://schemas.microsoft.com/office/drawing/2018/hyperlinkcolor" showMasterPhAnim="0" showMasterSp="0">
+  <p:cSld>
+    <p:spTree>
+      <p:nvGrpSpPr>
+        <p:cNvPr id="145" name="Shape 145"/>
+        <p:cNvGrpSpPr/>
+        <p:nvPr/>
+      </p:nvGrpSpPr>
+      <p:grpSpPr>
+        <a:xfrm>
+          <a:off x="0" y="0"/>
+          <a:ext cx="0" cy="0"/>
+          <a:chOff x="0" y="0"/>
+          <a:chExt cx="0" cy="0"/>
+        </a:xfrm>
+      </p:grpSpPr>
+      <p:sp>
+        <p:nvSpPr>
+          <p:cNvPr id="146" name="Google Shape;146;g11b3a1e9a09_0_46:notes"/>
+          <p:cNvSpPr/>
+          <p:nvPr>
+            <p:ph idx="2" type="sldImg"/>
+          </p:nvPr>
+        </p:nvSpPr>
+        <p:spPr>
+          <a:xfrm>
+            <a:off x="381300" y="685800"/>
+            <a:ext cx="6096000" cy="3429000"/>
+          </a:xfrm>
+          <a:custGeom>
+            <a:rect b="b" l="l" r="r" t="t"/>
+            <a:pathLst>
+              <a:path extrusionOk="0" h="120000" w="120000">
+                <a:moveTo>
+                  <a:pt x="0" y="0"/>
+                </a:moveTo>
+                <a:lnTo>
+                  <a:pt x="120000" y="0"/>
+                </a:lnTo>
+                <a:lnTo>
+                  <a:pt x="120000" y="120000"/>
+                </a:lnTo>
+                <a:lnTo>
+                  <a:pt x="0" y="120000"/>
+                </a:lnTo>
+                <a:close/>
+              </a:path>
+            </a:pathLst>
+          </a:custGeom>
+        </p:spPr>
+      </p:sp>
+      <p:sp>
+        <p:nvSpPr>
+          <p:cNvPr id="147" name="Google Shape;147;g11b3a1e9a09_0_46:notes"/>
+          <p:cNvSpPr txBox="1"/>
+          <p:nvPr>
+            <p:ph idx="1" type="body"/>
+          </p:nvPr>
+        </p:nvSpPr>
+        <p:spPr>
+          <a:xfrm>
+            <a:off x="685800" y="4343400"/>
+            <a:ext cx="5486400" cy="4114800"/>
+          </a:xfrm>
+          <a:prstGeom prst="rect">
+            <a:avLst/>
+          </a:prstGeom>
+        </p:spPr>
+        <p:txBody>
+          <a:bodyPr anchorCtr="0" anchor="t" bIns="91425" lIns="91425" spcFirstLastPara="1" rIns="91425" wrap="square" tIns="91425">
+            <a:noAutofit/>
+          </a:bodyPr>
+          <a:lstStyle/>
+          <a:p>
+            <a:pPr indent="0" lvl="0" marL="0" rtl="0" algn="l">
+              <a:spcBef>
+                <a:spcPts val="0"/>
+              </a:spcBef>
+              <a:spcAft>
+                <a:spcPts val="0"/>
+              </a:spcAft>
+              <a:buNone/>
+            </a:pPr>
+            <a:r>
+              <a:t/>
+            </a:r>
+            <a:endParaRPr/>
+          </a:p>
+        </p:txBody>
+      </p:sp>
+    </p:spTree>
+  </p:cSld>
+  <p:clrMapOvr>
+    <a:masterClrMapping/>
+  </p:clrMapOvr>
+</p:notes>
+</file>
+
+<file path=ppt/notesSlides/notesSlide14.xml><?xml version="1.0" encoding="utf-8"?>
+<p:notes xmlns:a="http://schemas.openxmlformats.org/drawingml/2006/main" xmlns:r="http://schemas.openxmlformats.org/officeDocument/2006/relationships" xmlns:mc="http://schemas.openxmlformats.org/markup-compatibility/2006" xmlns:mv="urn:schemas-microsoft-com:mac:vml" xmlns:p="http://schemas.openxmlformats.org/presentationml/2006/main" xmlns:c="http://schemas.openxmlformats.org/drawingml/2006/chart" xmlns:dgm="http://schemas.openxmlformats.org/drawingml/2006/diagram" xmlns:o="urn:schemas-microsoft-com:office:office" xmlns:v="urn:schemas-microsoft-com:vml" xmlns:pvml="urn:schemas-microsoft-com:office:powerpoint" xmlns:com="http://schemas.openxmlformats.org/drawingml/2006/compatibility" xmlns:p14="http://schemas.microsoft.com/office/powerpoint/2010/main" xmlns:p15="http://schemas.microsoft.com/office/powerpoint/2012/main" xmlns:ahyp="http://schemas.microsoft.com/office/drawing/2018/hyperlinkcolor" showMasterPhAnim="0" showMasterSp="0">
+  <p:cSld>
+    <p:spTree>
+      <p:nvGrpSpPr>
+        <p:cNvPr id="151" name="Shape 151"/>
+        <p:cNvGrpSpPr/>
+        <p:nvPr/>
+      </p:nvGrpSpPr>
+      <p:grpSpPr>
+        <a:xfrm>
+          <a:off x="0" y="0"/>
+          <a:ext cx="0" cy="0"/>
+          <a:chOff x="0" y="0"/>
+          <a:chExt cx="0" cy="0"/>
+        </a:xfrm>
+      </p:grpSpPr>
+      <p:sp>
+        <p:nvSpPr>
+          <p:cNvPr id="152" name="Google Shape;152;g11b3a1e9a09_0_51:notes"/>
+          <p:cNvSpPr/>
+          <p:nvPr>
+            <p:ph idx="2" type="sldImg"/>
+          </p:nvPr>
+        </p:nvSpPr>
+        <p:spPr>
+          <a:xfrm>
+            <a:off x="381300" y="685800"/>
+            <a:ext cx="6096000" cy="3429000"/>
+          </a:xfrm>
+          <a:custGeom>
+            <a:rect b="b" l="l" r="r" t="t"/>
+            <a:pathLst>
+              <a:path extrusionOk="0" h="120000" w="120000">
+                <a:moveTo>
+                  <a:pt x="0" y="0"/>
+                </a:moveTo>
+                <a:lnTo>
+                  <a:pt x="120000" y="0"/>
+                </a:lnTo>
+                <a:lnTo>
+                  <a:pt x="120000" y="120000"/>
+                </a:lnTo>
+                <a:lnTo>
+                  <a:pt x="0" y="120000"/>
+                </a:lnTo>
+                <a:close/>
+              </a:path>
+            </a:pathLst>
+          </a:custGeom>
+        </p:spPr>
+      </p:sp>
+      <p:sp>
+        <p:nvSpPr>
+          <p:cNvPr id="153" name="Google Shape;153;g11b3a1e9a09_0_51:notes"/>
+          <p:cNvSpPr txBox="1"/>
+          <p:nvPr>
+            <p:ph idx="1" type="body"/>
+          </p:nvPr>
+        </p:nvSpPr>
+        <p:spPr>
+          <a:xfrm>
+            <a:off x="685800" y="4343400"/>
+            <a:ext cx="5486400" cy="4114800"/>
+          </a:xfrm>
+          <a:prstGeom prst="rect">
+            <a:avLst/>
+          </a:prstGeom>
+        </p:spPr>
+        <p:txBody>
+          <a:bodyPr anchorCtr="0" anchor="t" bIns="91425" lIns="91425" spcFirstLastPara="1" rIns="91425" wrap="square" tIns="91425">
+            <a:noAutofit/>
+          </a:bodyPr>
+          <a:lstStyle/>
+          <a:p>
+            <a:pPr indent="0" lvl="0" marL="0" rtl="0" algn="l">
+              <a:spcBef>
+                <a:spcPts val="0"/>
+              </a:spcBef>
+              <a:spcAft>
+                <a:spcPts val="0"/>
+              </a:spcAft>
+              <a:buNone/>
+            </a:pPr>
+            <a:r>
+              <a:t/>
+            </a:r>
+            <a:endParaRPr/>
+          </a:p>
+        </p:txBody>
+      </p:sp>
+    </p:spTree>
+  </p:cSld>
+  <p:clrMapOvr>
+    <a:masterClrMapping/>
+  </p:clrMapOvr>
+</p:notes>
+</file>
+
+<file path=ppt/notesSlides/notesSlide15.xml><?xml version="1.0" encoding="utf-8"?>
+<p:notes xmlns:a="http://schemas.openxmlformats.org/drawingml/2006/main" xmlns:r="http://schemas.openxmlformats.org/officeDocument/2006/relationships" xmlns:mc="http://schemas.openxmlformats.org/markup-compatibility/2006" xmlns:mv="urn:schemas-microsoft-com:mac:vml" xmlns:p="http://schemas.openxmlformats.org/presentationml/2006/main" xmlns:c="http://schemas.openxmlformats.org/drawingml/2006/chart" xmlns:dgm="http://schemas.openxmlformats.org/drawingml/2006/diagram" xmlns:o="urn:schemas-microsoft-com:office:office" xmlns:v="urn:schemas-microsoft-com:vml" xmlns:pvml="urn:schemas-microsoft-com:office:powerpoint" xmlns:com="http://schemas.openxmlformats.org/drawingml/2006/compatibility" xmlns:p14="http://schemas.microsoft.com/office/powerpoint/2010/main" xmlns:p15="http://schemas.microsoft.com/office/powerpoint/2012/main" xmlns:ahyp="http://schemas.microsoft.com/office/drawing/2018/hyperlinkcolor" showMasterPhAnim="0" showMasterSp="0">
+  <p:cSld>
+    <p:spTree>
+      <p:nvGrpSpPr>
+        <p:cNvPr id="157" name="Shape 157"/>
+        <p:cNvGrpSpPr/>
+        <p:nvPr/>
+      </p:nvGrpSpPr>
+      <p:grpSpPr>
+        <a:xfrm>
+          <a:off x="0" y="0"/>
+          <a:ext cx="0" cy="0"/>
+          <a:chOff x="0" y="0"/>
+          <a:chExt cx="0" cy="0"/>
+        </a:xfrm>
+      </p:grpSpPr>
+      <p:sp>
+        <p:nvSpPr>
+          <p:cNvPr id="158" name="Google Shape;158;g11b3a1e9a09_0_57:notes"/>
+          <p:cNvSpPr/>
+          <p:nvPr>
+            <p:ph idx="2" type="sldImg"/>
+          </p:nvPr>
+        </p:nvSpPr>
+        <p:spPr>
+          <a:xfrm>
+            <a:off x="381300" y="685800"/>
+            <a:ext cx="6096000" cy="3429000"/>
+          </a:xfrm>
+          <a:custGeom>
+            <a:rect b="b" l="l" r="r" t="t"/>
+            <a:pathLst>
+              <a:path extrusionOk="0" h="120000" w="120000">
+                <a:moveTo>
+                  <a:pt x="0" y="0"/>
+                </a:moveTo>
+                <a:lnTo>
+                  <a:pt x="120000" y="0"/>
+                </a:lnTo>
+                <a:lnTo>
+                  <a:pt x="120000" y="120000"/>
+                </a:lnTo>
+                <a:lnTo>
+                  <a:pt x="0" y="120000"/>
+                </a:lnTo>
+                <a:close/>
+              </a:path>
+            </a:pathLst>
+          </a:custGeom>
+        </p:spPr>
+      </p:sp>
+      <p:sp>
+        <p:nvSpPr>
+          <p:cNvPr id="159" name="Google Shape;159;g11b3a1e9a09_0_57:notes"/>
+          <p:cNvSpPr txBox="1"/>
+          <p:nvPr>
+            <p:ph idx="1" type="body"/>
+          </p:nvPr>
+        </p:nvSpPr>
+        <p:spPr>
+          <a:xfrm>
+            <a:off x="685800" y="4343400"/>
+            <a:ext cx="5486400" cy="4114800"/>
+          </a:xfrm>
+          <a:prstGeom prst="rect">
+            <a:avLst/>
+          </a:prstGeom>
+        </p:spPr>
+        <p:txBody>
+          <a:bodyPr anchorCtr="0" anchor="t" bIns="91425" lIns="91425" spcFirstLastPara="1" rIns="91425" wrap="square" tIns="91425">
+            <a:noAutofit/>
+          </a:bodyPr>
+          <a:lstStyle/>
+          <a:p>
+            <a:pPr indent="0" lvl="0" marL="0" rtl="0" algn="l">
+              <a:spcBef>
+                <a:spcPts val="0"/>
+              </a:spcBef>
+              <a:spcAft>
+                <a:spcPts val="0"/>
+              </a:spcAft>
+              <a:buNone/>
+            </a:pPr>
+            <a:r>
+              <a:t/>
+            </a:r>
+            <a:endParaRPr/>
+          </a:p>
+        </p:txBody>
+      </p:sp>
+    </p:spTree>
+  </p:cSld>
+  <p:clrMapOvr>
+    <a:masterClrMapping/>
+  </p:clrMapOvr>
+</p:notes>
+</file>
+
+<file path=ppt/notesSlides/notesSlide16.xml><?xml version="1.0" encoding="utf-8"?>
+<p:notes xmlns:a="http://schemas.openxmlformats.org/drawingml/2006/main" xmlns:r="http://schemas.openxmlformats.org/officeDocument/2006/relationships" xmlns:mc="http://schemas.openxmlformats.org/markup-compatibility/2006" xmlns:mv="urn:schemas-microsoft-com:mac:vml" xmlns:p="http://schemas.openxmlformats.org/presentationml/2006/main" xmlns:c="http://schemas.openxmlformats.org/drawingml/2006/chart" xmlns:dgm="http://schemas.openxmlformats.org/drawingml/2006/diagram" xmlns:o="urn:schemas-microsoft-com:office:office" xmlns:v="urn:schemas-microsoft-com:vml" xmlns:pvml="urn:schemas-microsoft-com:office:powerpoint" xmlns:com="http://schemas.openxmlformats.org/drawingml/2006/compatibility" xmlns:p14="http://schemas.microsoft.com/office/powerpoint/2010/main" xmlns:p15="http://schemas.microsoft.com/office/powerpoint/2012/main" xmlns:ahyp="http://schemas.microsoft.com/office/drawing/2018/hyperlinkcolor" showMasterPhAnim="0" showMasterSp="0">
+  <p:cSld>
+    <p:spTree>
+      <p:nvGrpSpPr>
+        <p:cNvPr id="163" name="Shape 163"/>
+        <p:cNvGrpSpPr/>
+        <p:nvPr/>
+      </p:nvGrpSpPr>
+      <p:grpSpPr>
+        <a:xfrm>
+          <a:off x="0" y="0"/>
+          <a:ext cx="0" cy="0"/>
+          <a:chOff x="0" y="0"/>
+          <a:chExt cx="0" cy="0"/>
+        </a:xfrm>
+      </p:grpSpPr>
+      <p:sp>
+        <p:nvSpPr>
+          <p:cNvPr id="164" name="Google Shape;164;g11b3a1e9a09_0_63:notes"/>
+          <p:cNvSpPr/>
+          <p:nvPr>
+            <p:ph idx="2" type="sldImg"/>
+          </p:nvPr>
+        </p:nvSpPr>
+        <p:spPr>
+          <a:xfrm>
+            <a:off x="381300" y="685800"/>
+            <a:ext cx="6096000" cy="3429000"/>
+          </a:xfrm>
+          <a:custGeom>
+            <a:rect b="b" l="l" r="r" t="t"/>
+            <a:pathLst>
+              <a:path extrusionOk="0" h="120000" w="120000">
+                <a:moveTo>
+                  <a:pt x="0" y="0"/>
+                </a:moveTo>
+                <a:lnTo>
+                  <a:pt x="120000" y="0"/>
+                </a:lnTo>
+                <a:lnTo>
+                  <a:pt x="120000" y="120000"/>
+                </a:lnTo>
+                <a:lnTo>
+                  <a:pt x="0" y="120000"/>
+                </a:lnTo>
+                <a:close/>
+              </a:path>
+            </a:pathLst>
+          </a:custGeom>
+        </p:spPr>
+      </p:sp>
+      <p:sp>
+        <p:nvSpPr>
+          <p:cNvPr id="165" name="Google Shape;165;g11b3a1e9a09_0_63:notes"/>
+          <p:cNvSpPr txBox="1"/>
+          <p:nvPr>
+            <p:ph idx="1" type="body"/>
+          </p:nvPr>
+        </p:nvSpPr>
+        <p:spPr>
+          <a:xfrm>
+            <a:off x="685800" y="4343400"/>
+            <a:ext cx="5486400" cy="4114800"/>
+          </a:xfrm>
+          <a:prstGeom prst="rect">
+            <a:avLst/>
+          </a:prstGeom>
+        </p:spPr>
+        <p:txBody>
+          <a:bodyPr anchorCtr="0" anchor="t" bIns="91425" lIns="91425" spcFirstLastPara="1" rIns="91425" wrap="square" tIns="91425">
+            <a:noAutofit/>
+          </a:bodyPr>
+          <a:lstStyle/>
+          <a:p>
+            <a:pPr indent="0" lvl="0" marL="0" rtl="0" algn="l">
+              <a:spcBef>
+                <a:spcPts val="0"/>
+              </a:spcBef>
+              <a:spcAft>
+                <a:spcPts val="0"/>
+              </a:spcAft>
+              <a:buNone/>
+            </a:pPr>
+            <a:r>
+              <a:t/>
+            </a:r>
+            <a:endParaRPr/>
+          </a:p>
+        </p:txBody>
+      </p:sp>
+    </p:spTree>
+  </p:cSld>
+  <p:clrMapOvr>
+    <a:masterClrMapping/>
+  </p:clrMapOvr>
+</p:notes>
+</file>
+
+<file path=ppt/notesSlides/notesSlide17.xml><?xml version="1.0" encoding="utf-8"?>
+<p:notes xmlns:a="http://schemas.openxmlformats.org/drawingml/2006/main" xmlns:r="http://schemas.openxmlformats.org/officeDocument/2006/relationships" xmlns:mc="http://schemas.openxmlformats.org/markup-compatibility/2006" xmlns:mv="urn:schemas-microsoft-com:mac:vml" xmlns:p="http://schemas.openxmlformats.org/presentationml/2006/main" xmlns:c="http://schemas.openxmlformats.org/drawingml/2006/chart" xmlns:dgm="http://schemas.openxmlformats.org/drawingml/2006/diagram" xmlns:o="urn:schemas-microsoft-com:office:office" xmlns:v="urn:schemas-microsoft-com:vml" xmlns:pvml="urn:schemas-microsoft-com:office:powerpoint" xmlns:com="http://schemas.openxmlformats.org/drawingml/2006/compatibility" xmlns:p14="http://schemas.microsoft.com/office/powerpoint/2010/main" xmlns:p15="http://schemas.microsoft.com/office/powerpoint/2012/main" xmlns:ahyp="http://schemas.microsoft.com/office/drawing/2018/hyperlinkcolor" showMasterPhAnim="0" showMasterSp="0">
+  <p:cSld>
+    <p:spTree>
+      <p:nvGrpSpPr>
+        <p:cNvPr id="169" name="Shape 169"/>
+        <p:cNvGrpSpPr/>
+        <p:nvPr/>
+      </p:nvGrpSpPr>
+      <p:grpSpPr>
+        <a:xfrm>
+          <a:off x="0" y="0"/>
+          <a:ext cx="0" cy="0"/>
+          <a:chOff x="0" y="0"/>
+          <a:chExt cx="0" cy="0"/>
+        </a:xfrm>
+      </p:grpSpPr>
+      <p:sp>
+        <p:nvSpPr>
+          <p:cNvPr id="170" name="Google Shape;170;g11b3a1e9a09_0_69:notes"/>
+          <p:cNvSpPr/>
+          <p:nvPr>
+            <p:ph idx="2" type="sldImg"/>
+          </p:nvPr>
+        </p:nvSpPr>
+        <p:spPr>
+          <a:xfrm>
+            <a:off x="381300" y="685800"/>
+            <a:ext cx="6096000" cy="3429000"/>
+          </a:xfrm>
+          <a:custGeom>
+            <a:rect b="b" l="l" r="r" t="t"/>
+            <a:pathLst>
+              <a:path extrusionOk="0" h="120000" w="120000">
+                <a:moveTo>
+                  <a:pt x="0" y="0"/>
+                </a:moveTo>
+                <a:lnTo>
+                  <a:pt x="120000" y="0"/>
+                </a:lnTo>
+                <a:lnTo>
+                  <a:pt x="120000" y="120000"/>
+                </a:lnTo>
+                <a:lnTo>
+                  <a:pt x="0" y="120000"/>
+                </a:lnTo>
+                <a:close/>
+              </a:path>
+            </a:pathLst>
+          </a:custGeom>
+        </p:spPr>
+      </p:sp>
+      <p:sp>
+        <p:nvSpPr>
+          <p:cNvPr id="171" name="Google Shape;171;g11b3a1e9a09_0_69:notes"/>
+          <p:cNvSpPr txBox="1"/>
+          <p:nvPr>
+            <p:ph idx="1" type="body"/>
+          </p:nvPr>
+        </p:nvSpPr>
+        <p:spPr>
+          <a:xfrm>
+            <a:off x="685800" y="4343400"/>
+            <a:ext cx="5486400" cy="4114800"/>
+          </a:xfrm>
+          <a:prstGeom prst="rect">
+            <a:avLst/>
+          </a:prstGeom>
+        </p:spPr>
+        <p:txBody>
+          <a:bodyPr anchorCtr="0" anchor="t" bIns="91425" lIns="91425" spcFirstLastPara="1" rIns="91425" wrap="square" tIns="91425">
+            <a:noAutofit/>
+          </a:bodyPr>
+          <a:lstStyle/>
+          <a:p>
+            <a:pPr indent="0" lvl="0" marL="0" rtl="0" algn="l">
+              <a:spcBef>
+                <a:spcPts val="0"/>
+              </a:spcBef>
+              <a:spcAft>
+                <a:spcPts val="0"/>
+              </a:spcAft>
+              <a:buNone/>
+            </a:pPr>
+            <a:r>
+              <a:t/>
+            </a:r>
+            <a:endParaRPr/>
+          </a:p>
+        </p:txBody>
+      </p:sp>
+    </p:spTree>
+  </p:cSld>
+  <p:clrMapOvr>
+    <a:masterClrMapping/>
+  </p:clrMapOvr>
+</p:notes>
+</file>
+
+<file path=ppt/notesSlides/notesSlide18.xml><?xml version="1.0" encoding="utf-8"?>
+<p:notes xmlns:a="http://schemas.openxmlformats.org/drawingml/2006/main" xmlns:r="http://schemas.openxmlformats.org/officeDocument/2006/relationships" xmlns:mc="http://schemas.openxmlformats.org/markup-compatibility/2006" xmlns:mv="urn:schemas-microsoft-com:mac:vml" xmlns:p="http://schemas.openxmlformats.org/presentationml/2006/main" xmlns:c="http://schemas.openxmlformats.org/drawingml/2006/chart" xmlns:dgm="http://schemas.openxmlformats.org/drawingml/2006/diagram" xmlns:o="urn:schemas-microsoft-com:office:office" xmlns:v="urn:schemas-microsoft-com:vml" xmlns:pvml="urn:schemas-microsoft-com:office:powerpoint" xmlns:com="http://schemas.openxmlformats.org/drawingml/2006/compatibility" xmlns:p14="http://schemas.microsoft.com/office/powerpoint/2010/main" xmlns:p15="http://schemas.microsoft.com/office/powerpoint/2012/main" xmlns:ahyp="http://schemas.microsoft.com/office/drawing/2018/hyperlinkcolor" showMasterPhAnim="0" showMasterSp="0">
+  <p:cSld>
+    <p:spTree>
+      <p:nvGrpSpPr>
+        <p:cNvPr id="175" name="Shape 175"/>
+        <p:cNvGrpSpPr/>
+        <p:nvPr/>
+      </p:nvGrpSpPr>
+      <p:grpSpPr>
+        <a:xfrm>
+          <a:off x="0" y="0"/>
+          <a:ext cx="0" cy="0"/>
+          <a:chOff x="0" y="0"/>
+          <a:chExt cx="0" cy="0"/>
+        </a:xfrm>
+      </p:grpSpPr>
+      <p:sp>
+        <p:nvSpPr>
+          <p:cNvPr id="176" name="Google Shape;176;g11b3a1e9a09_0_74:notes"/>
+          <p:cNvSpPr/>
+          <p:nvPr>
+            <p:ph idx="2" type="sldImg"/>
+          </p:nvPr>
+        </p:nvSpPr>
+        <p:spPr>
+          <a:xfrm>
+            <a:off x="381300" y="685800"/>
+            <a:ext cx="6096000" cy="3429000"/>
+          </a:xfrm>
+          <a:custGeom>
+            <a:rect b="b" l="l" r="r" t="t"/>
+            <a:pathLst>
+              <a:path extrusionOk="0" h="120000" w="120000">
+                <a:moveTo>
+                  <a:pt x="0" y="0"/>
+                </a:moveTo>
+                <a:lnTo>
+                  <a:pt x="120000" y="0"/>
+                </a:lnTo>
+                <a:lnTo>
+                  <a:pt x="120000" y="120000"/>
+                </a:lnTo>
+                <a:lnTo>
+                  <a:pt x="0" y="120000"/>
+                </a:lnTo>
+                <a:close/>
+              </a:path>
+            </a:pathLst>
+          </a:custGeom>
+        </p:spPr>
+      </p:sp>
+      <p:sp>
+        <p:nvSpPr>
+          <p:cNvPr id="177" name="Google Shape;177;g11b3a1e9a09_0_74:notes"/>
+          <p:cNvSpPr txBox="1"/>
+          <p:nvPr>
+            <p:ph idx="1" type="body"/>
+          </p:nvPr>
+        </p:nvSpPr>
+        <p:spPr>
+          <a:xfrm>
+            <a:off x="685800" y="4343400"/>
+            <a:ext cx="5486400" cy="4114800"/>
+          </a:xfrm>
+          <a:prstGeom prst="rect">
+            <a:avLst/>
+          </a:prstGeom>
+        </p:spPr>
+        <p:txBody>
+          <a:bodyPr anchorCtr="0" anchor="t" bIns="91425" lIns="91425" spcFirstLastPara="1" rIns="91425" wrap="square" tIns="91425">
+            <a:noAutofit/>
+          </a:bodyPr>
+          <a:lstStyle/>
+          <a:p>
+            <a:pPr indent="0" lvl="0" marL="0" rtl="0" algn="l">
+              <a:spcBef>
+                <a:spcPts val="0"/>
+              </a:spcBef>
+              <a:spcAft>
+                <a:spcPts val="0"/>
+              </a:spcAft>
+              <a:buNone/>
+            </a:pPr>
+            <a:r>
+              <a:t/>
+            </a:r>
+            <a:endParaRPr/>
+          </a:p>
+        </p:txBody>
+      </p:sp>
+    </p:spTree>
+  </p:cSld>
+  <p:clrMapOvr>
+    <a:masterClrMapping/>
+  </p:clrMapOvr>
+</p:notes>
+</file>
+
+<file path=ppt/notesSlides/notesSlide19.xml><?xml version="1.0" encoding="utf-8"?>
+<p:notes xmlns:a="http://schemas.openxmlformats.org/drawingml/2006/main" xmlns:r="http://schemas.openxmlformats.org/officeDocument/2006/relationships" xmlns:mc="http://schemas.openxmlformats.org/markup-compatibility/2006" xmlns:mv="urn:schemas-microsoft-com:mac:vml" xmlns:p="http://schemas.openxmlformats.org/presentationml/2006/main" xmlns:c="http://schemas.openxmlformats.org/drawingml/2006/chart" xmlns:dgm="http://schemas.openxmlformats.org/drawingml/2006/diagram" xmlns:o="urn:schemas-microsoft-com:office:office" xmlns:v="urn:schemas-microsoft-com:vml" xmlns:pvml="urn:schemas-microsoft-com:office:powerpoint" xmlns:com="http://schemas.openxmlformats.org/drawingml/2006/compatibility" xmlns:p14="http://schemas.microsoft.com/office/powerpoint/2010/main" xmlns:p15="http://schemas.microsoft.com/office/powerpoint/2012/main" xmlns:ahyp="http://schemas.microsoft.com/office/drawing/2018/hyperlinkcolor" showMasterPhAnim="0" showMasterSp="0">
+  <p:cSld>
+    <p:spTree>
+      <p:nvGrpSpPr>
+        <p:cNvPr id="180" name="Shape 180"/>
+        <p:cNvGrpSpPr/>
+        <p:nvPr/>
+      </p:nvGrpSpPr>
+      <p:grpSpPr>
+        <a:xfrm>
+          <a:off x="0" y="0"/>
+          <a:ext cx="0" cy="0"/>
+          <a:chOff x="0" y="0"/>
+          <a:chExt cx="0" cy="0"/>
+        </a:xfrm>
+      </p:grpSpPr>
+      <p:sp>
+        <p:nvSpPr>
+          <p:cNvPr id="181" name="Google Shape;181;g11b3a1e9a09_0_79:notes"/>
+          <p:cNvSpPr/>
+          <p:nvPr>
+            <p:ph idx="2" type="sldImg"/>
+          </p:nvPr>
+        </p:nvSpPr>
+        <p:spPr>
+          <a:xfrm>
+            <a:off x="381300" y="685800"/>
+            <a:ext cx="6096000" cy="3429000"/>
+          </a:xfrm>
+          <a:custGeom>
+            <a:rect b="b" l="l" r="r" t="t"/>
+            <a:pathLst>
+              <a:path extrusionOk="0" h="120000" w="120000">
+                <a:moveTo>
+                  <a:pt x="0" y="0"/>
+                </a:moveTo>
+                <a:lnTo>
+                  <a:pt x="120000" y="0"/>
+                </a:lnTo>
+                <a:lnTo>
+                  <a:pt x="120000" y="120000"/>
+                </a:lnTo>
+                <a:lnTo>
+                  <a:pt x="0" y="120000"/>
+                </a:lnTo>
+                <a:close/>
+              </a:path>
+            </a:pathLst>
+          </a:custGeom>
+        </p:spPr>
+      </p:sp>
+      <p:sp>
+        <p:nvSpPr>
+          <p:cNvPr id="182" name="Google Shape;182;g11b3a1e9a09_0_79:notes"/>
+          <p:cNvSpPr txBox="1"/>
+          <p:nvPr>
+            <p:ph idx="1" type="body"/>
+          </p:nvPr>
+        </p:nvSpPr>
+        <p:spPr>
+          <a:xfrm>
+            <a:off x="685800" y="4343400"/>
+            <a:ext cx="5486400" cy="4114800"/>
+          </a:xfrm>
+          <a:prstGeom prst="rect">
+            <a:avLst/>
+          </a:prstGeom>
+        </p:spPr>
+        <p:txBody>
+          <a:bodyPr anchorCtr="0" anchor="t" bIns="91425" lIns="91425" spcFirstLastPara="1" rIns="91425" wrap="square" tIns="91425">
+            <a:noAutofit/>
+          </a:bodyPr>
+          <a:lstStyle/>
+          <a:p>
+            <a:pPr indent="0" lvl="0" marL="0" rtl="0" algn="l">
+              <a:spcBef>
+                <a:spcPts val="0"/>
+              </a:spcBef>
+              <a:spcAft>
+                <a:spcPts val="0"/>
+              </a:spcAft>
+              <a:buNone/>
+            </a:pPr>
+            <a:r>
+              <a:t/>
+            </a:r>
+            <a:endParaRPr/>
+          </a:p>
+        </p:txBody>
+      </p:sp>
+    </p:spTree>
+  </p:cSld>
+  <p:clrMapOvr>
+    <a:masterClrMapping/>
+  </p:clrMapOvr>
+</p:notes>
+</file>
+
 <file path=ppt/notesSlides/notesSlide2.xml><?xml version="1.0" encoding="utf-8"?>
 <p:notes xmlns:a="http://schemas.openxmlformats.org/drawingml/2006/main" xmlns:r="http://schemas.openxmlformats.org/officeDocument/2006/relationships" xmlns:mc="http://schemas.openxmlformats.org/markup-compatibility/2006" xmlns:mv="urn:schemas-microsoft-com:mac:vml" xmlns:p="http://schemas.openxmlformats.org/presentationml/2006/main" xmlns:c="http://schemas.openxmlformats.org/drawingml/2006/chart" xmlns:dgm="http://schemas.openxmlformats.org/drawingml/2006/diagram" xmlns:o="urn:schemas-microsoft-com:office:office" xmlns:v="urn:schemas-microsoft-com:vml" xmlns:pvml="urn:schemas-microsoft-com:office:powerpoint" xmlns:com="http://schemas.openxmlformats.org/drawingml/2006/compatibility" xmlns:p14="http://schemas.microsoft.com/office/powerpoint/2010/main" xmlns:p15="http://schemas.microsoft.com/office/powerpoint/2012/main" xmlns:ahyp="http://schemas.microsoft.com/office/drawing/2018/hyperlinkcolor" showMasterPhAnim="0" showMasterSp="0">
   <p:cSld>
@@ -854,6 +1861,402 @@
       <p:sp>
         <p:nvSpPr>
           <p:cNvPr id="71" name="Google Shape;71;g1254247731d_0_77:notes"/>
+          <p:cNvSpPr txBox="1"/>
+          <p:nvPr>
+            <p:ph idx="1" type="body"/>
+          </p:nvPr>
+        </p:nvSpPr>
+        <p:spPr>
+          <a:xfrm>
+            <a:off x="685800" y="4343400"/>
+            <a:ext cx="5486400" cy="4114800"/>
+          </a:xfrm>
+          <a:prstGeom prst="rect">
+            <a:avLst/>
+          </a:prstGeom>
+        </p:spPr>
+        <p:txBody>
+          <a:bodyPr anchorCtr="0" anchor="t" bIns="91425" lIns="91425" spcFirstLastPara="1" rIns="91425" wrap="square" tIns="91425">
+            <a:noAutofit/>
+          </a:bodyPr>
+          <a:lstStyle/>
+          <a:p>
+            <a:pPr indent="0" lvl="0" marL="0" rtl="0" algn="l">
+              <a:spcBef>
+                <a:spcPts val="0"/>
+              </a:spcBef>
+              <a:spcAft>
+                <a:spcPts val="0"/>
+              </a:spcAft>
+              <a:buNone/>
+            </a:pPr>
+            <a:r>
+              <a:t/>
+            </a:r>
+            <a:endParaRPr/>
+          </a:p>
+        </p:txBody>
+      </p:sp>
+    </p:spTree>
+  </p:cSld>
+  <p:clrMapOvr>
+    <a:masterClrMapping/>
+  </p:clrMapOvr>
+</p:notes>
+</file>
+
+<file path=ppt/notesSlides/notesSlide20.xml><?xml version="1.0" encoding="utf-8"?>
+<p:notes xmlns:a="http://schemas.openxmlformats.org/drawingml/2006/main" xmlns:r="http://schemas.openxmlformats.org/officeDocument/2006/relationships" xmlns:mc="http://schemas.openxmlformats.org/markup-compatibility/2006" xmlns:mv="urn:schemas-microsoft-com:mac:vml" xmlns:p="http://schemas.openxmlformats.org/presentationml/2006/main" xmlns:c="http://schemas.openxmlformats.org/drawingml/2006/chart" xmlns:dgm="http://schemas.openxmlformats.org/drawingml/2006/diagram" xmlns:o="urn:schemas-microsoft-com:office:office" xmlns:v="urn:schemas-microsoft-com:vml" xmlns:pvml="urn:schemas-microsoft-com:office:powerpoint" xmlns:com="http://schemas.openxmlformats.org/drawingml/2006/compatibility" xmlns:p14="http://schemas.microsoft.com/office/powerpoint/2010/main" xmlns:p15="http://schemas.microsoft.com/office/powerpoint/2012/main" xmlns:ahyp="http://schemas.microsoft.com/office/drawing/2018/hyperlinkcolor" showMasterPhAnim="0" showMasterSp="0">
+  <p:cSld>
+    <p:spTree>
+      <p:nvGrpSpPr>
+        <p:cNvPr id="186" name="Shape 186"/>
+        <p:cNvGrpSpPr/>
+        <p:nvPr/>
+      </p:nvGrpSpPr>
+      <p:grpSpPr>
+        <a:xfrm>
+          <a:off x="0" y="0"/>
+          <a:ext cx="0" cy="0"/>
+          <a:chOff x="0" y="0"/>
+          <a:chExt cx="0" cy="0"/>
+        </a:xfrm>
+      </p:grpSpPr>
+      <p:sp>
+        <p:nvSpPr>
+          <p:cNvPr id="187" name="Google Shape;187;g11b3a1e9a09_0_84:notes"/>
+          <p:cNvSpPr/>
+          <p:nvPr>
+            <p:ph idx="2" type="sldImg"/>
+          </p:nvPr>
+        </p:nvSpPr>
+        <p:spPr>
+          <a:xfrm>
+            <a:off x="381300" y="685800"/>
+            <a:ext cx="6096000" cy="3429000"/>
+          </a:xfrm>
+          <a:custGeom>
+            <a:rect b="b" l="l" r="r" t="t"/>
+            <a:pathLst>
+              <a:path extrusionOk="0" h="120000" w="120000">
+                <a:moveTo>
+                  <a:pt x="0" y="0"/>
+                </a:moveTo>
+                <a:lnTo>
+                  <a:pt x="120000" y="0"/>
+                </a:lnTo>
+                <a:lnTo>
+                  <a:pt x="120000" y="120000"/>
+                </a:lnTo>
+                <a:lnTo>
+                  <a:pt x="0" y="120000"/>
+                </a:lnTo>
+                <a:close/>
+              </a:path>
+            </a:pathLst>
+          </a:custGeom>
+        </p:spPr>
+      </p:sp>
+      <p:sp>
+        <p:nvSpPr>
+          <p:cNvPr id="188" name="Google Shape;188;g11b3a1e9a09_0_84:notes"/>
+          <p:cNvSpPr txBox="1"/>
+          <p:nvPr>
+            <p:ph idx="1" type="body"/>
+          </p:nvPr>
+        </p:nvSpPr>
+        <p:spPr>
+          <a:xfrm>
+            <a:off x="685800" y="4343400"/>
+            <a:ext cx="5486400" cy="4114800"/>
+          </a:xfrm>
+          <a:prstGeom prst="rect">
+            <a:avLst/>
+          </a:prstGeom>
+        </p:spPr>
+        <p:txBody>
+          <a:bodyPr anchorCtr="0" anchor="t" bIns="91425" lIns="91425" spcFirstLastPara="1" rIns="91425" wrap="square" tIns="91425">
+            <a:noAutofit/>
+          </a:bodyPr>
+          <a:lstStyle/>
+          <a:p>
+            <a:pPr indent="0" lvl="0" marL="0" rtl="0" algn="l">
+              <a:spcBef>
+                <a:spcPts val="0"/>
+              </a:spcBef>
+              <a:spcAft>
+                <a:spcPts val="0"/>
+              </a:spcAft>
+              <a:buNone/>
+            </a:pPr>
+            <a:r>
+              <a:t/>
+            </a:r>
+            <a:endParaRPr/>
+          </a:p>
+        </p:txBody>
+      </p:sp>
+    </p:spTree>
+  </p:cSld>
+  <p:clrMapOvr>
+    <a:masterClrMapping/>
+  </p:clrMapOvr>
+</p:notes>
+</file>
+
+<file path=ppt/notesSlides/notesSlide21.xml><?xml version="1.0" encoding="utf-8"?>
+<p:notes xmlns:a="http://schemas.openxmlformats.org/drawingml/2006/main" xmlns:r="http://schemas.openxmlformats.org/officeDocument/2006/relationships" xmlns:mc="http://schemas.openxmlformats.org/markup-compatibility/2006" xmlns:mv="urn:schemas-microsoft-com:mac:vml" xmlns:p="http://schemas.openxmlformats.org/presentationml/2006/main" xmlns:c="http://schemas.openxmlformats.org/drawingml/2006/chart" xmlns:dgm="http://schemas.openxmlformats.org/drawingml/2006/diagram" xmlns:o="urn:schemas-microsoft-com:office:office" xmlns:v="urn:schemas-microsoft-com:vml" xmlns:pvml="urn:schemas-microsoft-com:office:powerpoint" xmlns:com="http://schemas.openxmlformats.org/drawingml/2006/compatibility" xmlns:p14="http://schemas.microsoft.com/office/powerpoint/2010/main" xmlns:p15="http://schemas.microsoft.com/office/powerpoint/2012/main" xmlns:ahyp="http://schemas.microsoft.com/office/drawing/2018/hyperlinkcolor" showMasterPhAnim="0" showMasterSp="0">
+  <p:cSld>
+    <p:spTree>
+      <p:nvGrpSpPr>
+        <p:cNvPr id="193" name="Shape 193"/>
+        <p:cNvGrpSpPr/>
+        <p:nvPr/>
+      </p:nvGrpSpPr>
+      <p:grpSpPr>
+        <a:xfrm>
+          <a:off x="0" y="0"/>
+          <a:ext cx="0" cy="0"/>
+          <a:chOff x="0" y="0"/>
+          <a:chExt cx="0" cy="0"/>
+        </a:xfrm>
+      </p:grpSpPr>
+      <p:sp>
+        <p:nvSpPr>
+          <p:cNvPr id="194" name="Google Shape;194;g11b3a1e9a09_0_90:notes"/>
+          <p:cNvSpPr/>
+          <p:nvPr>
+            <p:ph idx="2" type="sldImg"/>
+          </p:nvPr>
+        </p:nvSpPr>
+        <p:spPr>
+          <a:xfrm>
+            <a:off x="381300" y="685800"/>
+            <a:ext cx="6096000" cy="3429000"/>
+          </a:xfrm>
+          <a:custGeom>
+            <a:rect b="b" l="l" r="r" t="t"/>
+            <a:pathLst>
+              <a:path extrusionOk="0" h="120000" w="120000">
+                <a:moveTo>
+                  <a:pt x="0" y="0"/>
+                </a:moveTo>
+                <a:lnTo>
+                  <a:pt x="120000" y="0"/>
+                </a:lnTo>
+                <a:lnTo>
+                  <a:pt x="120000" y="120000"/>
+                </a:lnTo>
+                <a:lnTo>
+                  <a:pt x="0" y="120000"/>
+                </a:lnTo>
+                <a:close/>
+              </a:path>
+            </a:pathLst>
+          </a:custGeom>
+        </p:spPr>
+      </p:sp>
+      <p:sp>
+        <p:nvSpPr>
+          <p:cNvPr id="195" name="Google Shape;195;g11b3a1e9a09_0_90:notes"/>
+          <p:cNvSpPr txBox="1"/>
+          <p:nvPr>
+            <p:ph idx="1" type="body"/>
+          </p:nvPr>
+        </p:nvSpPr>
+        <p:spPr>
+          <a:xfrm>
+            <a:off x="685800" y="4343400"/>
+            <a:ext cx="5486400" cy="4114800"/>
+          </a:xfrm>
+          <a:prstGeom prst="rect">
+            <a:avLst/>
+          </a:prstGeom>
+        </p:spPr>
+        <p:txBody>
+          <a:bodyPr anchorCtr="0" anchor="t" bIns="91425" lIns="91425" spcFirstLastPara="1" rIns="91425" wrap="square" tIns="91425">
+            <a:noAutofit/>
+          </a:bodyPr>
+          <a:lstStyle/>
+          <a:p>
+            <a:pPr indent="0" lvl="0" marL="0" rtl="0" algn="l">
+              <a:spcBef>
+                <a:spcPts val="0"/>
+              </a:spcBef>
+              <a:spcAft>
+                <a:spcPts val="0"/>
+              </a:spcAft>
+              <a:buNone/>
+            </a:pPr>
+            <a:r>
+              <a:t/>
+            </a:r>
+            <a:endParaRPr/>
+          </a:p>
+        </p:txBody>
+      </p:sp>
+    </p:spTree>
+  </p:cSld>
+  <p:clrMapOvr>
+    <a:masterClrMapping/>
+  </p:clrMapOvr>
+</p:notes>
+</file>
+
+<file path=ppt/notesSlides/notesSlide22.xml><?xml version="1.0" encoding="utf-8"?>
+<p:notes xmlns:a="http://schemas.openxmlformats.org/drawingml/2006/main" xmlns:r="http://schemas.openxmlformats.org/officeDocument/2006/relationships" xmlns:mc="http://schemas.openxmlformats.org/markup-compatibility/2006" xmlns:mv="urn:schemas-microsoft-com:mac:vml" xmlns:p="http://schemas.openxmlformats.org/presentationml/2006/main" xmlns:c="http://schemas.openxmlformats.org/drawingml/2006/chart" xmlns:dgm="http://schemas.openxmlformats.org/drawingml/2006/diagram" xmlns:o="urn:schemas-microsoft-com:office:office" xmlns:v="urn:schemas-microsoft-com:vml" xmlns:pvml="urn:schemas-microsoft-com:office:powerpoint" xmlns:com="http://schemas.openxmlformats.org/drawingml/2006/compatibility" xmlns:p14="http://schemas.microsoft.com/office/powerpoint/2010/main" xmlns:p15="http://schemas.microsoft.com/office/powerpoint/2012/main" xmlns:ahyp="http://schemas.microsoft.com/office/drawing/2018/hyperlinkcolor" showMasterPhAnim="0" showMasterSp="0">
+  <p:cSld>
+    <p:spTree>
+      <p:nvGrpSpPr>
+        <p:cNvPr id="199" name="Shape 199"/>
+        <p:cNvGrpSpPr/>
+        <p:nvPr/>
+      </p:nvGrpSpPr>
+      <p:grpSpPr>
+        <a:xfrm>
+          <a:off x="0" y="0"/>
+          <a:ext cx="0" cy="0"/>
+          <a:chOff x="0" y="0"/>
+          <a:chExt cx="0" cy="0"/>
+        </a:xfrm>
+      </p:grpSpPr>
+      <p:sp>
+        <p:nvSpPr>
+          <p:cNvPr id="200" name="Google Shape;200;g11b3a1e9a09_0_95:notes"/>
+          <p:cNvSpPr/>
+          <p:nvPr>
+            <p:ph idx="2" type="sldImg"/>
+          </p:nvPr>
+        </p:nvSpPr>
+        <p:spPr>
+          <a:xfrm>
+            <a:off x="381300" y="685800"/>
+            <a:ext cx="6096000" cy="3429000"/>
+          </a:xfrm>
+          <a:custGeom>
+            <a:rect b="b" l="l" r="r" t="t"/>
+            <a:pathLst>
+              <a:path extrusionOk="0" h="120000" w="120000">
+                <a:moveTo>
+                  <a:pt x="0" y="0"/>
+                </a:moveTo>
+                <a:lnTo>
+                  <a:pt x="120000" y="0"/>
+                </a:lnTo>
+                <a:lnTo>
+                  <a:pt x="120000" y="120000"/>
+                </a:lnTo>
+                <a:lnTo>
+                  <a:pt x="0" y="120000"/>
+                </a:lnTo>
+                <a:close/>
+              </a:path>
+            </a:pathLst>
+          </a:custGeom>
+        </p:spPr>
+      </p:sp>
+      <p:sp>
+        <p:nvSpPr>
+          <p:cNvPr id="201" name="Google Shape;201;g11b3a1e9a09_0_95:notes"/>
+          <p:cNvSpPr txBox="1"/>
+          <p:nvPr>
+            <p:ph idx="1" type="body"/>
+          </p:nvPr>
+        </p:nvSpPr>
+        <p:spPr>
+          <a:xfrm>
+            <a:off x="685800" y="4343400"/>
+            <a:ext cx="5486400" cy="4114800"/>
+          </a:xfrm>
+          <a:prstGeom prst="rect">
+            <a:avLst/>
+          </a:prstGeom>
+        </p:spPr>
+        <p:txBody>
+          <a:bodyPr anchorCtr="0" anchor="t" bIns="91425" lIns="91425" spcFirstLastPara="1" rIns="91425" wrap="square" tIns="91425">
+            <a:noAutofit/>
+          </a:bodyPr>
+          <a:lstStyle/>
+          <a:p>
+            <a:pPr indent="0" lvl="0" marL="0" rtl="0" algn="l">
+              <a:spcBef>
+                <a:spcPts val="0"/>
+              </a:spcBef>
+              <a:spcAft>
+                <a:spcPts val="0"/>
+              </a:spcAft>
+              <a:buNone/>
+            </a:pPr>
+            <a:r>
+              <a:t/>
+            </a:r>
+            <a:endParaRPr/>
+          </a:p>
+        </p:txBody>
+      </p:sp>
+    </p:spTree>
+  </p:cSld>
+  <p:clrMapOvr>
+    <a:masterClrMapping/>
+  </p:clrMapOvr>
+</p:notes>
+</file>
+
+<file path=ppt/notesSlides/notesSlide23.xml><?xml version="1.0" encoding="utf-8"?>
+<p:notes xmlns:a="http://schemas.openxmlformats.org/drawingml/2006/main" xmlns:r="http://schemas.openxmlformats.org/officeDocument/2006/relationships" xmlns:mc="http://schemas.openxmlformats.org/markup-compatibility/2006" xmlns:mv="urn:schemas-microsoft-com:mac:vml" xmlns:p="http://schemas.openxmlformats.org/presentationml/2006/main" xmlns:c="http://schemas.openxmlformats.org/drawingml/2006/chart" xmlns:dgm="http://schemas.openxmlformats.org/drawingml/2006/diagram" xmlns:o="urn:schemas-microsoft-com:office:office" xmlns:v="urn:schemas-microsoft-com:vml" xmlns:pvml="urn:schemas-microsoft-com:office:powerpoint" xmlns:com="http://schemas.openxmlformats.org/drawingml/2006/compatibility" xmlns:p14="http://schemas.microsoft.com/office/powerpoint/2010/main" xmlns:p15="http://schemas.microsoft.com/office/powerpoint/2012/main" xmlns:ahyp="http://schemas.microsoft.com/office/drawing/2018/hyperlinkcolor" showMasterPhAnim="0" showMasterSp="0">
+  <p:cSld>
+    <p:spTree>
+      <p:nvGrpSpPr>
+        <p:cNvPr id="208" name="Shape 208"/>
+        <p:cNvGrpSpPr/>
+        <p:nvPr/>
+      </p:nvGrpSpPr>
+      <p:grpSpPr>
+        <a:xfrm>
+          <a:off x="0" y="0"/>
+          <a:ext cx="0" cy="0"/>
+          <a:chOff x="0" y="0"/>
+          <a:chExt cx="0" cy="0"/>
+        </a:xfrm>
+      </p:grpSpPr>
+      <p:sp>
+        <p:nvSpPr>
+          <p:cNvPr id="209" name="Google Shape;209;g11b3a1e9a09_0_105:notes"/>
+          <p:cNvSpPr/>
+          <p:nvPr>
+            <p:ph idx="2" type="sldImg"/>
+          </p:nvPr>
+        </p:nvSpPr>
+        <p:spPr>
+          <a:xfrm>
+            <a:off x="381300" y="685800"/>
+            <a:ext cx="6096000" cy="3429000"/>
+          </a:xfrm>
+          <a:custGeom>
+            <a:rect b="b" l="l" r="r" t="t"/>
+            <a:pathLst>
+              <a:path extrusionOk="0" h="120000" w="120000">
+                <a:moveTo>
+                  <a:pt x="0" y="0"/>
+                </a:moveTo>
+                <a:lnTo>
+                  <a:pt x="120000" y="0"/>
+                </a:lnTo>
+                <a:lnTo>
+                  <a:pt x="120000" y="120000"/>
+                </a:lnTo>
+                <a:lnTo>
+                  <a:pt x="0" y="120000"/>
+                </a:lnTo>
+                <a:close/>
+              </a:path>
+            </a:pathLst>
+          </a:custGeom>
+        </p:spPr>
+      </p:sp>
+      <p:sp>
+        <p:nvSpPr>
+          <p:cNvPr id="210" name="Google Shape;210;g11b3a1e9a09_0_105:notes"/>
           <p:cNvSpPr txBox="1"/>
           <p:nvPr>
             <p:ph idx="1" type="body"/>
@@ -1250,6 +2653,303 @@
       <p:sp>
         <p:nvSpPr>
           <p:cNvPr id="98" name="Google Shape;98;g1254247731d_0_383:notes"/>
+          <p:cNvSpPr txBox="1"/>
+          <p:nvPr>
+            <p:ph idx="1" type="body"/>
+          </p:nvPr>
+        </p:nvSpPr>
+        <p:spPr>
+          <a:xfrm>
+            <a:off x="685800" y="4343400"/>
+            <a:ext cx="5486400" cy="4114800"/>
+          </a:xfrm>
+          <a:prstGeom prst="rect">
+            <a:avLst/>
+          </a:prstGeom>
+        </p:spPr>
+        <p:txBody>
+          <a:bodyPr anchorCtr="0" anchor="t" bIns="91425" lIns="91425" spcFirstLastPara="1" rIns="91425" wrap="square" tIns="91425">
+            <a:noAutofit/>
+          </a:bodyPr>
+          <a:lstStyle/>
+          <a:p>
+            <a:pPr indent="0" lvl="0" marL="0" rtl="0" algn="l">
+              <a:spcBef>
+                <a:spcPts val="0"/>
+              </a:spcBef>
+              <a:spcAft>
+                <a:spcPts val="0"/>
+              </a:spcAft>
+              <a:buNone/>
+            </a:pPr>
+            <a:r>
+              <a:t/>
+            </a:r>
+            <a:endParaRPr/>
+          </a:p>
+        </p:txBody>
+      </p:sp>
+    </p:spTree>
+  </p:cSld>
+  <p:clrMapOvr>
+    <a:masterClrMapping/>
+  </p:clrMapOvr>
+</p:notes>
+</file>
+
+<file path=ppt/notesSlides/notesSlide7.xml><?xml version="1.0" encoding="utf-8"?>
+<p:notes xmlns:a="http://schemas.openxmlformats.org/drawingml/2006/main" xmlns:r="http://schemas.openxmlformats.org/officeDocument/2006/relationships" xmlns:mc="http://schemas.openxmlformats.org/markup-compatibility/2006" xmlns:mv="urn:schemas-microsoft-com:mac:vml" xmlns:p="http://schemas.openxmlformats.org/presentationml/2006/main" xmlns:c="http://schemas.openxmlformats.org/drawingml/2006/chart" xmlns:dgm="http://schemas.openxmlformats.org/drawingml/2006/diagram" xmlns:o="urn:schemas-microsoft-com:office:office" xmlns:v="urn:schemas-microsoft-com:vml" xmlns:pvml="urn:schemas-microsoft-com:office:powerpoint" xmlns:com="http://schemas.openxmlformats.org/drawingml/2006/compatibility" xmlns:p14="http://schemas.microsoft.com/office/powerpoint/2010/main" xmlns:p15="http://schemas.microsoft.com/office/powerpoint/2012/main" xmlns:ahyp="http://schemas.microsoft.com/office/drawing/2018/hyperlinkcolor" showMasterPhAnim="0" showMasterSp="0">
+  <p:cSld>
+    <p:spTree>
+      <p:nvGrpSpPr>
+        <p:cNvPr id="102" name="Shape 102"/>
+        <p:cNvGrpSpPr/>
+        <p:nvPr/>
+      </p:nvGrpSpPr>
+      <p:grpSpPr>
+        <a:xfrm>
+          <a:off x="0" y="0"/>
+          <a:ext cx="0" cy="0"/>
+          <a:chOff x="0" y="0"/>
+          <a:chExt cx="0" cy="0"/>
+        </a:xfrm>
+      </p:grpSpPr>
+      <p:sp>
+        <p:nvSpPr>
+          <p:cNvPr id="103" name="Google Shape;103;g11b3a1e9a09_0_0:notes"/>
+          <p:cNvSpPr/>
+          <p:nvPr>
+            <p:ph idx="2" type="sldImg"/>
+          </p:nvPr>
+        </p:nvSpPr>
+        <p:spPr>
+          <a:xfrm>
+            <a:off x="381300" y="685800"/>
+            <a:ext cx="6096000" cy="3429000"/>
+          </a:xfrm>
+          <a:custGeom>
+            <a:rect b="b" l="l" r="r" t="t"/>
+            <a:pathLst>
+              <a:path extrusionOk="0" h="120000" w="120000">
+                <a:moveTo>
+                  <a:pt x="0" y="0"/>
+                </a:moveTo>
+                <a:lnTo>
+                  <a:pt x="120000" y="0"/>
+                </a:lnTo>
+                <a:lnTo>
+                  <a:pt x="120000" y="120000"/>
+                </a:lnTo>
+                <a:lnTo>
+                  <a:pt x="0" y="120000"/>
+                </a:lnTo>
+                <a:close/>
+              </a:path>
+            </a:pathLst>
+          </a:custGeom>
+        </p:spPr>
+      </p:sp>
+      <p:sp>
+        <p:nvSpPr>
+          <p:cNvPr id="104" name="Google Shape;104;g11b3a1e9a09_0_0:notes"/>
+          <p:cNvSpPr txBox="1"/>
+          <p:nvPr>
+            <p:ph idx="1" type="body"/>
+          </p:nvPr>
+        </p:nvSpPr>
+        <p:spPr>
+          <a:xfrm>
+            <a:off x="685800" y="4343400"/>
+            <a:ext cx="5486400" cy="4114800"/>
+          </a:xfrm>
+          <a:prstGeom prst="rect">
+            <a:avLst/>
+          </a:prstGeom>
+        </p:spPr>
+        <p:txBody>
+          <a:bodyPr anchorCtr="0" anchor="t" bIns="91425" lIns="91425" spcFirstLastPara="1" rIns="91425" wrap="square" tIns="91425">
+            <a:noAutofit/>
+          </a:bodyPr>
+          <a:lstStyle/>
+          <a:p>
+            <a:pPr indent="0" lvl="0" marL="0" rtl="0" algn="l">
+              <a:spcBef>
+                <a:spcPts val="0"/>
+              </a:spcBef>
+              <a:spcAft>
+                <a:spcPts val="0"/>
+              </a:spcAft>
+              <a:buNone/>
+            </a:pPr>
+            <a:r>
+              <a:t/>
+            </a:r>
+            <a:endParaRPr/>
+          </a:p>
+        </p:txBody>
+      </p:sp>
+    </p:spTree>
+  </p:cSld>
+  <p:clrMapOvr>
+    <a:masterClrMapping/>
+  </p:clrMapOvr>
+</p:notes>
+</file>
+
+<file path=ppt/notesSlides/notesSlide8.xml><?xml version="1.0" encoding="utf-8"?>
+<p:notes xmlns:a="http://schemas.openxmlformats.org/drawingml/2006/main" xmlns:r="http://schemas.openxmlformats.org/officeDocument/2006/relationships" xmlns:mc="http://schemas.openxmlformats.org/markup-compatibility/2006" xmlns:mv="urn:schemas-microsoft-com:mac:vml" xmlns:p="http://schemas.openxmlformats.org/presentationml/2006/main" xmlns:c="http://schemas.openxmlformats.org/drawingml/2006/chart" xmlns:dgm="http://schemas.openxmlformats.org/drawingml/2006/diagram" xmlns:o="urn:schemas-microsoft-com:office:office" xmlns:v="urn:schemas-microsoft-com:vml" xmlns:pvml="urn:schemas-microsoft-com:office:powerpoint" xmlns:com="http://schemas.openxmlformats.org/drawingml/2006/compatibility" xmlns:p14="http://schemas.microsoft.com/office/powerpoint/2010/main" xmlns:p15="http://schemas.microsoft.com/office/powerpoint/2012/main" xmlns:ahyp="http://schemas.microsoft.com/office/drawing/2018/hyperlinkcolor" showMasterPhAnim="0" showMasterSp="0">
+  <p:cSld>
+    <p:spTree>
+      <p:nvGrpSpPr>
+        <p:cNvPr id="109" name="Shape 109"/>
+        <p:cNvGrpSpPr/>
+        <p:nvPr/>
+      </p:nvGrpSpPr>
+      <p:grpSpPr>
+        <a:xfrm>
+          <a:off x="0" y="0"/>
+          <a:ext cx="0" cy="0"/>
+          <a:chOff x="0" y="0"/>
+          <a:chExt cx="0" cy="0"/>
+        </a:xfrm>
+      </p:grpSpPr>
+      <p:sp>
+        <p:nvSpPr>
+          <p:cNvPr id="110" name="Google Shape;110;g11b3a1e9a09_0_8:notes"/>
+          <p:cNvSpPr/>
+          <p:nvPr>
+            <p:ph idx="2" type="sldImg"/>
+          </p:nvPr>
+        </p:nvSpPr>
+        <p:spPr>
+          <a:xfrm>
+            <a:off x="381300" y="685800"/>
+            <a:ext cx="6096000" cy="3429000"/>
+          </a:xfrm>
+          <a:custGeom>
+            <a:rect b="b" l="l" r="r" t="t"/>
+            <a:pathLst>
+              <a:path extrusionOk="0" h="120000" w="120000">
+                <a:moveTo>
+                  <a:pt x="0" y="0"/>
+                </a:moveTo>
+                <a:lnTo>
+                  <a:pt x="120000" y="0"/>
+                </a:lnTo>
+                <a:lnTo>
+                  <a:pt x="120000" y="120000"/>
+                </a:lnTo>
+                <a:lnTo>
+                  <a:pt x="0" y="120000"/>
+                </a:lnTo>
+                <a:close/>
+              </a:path>
+            </a:pathLst>
+          </a:custGeom>
+        </p:spPr>
+      </p:sp>
+      <p:sp>
+        <p:nvSpPr>
+          <p:cNvPr id="111" name="Google Shape;111;g11b3a1e9a09_0_8:notes"/>
+          <p:cNvSpPr txBox="1"/>
+          <p:nvPr>
+            <p:ph idx="1" type="body"/>
+          </p:nvPr>
+        </p:nvSpPr>
+        <p:spPr>
+          <a:xfrm>
+            <a:off x="685800" y="4343400"/>
+            <a:ext cx="5486400" cy="4114800"/>
+          </a:xfrm>
+          <a:prstGeom prst="rect">
+            <a:avLst/>
+          </a:prstGeom>
+        </p:spPr>
+        <p:txBody>
+          <a:bodyPr anchorCtr="0" anchor="t" bIns="91425" lIns="91425" spcFirstLastPara="1" rIns="91425" wrap="square" tIns="91425">
+            <a:noAutofit/>
+          </a:bodyPr>
+          <a:lstStyle/>
+          <a:p>
+            <a:pPr indent="0" lvl="0" marL="0" rtl="0" algn="l">
+              <a:spcBef>
+                <a:spcPts val="0"/>
+              </a:spcBef>
+              <a:spcAft>
+                <a:spcPts val="0"/>
+              </a:spcAft>
+              <a:buNone/>
+            </a:pPr>
+            <a:r>
+              <a:t/>
+            </a:r>
+            <a:endParaRPr/>
+          </a:p>
+        </p:txBody>
+      </p:sp>
+    </p:spTree>
+  </p:cSld>
+  <p:clrMapOvr>
+    <a:masterClrMapping/>
+  </p:clrMapOvr>
+</p:notes>
+</file>
+
+<file path=ppt/notesSlides/notesSlide9.xml><?xml version="1.0" encoding="utf-8"?>
+<p:notes xmlns:a="http://schemas.openxmlformats.org/drawingml/2006/main" xmlns:r="http://schemas.openxmlformats.org/officeDocument/2006/relationships" xmlns:mc="http://schemas.openxmlformats.org/markup-compatibility/2006" xmlns:mv="urn:schemas-microsoft-com:mac:vml" xmlns:p="http://schemas.openxmlformats.org/presentationml/2006/main" xmlns:c="http://schemas.openxmlformats.org/drawingml/2006/chart" xmlns:dgm="http://schemas.openxmlformats.org/drawingml/2006/diagram" xmlns:o="urn:schemas-microsoft-com:office:office" xmlns:v="urn:schemas-microsoft-com:vml" xmlns:pvml="urn:schemas-microsoft-com:office:powerpoint" xmlns:com="http://schemas.openxmlformats.org/drawingml/2006/compatibility" xmlns:p14="http://schemas.microsoft.com/office/powerpoint/2010/main" xmlns:p15="http://schemas.microsoft.com/office/powerpoint/2012/main" xmlns:ahyp="http://schemas.microsoft.com/office/drawing/2018/hyperlinkcolor" showMasterPhAnim="0" showMasterSp="0">
+  <p:cSld>
+    <p:spTree>
+      <p:nvGrpSpPr>
+        <p:cNvPr id="115" name="Shape 115"/>
+        <p:cNvGrpSpPr/>
+        <p:nvPr/>
+      </p:nvGrpSpPr>
+      <p:grpSpPr>
+        <a:xfrm>
+          <a:off x="0" y="0"/>
+          <a:ext cx="0" cy="0"/>
+          <a:chOff x="0" y="0"/>
+          <a:chExt cx="0" cy="0"/>
+        </a:xfrm>
+      </p:grpSpPr>
+      <p:sp>
+        <p:nvSpPr>
+          <p:cNvPr id="116" name="Google Shape;116;g11b3a1e9a09_0_13:notes"/>
+          <p:cNvSpPr/>
+          <p:nvPr>
+            <p:ph idx="2" type="sldImg"/>
+          </p:nvPr>
+        </p:nvSpPr>
+        <p:spPr>
+          <a:xfrm>
+            <a:off x="381300" y="685800"/>
+            <a:ext cx="6096000" cy="3429000"/>
+          </a:xfrm>
+          <a:custGeom>
+            <a:rect b="b" l="l" r="r" t="t"/>
+            <a:pathLst>
+              <a:path extrusionOk="0" h="120000" w="120000">
+                <a:moveTo>
+                  <a:pt x="0" y="0"/>
+                </a:moveTo>
+                <a:lnTo>
+                  <a:pt x="120000" y="0"/>
+                </a:lnTo>
+                <a:lnTo>
+                  <a:pt x="120000" y="120000"/>
+                </a:lnTo>
+                <a:lnTo>
+                  <a:pt x="0" y="120000"/>
+                </a:lnTo>
+                <a:close/>
+              </a:path>
+            </a:pathLst>
+          </a:custGeom>
+        </p:spPr>
+      </p:sp>
+      <p:sp>
+        <p:nvSpPr>
+          <p:cNvPr id="117" name="Google Shape;117;g11b3a1e9a09_0_13:notes"/>
           <p:cNvSpPr txBox="1"/>
           <p:nvPr>
             <p:ph idx="1" type="body"/>
@@ -7308,6 +9008,1167 @@
 </p:sld>
 </file>
 
+<file path=ppt/slides/slide10.xml><?xml version="1.0" encoding="utf-8"?>
+<p:sld xmlns:a="http://schemas.openxmlformats.org/drawingml/2006/main" xmlns:r="http://schemas.openxmlformats.org/officeDocument/2006/relationships" xmlns:mc="http://schemas.openxmlformats.org/markup-compatibility/2006" xmlns:mv="urn:schemas-microsoft-com:mac:vml" xmlns:p="http://schemas.openxmlformats.org/presentationml/2006/main" xmlns:c="http://schemas.openxmlformats.org/drawingml/2006/chart" xmlns:dgm="http://schemas.openxmlformats.org/drawingml/2006/diagram" xmlns:o="urn:schemas-microsoft-com:office:office" xmlns:v="urn:schemas-microsoft-com:vml" xmlns:pvml="urn:schemas-microsoft-com:office:powerpoint" xmlns:com="http://schemas.openxmlformats.org/drawingml/2006/compatibility" xmlns:p14="http://schemas.microsoft.com/office/powerpoint/2010/main" xmlns:p15="http://schemas.microsoft.com/office/powerpoint/2012/main" xmlns:ahyp="http://schemas.microsoft.com/office/drawing/2018/hyperlinkcolor">
+  <p:cSld>
+    <p:spTree>
+      <p:nvGrpSpPr>
+        <p:cNvPr id="129" name="Shape 129"/>
+        <p:cNvGrpSpPr/>
+        <p:nvPr/>
+      </p:nvGrpSpPr>
+      <p:grpSpPr>
+        <a:xfrm>
+          <a:off x="0" y="0"/>
+          <a:ext cx="0" cy="0"/>
+          <a:chOff x="0" y="0"/>
+          <a:chExt cx="0" cy="0"/>
+        </a:xfrm>
+      </p:grpSpPr>
+      <p:sp>
+        <p:nvSpPr>
+          <p:cNvPr id="130" name="Google Shape;130;p22"/>
+          <p:cNvSpPr txBox="1"/>
+          <p:nvPr>
+            <p:ph type="title"/>
+          </p:nvPr>
+        </p:nvSpPr>
+        <p:spPr>
+          <a:xfrm>
+            <a:off x="226078" y="357800"/>
+            <a:ext cx="2808000" cy="953400"/>
+          </a:xfrm>
+          <a:prstGeom prst="rect">
+            <a:avLst/>
+          </a:prstGeom>
+        </p:spPr>
+        <p:txBody>
+          <a:bodyPr anchorCtr="0" anchor="b" bIns="91425" lIns="91425" spcFirstLastPara="1" rIns="91425" wrap="square" tIns="91425">
+            <a:normAutofit/>
+          </a:bodyPr>
+          <a:lstStyle/>
+          <a:p>
+            <a:pPr indent="0" lvl="0" marL="0" rtl="0" algn="l">
+              <a:spcBef>
+                <a:spcPts val="0"/>
+              </a:spcBef>
+              <a:spcAft>
+                <a:spcPts val="0"/>
+              </a:spcAft>
+              <a:buNone/>
+            </a:pPr>
+            <a:r>
+              <a:rPr lang="ru"/>
+              <a:t>Шаблоны</a:t>
+            </a:r>
+            <a:endParaRPr/>
+          </a:p>
+        </p:txBody>
+      </p:sp>
+      <p:sp>
+        <p:nvSpPr>
+          <p:cNvPr id="131" name="Google Shape;131;p22"/>
+          <p:cNvSpPr txBox="1"/>
+          <p:nvPr>
+            <p:ph idx="1" type="body"/>
+          </p:nvPr>
+        </p:nvSpPr>
+        <p:spPr>
+          <a:xfrm>
+            <a:off x="3506675" y="357800"/>
+            <a:ext cx="5418600" cy="4578600"/>
+          </a:xfrm>
+          <a:prstGeom prst="rect">
+            <a:avLst/>
+          </a:prstGeom>
+        </p:spPr>
+        <p:txBody>
+          <a:bodyPr anchorCtr="0" anchor="t" bIns="91425" lIns="91425" spcFirstLastPara="1" rIns="91425" wrap="square" tIns="91425">
+            <a:normAutofit/>
+          </a:bodyPr>
+          <a:lstStyle/>
+          <a:p>
+            <a:pPr indent="-304800" lvl="0" marL="457200" rtl="0" algn="l">
+              <a:spcBef>
+                <a:spcPts val="0"/>
+              </a:spcBef>
+              <a:spcAft>
+                <a:spcPts val="0"/>
+              </a:spcAft>
+              <a:buClr>
+                <a:schemeClr val="dk2"/>
+              </a:buClr>
+              <a:buSzPts val="1200"/>
+              <a:buChar char="●"/>
+            </a:pPr>
+            <a:r>
+              <a:rPr lang="ru">
+                <a:solidFill>
+                  <a:schemeClr val="dk2"/>
+                </a:solidFill>
+              </a:rPr>
+              <a:t>html</a:t>
+            </a:r>
+            <a:endParaRPr>
+              <a:solidFill>
+                <a:schemeClr val="dk2"/>
+              </a:solidFill>
+            </a:endParaRPr>
+          </a:p>
+          <a:p>
+            <a:pPr indent="-304800" lvl="1" marL="914400" rtl="0" algn="l">
+              <a:spcBef>
+                <a:spcPts val="0"/>
+              </a:spcBef>
+              <a:spcAft>
+                <a:spcPts val="0"/>
+              </a:spcAft>
+              <a:buClr>
+                <a:schemeClr val="dk2"/>
+              </a:buClr>
+              <a:buSzPts val="1200"/>
+              <a:buChar char="○"/>
+            </a:pPr>
+            <a:r>
+              <a:rPr lang="ru">
+                <a:solidFill>
+                  <a:schemeClr val="dk2"/>
+                </a:solidFill>
+              </a:rPr>
+              <a:t>head</a:t>
+            </a:r>
+            <a:endParaRPr>
+              <a:solidFill>
+                <a:schemeClr val="dk2"/>
+              </a:solidFill>
+            </a:endParaRPr>
+          </a:p>
+          <a:p>
+            <a:pPr indent="-304800" lvl="2" marL="1371600" rtl="0" algn="l">
+              <a:spcBef>
+                <a:spcPts val="0"/>
+              </a:spcBef>
+              <a:spcAft>
+                <a:spcPts val="0"/>
+              </a:spcAft>
+              <a:buClr>
+                <a:schemeClr val="dk2"/>
+              </a:buClr>
+              <a:buSzPts val="1200"/>
+              <a:buChar char="■"/>
+            </a:pPr>
+            <a:r>
+              <a:rPr lang="ru">
+                <a:solidFill>
+                  <a:schemeClr val="dk2"/>
+                </a:solidFill>
+              </a:rPr>
+              <a:t>{% styles %}</a:t>
+            </a:r>
+            <a:endParaRPr>
+              <a:solidFill>
+                <a:schemeClr val="dk2"/>
+              </a:solidFill>
+            </a:endParaRPr>
+          </a:p>
+          <a:p>
+            <a:pPr indent="-304800" lvl="2" marL="1371600" rtl="0" algn="l">
+              <a:spcBef>
+                <a:spcPts val="0"/>
+              </a:spcBef>
+              <a:spcAft>
+                <a:spcPts val="0"/>
+              </a:spcAft>
+              <a:buClr>
+                <a:schemeClr val="dk2"/>
+              </a:buClr>
+              <a:buSzPts val="1200"/>
+              <a:buChar char="■"/>
+            </a:pPr>
+            <a:r>
+              <a:rPr lang="ru">
+                <a:solidFill>
+                  <a:schemeClr val="dk2"/>
+                </a:solidFill>
+              </a:rPr>
+              <a:t>{% title%}</a:t>
+            </a:r>
+            <a:endParaRPr>
+              <a:solidFill>
+                <a:schemeClr val="dk2"/>
+              </a:solidFill>
+            </a:endParaRPr>
+          </a:p>
+          <a:p>
+            <a:pPr indent="-304800" lvl="1" marL="914400" rtl="0" algn="l">
+              <a:spcBef>
+                <a:spcPts val="0"/>
+              </a:spcBef>
+              <a:spcAft>
+                <a:spcPts val="0"/>
+              </a:spcAft>
+              <a:buClr>
+                <a:schemeClr val="dk2"/>
+              </a:buClr>
+              <a:buSzPts val="1200"/>
+              <a:buChar char="○"/>
+            </a:pPr>
+            <a:r>
+              <a:rPr lang="ru">
+                <a:solidFill>
+                  <a:schemeClr val="dk2"/>
+                </a:solidFill>
+              </a:rPr>
+              <a:t>body</a:t>
+            </a:r>
+            <a:endParaRPr>
+              <a:solidFill>
+                <a:schemeClr val="dk2"/>
+              </a:solidFill>
+            </a:endParaRPr>
+          </a:p>
+          <a:p>
+            <a:pPr indent="-304800" lvl="2" marL="1371600" rtl="0" algn="l">
+              <a:spcBef>
+                <a:spcPts val="0"/>
+              </a:spcBef>
+              <a:spcAft>
+                <a:spcPts val="0"/>
+              </a:spcAft>
+              <a:buClr>
+                <a:schemeClr val="dk2"/>
+              </a:buClr>
+              <a:buSzPts val="1200"/>
+              <a:buChar char="■"/>
+            </a:pPr>
+            <a:r>
+              <a:rPr lang="ru">
+                <a:solidFill>
+                  <a:schemeClr val="dk2"/>
+                </a:solidFill>
+              </a:rPr>
+              <a:t>{% header %}</a:t>
+            </a:r>
+            <a:endParaRPr>
+              <a:solidFill>
+                <a:schemeClr val="dk2"/>
+              </a:solidFill>
+            </a:endParaRPr>
+          </a:p>
+          <a:p>
+            <a:pPr indent="-304800" lvl="2" marL="1371600" rtl="0" algn="l">
+              <a:spcBef>
+                <a:spcPts val="0"/>
+              </a:spcBef>
+              <a:spcAft>
+                <a:spcPts val="0"/>
+              </a:spcAft>
+              <a:buClr>
+                <a:schemeClr val="dk2"/>
+              </a:buClr>
+              <a:buSzPts val="1200"/>
+              <a:buChar char="■"/>
+            </a:pPr>
+            <a:r>
+              <a:rPr lang="ru">
+                <a:solidFill>
+                  <a:schemeClr val="dk2"/>
+                </a:solidFill>
+              </a:rPr>
+              <a:t>{% content %}</a:t>
+            </a:r>
+            <a:endParaRPr>
+              <a:solidFill>
+                <a:schemeClr val="dk2"/>
+              </a:solidFill>
+            </a:endParaRPr>
+          </a:p>
+          <a:p>
+            <a:pPr indent="-304800" lvl="1" marL="914400" rtl="0" algn="l">
+              <a:spcBef>
+                <a:spcPts val="0"/>
+              </a:spcBef>
+              <a:spcAft>
+                <a:spcPts val="0"/>
+              </a:spcAft>
+              <a:buClr>
+                <a:schemeClr val="dk2"/>
+              </a:buClr>
+              <a:buSzPts val="1200"/>
+              <a:buChar char="○"/>
+            </a:pPr>
+            <a:r>
+              <a:rPr lang="ru">
+                <a:solidFill>
+                  <a:schemeClr val="dk2"/>
+                </a:solidFill>
+              </a:rPr>
+              <a:t>footer</a:t>
+            </a:r>
+            <a:endParaRPr>
+              <a:solidFill>
+                <a:schemeClr val="dk2"/>
+              </a:solidFill>
+            </a:endParaRPr>
+          </a:p>
+        </p:txBody>
+      </p:sp>
+      <p:sp>
+        <p:nvSpPr>
+          <p:cNvPr id="132" name="Google Shape;132;p22"/>
+          <p:cNvSpPr txBox="1"/>
+          <p:nvPr>
+            <p:ph idx="1" type="body"/>
+          </p:nvPr>
+        </p:nvSpPr>
+        <p:spPr>
+          <a:xfrm>
+            <a:off x="226075" y="1311200"/>
+            <a:ext cx="2808000" cy="3625200"/>
+          </a:xfrm>
+          <a:prstGeom prst="rect">
+            <a:avLst/>
+          </a:prstGeom>
+        </p:spPr>
+        <p:txBody>
+          <a:bodyPr anchorCtr="0" anchor="t" bIns="91425" lIns="91425" spcFirstLastPara="1" rIns="91425" wrap="square" tIns="91425">
+            <a:normAutofit/>
+          </a:bodyPr>
+          <a:lstStyle/>
+          <a:p>
+            <a:pPr indent="0" lvl="0" marL="0" rtl="0" algn="l">
+              <a:spcBef>
+                <a:spcPts val="0"/>
+              </a:spcBef>
+              <a:spcAft>
+                <a:spcPts val="1200"/>
+              </a:spcAft>
+              <a:buNone/>
+            </a:pPr>
+            <a:r>
+              <a:rPr lang="ru"/>
+              <a:t>Избавляют от повторений при верстке, ускоряют разработку</a:t>
+            </a:r>
+            <a:endParaRPr/>
+          </a:p>
+        </p:txBody>
+      </p:sp>
+    </p:spTree>
+  </p:cSld>
+  <p:clrMapOvr>
+    <a:masterClrMapping/>
+  </p:clrMapOvr>
+</p:sld>
+</file>
+
+<file path=ppt/slides/slide11.xml><?xml version="1.0" encoding="utf-8"?>
+<p:sld xmlns:a="http://schemas.openxmlformats.org/drawingml/2006/main" xmlns:r="http://schemas.openxmlformats.org/officeDocument/2006/relationships" xmlns:mc="http://schemas.openxmlformats.org/markup-compatibility/2006" xmlns:mv="urn:schemas-microsoft-com:mac:vml" xmlns:p="http://schemas.openxmlformats.org/presentationml/2006/main" xmlns:c="http://schemas.openxmlformats.org/drawingml/2006/chart" xmlns:dgm="http://schemas.openxmlformats.org/drawingml/2006/diagram" xmlns:o="urn:schemas-microsoft-com:office:office" xmlns:v="urn:schemas-microsoft-com:vml" xmlns:pvml="urn:schemas-microsoft-com:office:powerpoint" xmlns:com="http://schemas.openxmlformats.org/drawingml/2006/compatibility" xmlns:p14="http://schemas.microsoft.com/office/powerpoint/2010/main" xmlns:p15="http://schemas.microsoft.com/office/powerpoint/2012/main" xmlns:ahyp="http://schemas.microsoft.com/office/drawing/2018/hyperlinkcolor">
+  <p:cSld>
+    <p:spTree>
+      <p:nvGrpSpPr>
+        <p:cNvPr id="136" name="Shape 136"/>
+        <p:cNvGrpSpPr/>
+        <p:nvPr/>
+      </p:nvGrpSpPr>
+      <p:grpSpPr>
+        <a:xfrm>
+          <a:off x="0" y="0"/>
+          <a:ext cx="0" cy="0"/>
+          <a:chOff x="0" y="0"/>
+          <a:chExt cx="0" cy="0"/>
+        </a:xfrm>
+      </p:grpSpPr>
+      <p:sp>
+        <p:nvSpPr>
+          <p:cNvPr id="137" name="Google Shape;137;p23"/>
+          <p:cNvSpPr txBox="1"/>
+          <p:nvPr>
+            <p:ph type="title"/>
+          </p:nvPr>
+        </p:nvSpPr>
+        <p:spPr>
+          <a:xfrm>
+            <a:off x="98250" y="16350"/>
+            <a:ext cx="8826600" cy="602700"/>
+          </a:xfrm>
+          <a:prstGeom prst="rect">
+            <a:avLst/>
+          </a:prstGeom>
+        </p:spPr>
+        <p:txBody>
+          <a:bodyPr anchorCtr="0" anchor="ctr" bIns="91425" lIns="91425" spcFirstLastPara="1" rIns="91425" wrap="square" tIns="91425">
+            <a:normAutofit/>
+          </a:bodyPr>
+          <a:lstStyle/>
+          <a:p>
+            <a:pPr indent="0" lvl="0" marL="0" rtl="0" algn="ctr">
+              <a:spcBef>
+                <a:spcPts val="0"/>
+              </a:spcBef>
+              <a:spcAft>
+                <a:spcPts val="0"/>
+              </a:spcAft>
+              <a:buNone/>
+            </a:pPr>
+            <a:r>
+              <a:rPr lang="ru"/>
+              <a:t>Шаблоны</a:t>
+            </a:r>
+            <a:endParaRPr/>
+          </a:p>
+        </p:txBody>
+      </p:sp>
+      <p:pic>
+        <p:nvPicPr>
+          <p:cNvPr id="138" name="Google Shape;138;p23"/>
+          <p:cNvPicPr preferRelativeResize="0"/>
+          <p:nvPr/>
+        </p:nvPicPr>
+        <p:blipFill>
+          <a:blip r:embed="rId3">
+            <a:alphaModFix/>
+          </a:blip>
+          <a:stretch>
+            <a:fillRect/>
+          </a:stretch>
+        </p:blipFill>
+        <p:spPr>
+          <a:xfrm>
+            <a:off x="281488" y="792275"/>
+            <a:ext cx="8581020" cy="4219649"/>
+          </a:xfrm>
+          <a:prstGeom prst="rect">
+            <a:avLst/>
+          </a:prstGeom>
+          <a:noFill/>
+          <a:ln>
+            <a:noFill/>
+          </a:ln>
+        </p:spPr>
+      </p:pic>
+    </p:spTree>
+  </p:cSld>
+  <p:clrMapOvr>
+    <a:masterClrMapping/>
+  </p:clrMapOvr>
+</p:sld>
+</file>
+
+<file path=ppt/slides/slide12.xml><?xml version="1.0" encoding="utf-8"?>
+<p:sld xmlns:a="http://schemas.openxmlformats.org/drawingml/2006/main" xmlns:r="http://schemas.openxmlformats.org/officeDocument/2006/relationships" xmlns:mc="http://schemas.openxmlformats.org/markup-compatibility/2006" xmlns:mv="urn:schemas-microsoft-com:mac:vml" xmlns:p="http://schemas.openxmlformats.org/presentationml/2006/main" xmlns:c="http://schemas.openxmlformats.org/drawingml/2006/chart" xmlns:dgm="http://schemas.openxmlformats.org/drawingml/2006/diagram" xmlns:o="urn:schemas-microsoft-com:office:office" xmlns:v="urn:schemas-microsoft-com:vml" xmlns:pvml="urn:schemas-microsoft-com:office:powerpoint" xmlns:com="http://schemas.openxmlformats.org/drawingml/2006/compatibility" xmlns:p14="http://schemas.microsoft.com/office/powerpoint/2010/main" xmlns:p15="http://schemas.microsoft.com/office/powerpoint/2012/main" xmlns:ahyp="http://schemas.microsoft.com/office/drawing/2018/hyperlinkcolor">
+  <p:cSld>
+    <p:spTree>
+      <p:nvGrpSpPr>
+        <p:cNvPr id="142" name="Shape 142"/>
+        <p:cNvGrpSpPr/>
+        <p:nvPr/>
+      </p:nvGrpSpPr>
+      <p:grpSpPr>
+        <a:xfrm>
+          <a:off x="0" y="0"/>
+          <a:ext cx="0" cy="0"/>
+          <a:chOff x="0" y="0"/>
+          <a:chExt cx="0" cy="0"/>
+        </a:xfrm>
+      </p:grpSpPr>
+      <p:sp>
+        <p:nvSpPr>
+          <p:cNvPr id="143" name="Google Shape;143;p24"/>
+          <p:cNvSpPr txBox="1"/>
+          <p:nvPr>
+            <p:ph type="title"/>
+          </p:nvPr>
+        </p:nvSpPr>
+        <p:spPr>
+          <a:xfrm>
+            <a:off x="98250" y="16350"/>
+            <a:ext cx="8826600" cy="602700"/>
+          </a:xfrm>
+          <a:prstGeom prst="rect">
+            <a:avLst/>
+          </a:prstGeom>
+        </p:spPr>
+        <p:txBody>
+          <a:bodyPr anchorCtr="0" anchor="ctr" bIns="91425" lIns="91425" spcFirstLastPara="1" rIns="91425" wrap="square" tIns="91425">
+            <a:normAutofit/>
+          </a:bodyPr>
+          <a:lstStyle/>
+          <a:p>
+            <a:pPr indent="0" lvl="0" marL="0" rtl="0" algn="ctr">
+              <a:spcBef>
+                <a:spcPts val="0"/>
+              </a:spcBef>
+              <a:spcAft>
+                <a:spcPts val="0"/>
+              </a:spcAft>
+              <a:buNone/>
+            </a:pPr>
+            <a:r>
+              <a:rPr lang="ru"/>
+              <a:t>Шаблоны</a:t>
+            </a:r>
+            <a:endParaRPr/>
+          </a:p>
+        </p:txBody>
+      </p:sp>
+      <p:pic>
+        <p:nvPicPr>
+          <p:cNvPr id="144" name="Google Shape;144;p24"/>
+          <p:cNvPicPr preferRelativeResize="0"/>
+          <p:nvPr/>
+        </p:nvPicPr>
+        <p:blipFill>
+          <a:blip r:embed="rId3">
+            <a:alphaModFix/>
+          </a:blip>
+          <a:stretch>
+            <a:fillRect/>
+          </a:stretch>
+        </p:blipFill>
+        <p:spPr>
+          <a:xfrm>
+            <a:off x="852000" y="785700"/>
+            <a:ext cx="7439999" cy="4261174"/>
+          </a:xfrm>
+          <a:prstGeom prst="rect">
+            <a:avLst/>
+          </a:prstGeom>
+          <a:noFill/>
+          <a:ln>
+            <a:noFill/>
+          </a:ln>
+        </p:spPr>
+      </p:pic>
+    </p:spTree>
+  </p:cSld>
+  <p:clrMapOvr>
+    <a:masterClrMapping/>
+  </p:clrMapOvr>
+</p:sld>
+</file>
+
+<file path=ppt/slides/slide13.xml><?xml version="1.0" encoding="utf-8"?>
+<p:sld xmlns:a="http://schemas.openxmlformats.org/drawingml/2006/main" xmlns:r="http://schemas.openxmlformats.org/officeDocument/2006/relationships" xmlns:mc="http://schemas.openxmlformats.org/markup-compatibility/2006" xmlns:mv="urn:schemas-microsoft-com:mac:vml" xmlns:p="http://schemas.openxmlformats.org/presentationml/2006/main" xmlns:c="http://schemas.openxmlformats.org/drawingml/2006/chart" xmlns:dgm="http://schemas.openxmlformats.org/drawingml/2006/diagram" xmlns:o="urn:schemas-microsoft-com:office:office" xmlns:v="urn:schemas-microsoft-com:vml" xmlns:pvml="urn:schemas-microsoft-com:office:powerpoint" xmlns:com="http://schemas.openxmlformats.org/drawingml/2006/compatibility" xmlns:p14="http://schemas.microsoft.com/office/powerpoint/2010/main" xmlns:p15="http://schemas.microsoft.com/office/powerpoint/2012/main" xmlns:ahyp="http://schemas.microsoft.com/office/drawing/2018/hyperlinkcolor">
+  <p:cSld>
+    <p:spTree>
+      <p:nvGrpSpPr>
+        <p:cNvPr id="148" name="Shape 148"/>
+        <p:cNvGrpSpPr/>
+        <p:nvPr/>
+      </p:nvGrpSpPr>
+      <p:grpSpPr>
+        <a:xfrm>
+          <a:off x="0" y="0"/>
+          <a:ext cx="0" cy="0"/>
+          <a:chOff x="0" y="0"/>
+          <a:chExt cx="0" cy="0"/>
+        </a:xfrm>
+      </p:grpSpPr>
+      <p:sp>
+        <p:nvSpPr>
+          <p:cNvPr id="149" name="Google Shape;149;p25"/>
+          <p:cNvSpPr txBox="1"/>
+          <p:nvPr>
+            <p:ph type="title"/>
+          </p:nvPr>
+        </p:nvSpPr>
+        <p:spPr>
+          <a:xfrm>
+            <a:off x="98250" y="16350"/>
+            <a:ext cx="8826600" cy="602700"/>
+          </a:xfrm>
+          <a:prstGeom prst="rect">
+            <a:avLst/>
+          </a:prstGeom>
+        </p:spPr>
+        <p:txBody>
+          <a:bodyPr anchorCtr="0" anchor="ctr" bIns="91425" lIns="91425" spcFirstLastPara="1" rIns="91425" wrap="square" tIns="91425">
+            <a:normAutofit/>
+          </a:bodyPr>
+          <a:lstStyle/>
+          <a:p>
+            <a:pPr indent="0" lvl="0" marL="0" rtl="0" algn="ctr">
+              <a:spcBef>
+                <a:spcPts val="0"/>
+              </a:spcBef>
+              <a:spcAft>
+                <a:spcPts val="0"/>
+              </a:spcAft>
+              <a:buNone/>
+            </a:pPr>
+            <a:r>
+              <a:rPr lang="ru"/>
+              <a:t>ORM-модели</a:t>
+            </a:r>
+            <a:endParaRPr/>
+          </a:p>
+        </p:txBody>
+      </p:sp>
+      <p:pic>
+        <p:nvPicPr>
+          <p:cNvPr id="150" name="Google Shape;150;p25"/>
+          <p:cNvPicPr preferRelativeResize="0"/>
+          <p:nvPr/>
+        </p:nvPicPr>
+        <p:blipFill>
+          <a:blip r:embed="rId3">
+            <a:alphaModFix/>
+          </a:blip>
+          <a:stretch>
+            <a:fillRect/>
+          </a:stretch>
+        </p:blipFill>
+        <p:spPr>
+          <a:xfrm>
+            <a:off x="1322838" y="771425"/>
+            <a:ext cx="6377424" cy="4219649"/>
+          </a:xfrm>
+          <a:prstGeom prst="rect">
+            <a:avLst/>
+          </a:prstGeom>
+          <a:noFill/>
+          <a:ln>
+            <a:noFill/>
+          </a:ln>
+        </p:spPr>
+      </p:pic>
+    </p:spTree>
+  </p:cSld>
+  <p:clrMapOvr>
+    <a:masterClrMapping/>
+  </p:clrMapOvr>
+</p:sld>
+</file>
+
+<file path=ppt/slides/slide14.xml><?xml version="1.0" encoding="utf-8"?>
+<p:sld xmlns:a="http://schemas.openxmlformats.org/drawingml/2006/main" xmlns:r="http://schemas.openxmlformats.org/officeDocument/2006/relationships" xmlns:mc="http://schemas.openxmlformats.org/markup-compatibility/2006" xmlns:mv="urn:schemas-microsoft-com:mac:vml" xmlns:p="http://schemas.openxmlformats.org/presentationml/2006/main" xmlns:c="http://schemas.openxmlformats.org/drawingml/2006/chart" xmlns:dgm="http://schemas.openxmlformats.org/drawingml/2006/diagram" xmlns:o="urn:schemas-microsoft-com:office:office" xmlns:v="urn:schemas-microsoft-com:vml" xmlns:pvml="urn:schemas-microsoft-com:office:powerpoint" xmlns:com="http://schemas.openxmlformats.org/drawingml/2006/compatibility" xmlns:p14="http://schemas.microsoft.com/office/powerpoint/2010/main" xmlns:p15="http://schemas.microsoft.com/office/powerpoint/2012/main" xmlns:ahyp="http://schemas.microsoft.com/office/drawing/2018/hyperlinkcolor">
+  <p:cSld>
+    <p:spTree>
+      <p:nvGrpSpPr>
+        <p:cNvPr id="154" name="Shape 154"/>
+        <p:cNvGrpSpPr/>
+        <p:nvPr/>
+      </p:nvGrpSpPr>
+      <p:grpSpPr>
+        <a:xfrm>
+          <a:off x="0" y="0"/>
+          <a:ext cx="0" cy="0"/>
+          <a:chOff x="0" y="0"/>
+          <a:chExt cx="0" cy="0"/>
+        </a:xfrm>
+      </p:grpSpPr>
+      <p:sp>
+        <p:nvSpPr>
+          <p:cNvPr id="155" name="Google Shape;155;p26"/>
+          <p:cNvSpPr txBox="1"/>
+          <p:nvPr>
+            <p:ph type="title"/>
+          </p:nvPr>
+        </p:nvSpPr>
+        <p:spPr>
+          <a:xfrm>
+            <a:off x="98250" y="16350"/>
+            <a:ext cx="8826600" cy="602700"/>
+          </a:xfrm>
+          <a:prstGeom prst="rect">
+            <a:avLst/>
+          </a:prstGeom>
+        </p:spPr>
+        <p:txBody>
+          <a:bodyPr anchorCtr="0" anchor="ctr" bIns="91425" lIns="91425" spcFirstLastPara="1" rIns="91425" wrap="square" tIns="91425">
+            <a:normAutofit/>
+          </a:bodyPr>
+          <a:lstStyle/>
+          <a:p>
+            <a:pPr indent="0" lvl="0" marL="0" rtl="0" algn="ctr">
+              <a:spcBef>
+                <a:spcPts val="0"/>
+              </a:spcBef>
+              <a:spcAft>
+                <a:spcPts val="0"/>
+              </a:spcAft>
+              <a:buNone/>
+            </a:pPr>
+            <a:r>
+              <a:rPr lang="ru"/>
+              <a:t>Регистрация. Создание завуча.</a:t>
+            </a:r>
+            <a:endParaRPr/>
+          </a:p>
+        </p:txBody>
+      </p:sp>
+      <p:pic>
+        <p:nvPicPr>
+          <p:cNvPr id="156" name="Google Shape;156;p26"/>
+          <p:cNvPicPr preferRelativeResize="0"/>
+          <p:nvPr/>
+        </p:nvPicPr>
+        <p:blipFill>
+          <a:blip r:embed="rId3">
+            <a:alphaModFix/>
+          </a:blip>
+          <a:stretch>
+            <a:fillRect/>
+          </a:stretch>
+        </p:blipFill>
+        <p:spPr>
+          <a:xfrm>
+            <a:off x="543762" y="802700"/>
+            <a:ext cx="8056473" cy="3961701"/>
+          </a:xfrm>
+          <a:prstGeom prst="rect">
+            <a:avLst/>
+          </a:prstGeom>
+          <a:noFill/>
+          <a:ln>
+            <a:noFill/>
+          </a:ln>
+        </p:spPr>
+      </p:pic>
+    </p:spTree>
+  </p:cSld>
+  <p:clrMapOvr>
+    <a:masterClrMapping/>
+  </p:clrMapOvr>
+</p:sld>
+</file>
+
+<file path=ppt/slides/slide15.xml><?xml version="1.0" encoding="utf-8"?>
+<p:sld xmlns:a="http://schemas.openxmlformats.org/drawingml/2006/main" xmlns:r="http://schemas.openxmlformats.org/officeDocument/2006/relationships" xmlns:mc="http://schemas.openxmlformats.org/markup-compatibility/2006" xmlns:mv="urn:schemas-microsoft-com:mac:vml" xmlns:p="http://schemas.openxmlformats.org/presentationml/2006/main" xmlns:c="http://schemas.openxmlformats.org/drawingml/2006/chart" xmlns:dgm="http://schemas.openxmlformats.org/drawingml/2006/diagram" xmlns:o="urn:schemas-microsoft-com:office:office" xmlns:v="urn:schemas-microsoft-com:vml" xmlns:pvml="urn:schemas-microsoft-com:office:powerpoint" xmlns:com="http://schemas.openxmlformats.org/drawingml/2006/compatibility" xmlns:p14="http://schemas.microsoft.com/office/powerpoint/2010/main" xmlns:p15="http://schemas.microsoft.com/office/powerpoint/2012/main" xmlns:ahyp="http://schemas.microsoft.com/office/drawing/2018/hyperlinkcolor">
+  <p:cSld>
+    <p:spTree>
+      <p:nvGrpSpPr>
+        <p:cNvPr id="160" name="Shape 160"/>
+        <p:cNvGrpSpPr/>
+        <p:nvPr/>
+      </p:nvGrpSpPr>
+      <p:grpSpPr>
+        <a:xfrm>
+          <a:off x="0" y="0"/>
+          <a:ext cx="0" cy="0"/>
+          <a:chOff x="0" y="0"/>
+          <a:chExt cx="0" cy="0"/>
+        </a:xfrm>
+      </p:grpSpPr>
+      <p:sp>
+        <p:nvSpPr>
+          <p:cNvPr id="161" name="Google Shape;161;p27"/>
+          <p:cNvSpPr txBox="1"/>
+          <p:nvPr>
+            <p:ph type="title"/>
+          </p:nvPr>
+        </p:nvSpPr>
+        <p:spPr>
+          <a:xfrm>
+            <a:off x="98250" y="16350"/>
+            <a:ext cx="8826600" cy="602700"/>
+          </a:xfrm>
+          <a:prstGeom prst="rect">
+            <a:avLst/>
+          </a:prstGeom>
+        </p:spPr>
+        <p:txBody>
+          <a:bodyPr anchorCtr="0" anchor="ctr" bIns="91425" lIns="91425" spcFirstLastPara="1" rIns="91425" wrap="square" tIns="91425">
+            <a:normAutofit/>
+          </a:bodyPr>
+          <a:lstStyle/>
+          <a:p>
+            <a:pPr indent="0" lvl="0" marL="0" rtl="0" algn="ctr">
+              <a:spcBef>
+                <a:spcPts val="0"/>
+              </a:spcBef>
+              <a:spcAft>
+                <a:spcPts val="0"/>
+              </a:spcAft>
+              <a:buNone/>
+            </a:pPr>
+            <a:r>
+              <a:rPr lang="ru"/>
+              <a:t>Регистрация. Создание учителя.</a:t>
+            </a:r>
+            <a:endParaRPr/>
+          </a:p>
+        </p:txBody>
+      </p:sp>
+      <p:pic>
+        <p:nvPicPr>
+          <p:cNvPr id="162" name="Google Shape;162;p27"/>
+          <p:cNvPicPr preferRelativeResize="0"/>
+          <p:nvPr/>
+        </p:nvPicPr>
+        <p:blipFill>
+          <a:blip r:embed="rId3">
+            <a:alphaModFix/>
+          </a:blip>
+          <a:stretch>
+            <a:fillRect/>
+          </a:stretch>
+        </p:blipFill>
+        <p:spPr>
+          <a:xfrm>
+            <a:off x="1613075" y="761050"/>
+            <a:ext cx="5796942" cy="4219649"/>
+          </a:xfrm>
+          <a:prstGeom prst="rect">
+            <a:avLst/>
+          </a:prstGeom>
+          <a:noFill/>
+          <a:ln>
+            <a:noFill/>
+          </a:ln>
+        </p:spPr>
+      </p:pic>
+    </p:spTree>
+  </p:cSld>
+  <p:clrMapOvr>
+    <a:masterClrMapping/>
+  </p:clrMapOvr>
+</p:sld>
+</file>
+
+<file path=ppt/slides/slide16.xml><?xml version="1.0" encoding="utf-8"?>
+<p:sld xmlns:a="http://schemas.openxmlformats.org/drawingml/2006/main" xmlns:r="http://schemas.openxmlformats.org/officeDocument/2006/relationships" xmlns:mc="http://schemas.openxmlformats.org/markup-compatibility/2006" xmlns:mv="urn:schemas-microsoft-com:mac:vml" xmlns:p="http://schemas.openxmlformats.org/presentationml/2006/main" xmlns:c="http://schemas.openxmlformats.org/drawingml/2006/chart" xmlns:dgm="http://schemas.openxmlformats.org/drawingml/2006/diagram" xmlns:o="urn:schemas-microsoft-com:office:office" xmlns:v="urn:schemas-microsoft-com:vml" xmlns:pvml="urn:schemas-microsoft-com:office:powerpoint" xmlns:com="http://schemas.openxmlformats.org/drawingml/2006/compatibility" xmlns:p14="http://schemas.microsoft.com/office/powerpoint/2010/main" xmlns:p15="http://schemas.microsoft.com/office/powerpoint/2012/main" xmlns:ahyp="http://schemas.microsoft.com/office/drawing/2018/hyperlinkcolor">
+  <p:cSld>
+    <p:spTree>
+      <p:nvGrpSpPr>
+        <p:cNvPr id="166" name="Shape 166"/>
+        <p:cNvGrpSpPr/>
+        <p:nvPr/>
+      </p:nvGrpSpPr>
+      <p:grpSpPr>
+        <a:xfrm>
+          <a:off x="0" y="0"/>
+          <a:ext cx="0" cy="0"/>
+          <a:chOff x="0" y="0"/>
+          <a:chExt cx="0" cy="0"/>
+        </a:xfrm>
+      </p:grpSpPr>
+      <p:sp>
+        <p:nvSpPr>
+          <p:cNvPr id="167" name="Google Shape;167;p28"/>
+          <p:cNvSpPr txBox="1"/>
+          <p:nvPr>
+            <p:ph type="title"/>
+          </p:nvPr>
+        </p:nvSpPr>
+        <p:spPr>
+          <a:xfrm>
+            <a:off x="98250" y="16350"/>
+            <a:ext cx="8826600" cy="602700"/>
+          </a:xfrm>
+          <a:prstGeom prst="rect">
+            <a:avLst/>
+          </a:prstGeom>
+        </p:spPr>
+        <p:txBody>
+          <a:bodyPr anchorCtr="0" anchor="ctr" bIns="91425" lIns="91425" spcFirstLastPara="1" rIns="91425" wrap="square" tIns="91425">
+            <a:normAutofit/>
+          </a:bodyPr>
+          <a:lstStyle/>
+          <a:p>
+            <a:pPr indent="0" lvl="0" marL="0" rtl="0" algn="ctr">
+              <a:spcBef>
+                <a:spcPts val="0"/>
+              </a:spcBef>
+              <a:spcAft>
+                <a:spcPts val="0"/>
+              </a:spcAft>
+              <a:buNone/>
+            </a:pPr>
+            <a:r>
+              <a:rPr lang="ru"/>
+              <a:t>Регистрация. Создание родителя.</a:t>
+            </a:r>
+            <a:endParaRPr/>
+          </a:p>
+        </p:txBody>
+      </p:sp>
+      <p:pic>
+        <p:nvPicPr>
+          <p:cNvPr id="168" name="Google Shape;168;p28"/>
+          <p:cNvPicPr preferRelativeResize="0"/>
+          <p:nvPr/>
+        </p:nvPicPr>
+        <p:blipFill>
+          <a:blip r:embed="rId3">
+            <a:alphaModFix/>
+          </a:blip>
+          <a:stretch>
+            <a:fillRect/>
+          </a:stretch>
+        </p:blipFill>
+        <p:spPr>
+          <a:xfrm>
+            <a:off x="535050" y="761075"/>
+            <a:ext cx="8073888" cy="4219650"/>
+          </a:xfrm>
+          <a:prstGeom prst="rect">
+            <a:avLst/>
+          </a:prstGeom>
+          <a:noFill/>
+          <a:ln>
+            <a:noFill/>
+          </a:ln>
+        </p:spPr>
+      </p:pic>
+    </p:spTree>
+  </p:cSld>
+  <p:clrMapOvr>
+    <a:masterClrMapping/>
+  </p:clrMapOvr>
+</p:sld>
+</file>
+
+<file path=ppt/slides/slide17.xml><?xml version="1.0" encoding="utf-8"?>
+<p:sld xmlns:a="http://schemas.openxmlformats.org/drawingml/2006/main" xmlns:r="http://schemas.openxmlformats.org/officeDocument/2006/relationships" xmlns:mc="http://schemas.openxmlformats.org/markup-compatibility/2006" xmlns:mv="urn:schemas-microsoft-com:mac:vml" xmlns:p="http://schemas.openxmlformats.org/presentationml/2006/main" xmlns:c="http://schemas.openxmlformats.org/drawingml/2006/chart" xmlns:dgm="http://schemas.openxmlformats.org/drawingml/2006/diagram" xmlns:o="urn:schemas-microsoft-com:office:office" xmlns:v="urn:schemas-microsoft-com:vml" xmlns:pvml="urn:schemas-microsoft-com:office:powerpoint" xmlns:com="http://schemas.openxmlformats.org/drawingml/2006/compatibility" xmlns:p14="http://schemas.microsoft.com/office/powerpoint/2010/main" xmlns:p15="http://schemas.microsoft.com/office/powerpoint/2012/main" xmlns:ahyp="http://schemas.microsoft.com/office/drawing/2018/hyperlinkcolor">
+  <p:cSld>
+    <p:spTree>
+      <p:nvGrpSpPr>
+        <p:cNvPr id="172" name="Shape 172"/>
+        <p:cNvGrpSpPr/>
+        <p:nvPr/>
+      </p:nvGrpSpPr>
+      <p:grpSpPr>
+        <a:xfrm>
+          <a:off x="0" y="0"/>
+          <a:ext cx="0" cy="0"/>
+          <a:chOff x="0" y="0"/>
+          <a:chExt cx="0" cy="0"/>
+        </a:xfrm>
+      </p:grpSpPr>
+      <p:sp>
+        <p:nvSpPr>
+          <p:cNvPr id="173" name="Google Shape;173;p29"/>
+          <p:cNvSpPr txBox="1"/>
+          <p:nvPr>
+            <p:ph type="title"/>
+          </p:nvPr>
+        </p:nvSpPr>
+        <p:spPr>
+          <a:xfrm>
+            <a:off x="98250" y="16350"/>
+            <a:ext cx="8826600" cy="602700"/>
+          </a:xfrm>
+          <a:prstGeom prst="rect">
+            <a:avLst/>
+          </a:prstGeom>
+        </p:spPr>
+        <p:txBody>
+          <a:bodyPr anchorCtr="0" anchor="ctr" bIns="91425" lIns="91425" spcFirstLastPara="1" rIns="91425" wrap="square" tIns="91425">
+            <a:normAutofit/>
+          </a:bodyPr>
+          <a:lstStyle/>
+          <a:p>
+            <a:pPr indent="0" lvl="0" marL="0" rtl="0" algn="ctr">
+              <a:spcBef>
+                <a:spcPts val="0"/>
+              </a:spcBef>
+              <a:spcAft>
+                <a:spcPts val="0"/>
+              </a:spcAft>
+              <a:buNone/>
+            </a:pPr>
+            <a:r>
+              <a:rPr lang="ru"/>
+              <a:t>Авторизация</a:t>
+            </a:r>
+            <a:endParaRPr/>
+          </a:p>
+        </p:txBody>
+      </p:sp>
+      <p:pic>
+        <p:nvPicPr>
+          <p:cNvPr id="174" name="Google Shape;174;p29"/>
+          <p:cNvPicPr preferRelativeResize="0"/>
+          <p:nvPr/>
+        </p:nvPicPr>
+        <p:blipFill rotWithShape="1">
+          <a:blip r:embed="rId3">
+            <a:alphaModFix/>
+          </a:blip>
+          <a:srcRect b="0" l="0" r="0" t="0"/>
+          <a:stretch/>
+        </p:blipFill>
+        <p:spPr>
+          <a:xfrm>
+            <a:off x="543762" y="802700"/>
+            <a:ext cx="8056473" cy="3961701"/>
+          </a:xfrm>
+          <a:prstGeom prst="rect">
+            <a:avLst/>
+          </a:prstGeom>
+          <a:noFill/>
+          <a:ln>
+            <a:noFill/>
+          </a:ln>
+        </p:spPr>
+      </p:pic>
+    </p:spTree>
+  </p:cSld>
+  <p:clrMapOvr>
+    <a:masterClrMapping/>
+  </p:clrMapOvr>
+</p:sld>
+</file>
+
+<file path=ppt/slides/slide18.xml><?xml version="1.0" encoding="utf-8"?>
+<p:sld xmlns:a="http://schemas.openxmlformats.org/drawingml/2006/main" xmlns:r="http://schemas.openxmlformats.org/officeDocument/2006/relationships" xmlns:mc="http://schemas.openxmlformats.org/markup-compatibility/2006" xmlns:mv="urn:schemas-microsoft-com:mac:vml" xmlns:p="http://schemas.openxmlformats.org/presentationml/2006/main" xmlns:c="http://schemas.openxmlformats.org/drawingml/2006/chart" xmlns:dgm="http://schemas.openxmlformats.org/drawingml/2006/diagram" xmlns:o="urn:schemas-microsoft-com:office:office" xmlns:v="urn:schemas-microsoft-com:vml" xmlns:pvml="urn:schemas-microsoft-com:office:powerpoint" xmlns:com="http://schemas.openxmlformats.org/drawingml/2006/compatibility" xmlns:p14="http://schemas.microsoft.com/office/powerpoint/2010/main" xmlns:p15="http://schemas.microsoft.com/office/powerpoint/2012/main" xmlns:ahyp="http://schemas.microsoft.com/office/drawing/2018/hyperlinkcolor">
+  <p:cSld>
+    <p:spTree>
+      <p:nvGrpSpPr>
+        <p:cNvPr id="178" name="Shape 178"/>
+        <p:cNvGrpSpPr/>
+        <p:nvPr/>
+      </p:nvGrpSpPr>
+      <p:grpSpPr>
+        <a:xfrm>
+          <a:off x="0" y="0"/>
+          <a:ext cx="0" cy="0"/>
+          <a:chOff x="0" y="0"/>
+          <a:chExt cx="0" cy="0"/>
+        </a:xfrm>
+      </p:grpSpPr>
+      <p:sp>
+        <p:nvSpPr>
+          <p:cNvPr id="179" name="Google Shape;179;p30"/>
+          <p:cNvSpPr txBox="1"/>
+          <p:nvPr>
+            <p:ph type="title"/>
+          </p:nvPr>
+        </p:nvSpPr>
+        <p:spPr>
+          <a:xfrm>
+            <a:off x="98250" y="16350"/>
+            <a:ext cx="8826600" cy="602700"/>
+          </a:xfrm>
+          <a:prstGeom prst="rect">
+            <a:avLst/>
+          </a:prstGeom>
+        </p:spPr>
+        <p:txBody>
+          <a:bodyPr anchorCtr="0" anchor="ctr" bIns="91425" lIns="91425" spcFirstLastPara="1" rIns="91425" wrap="square" tIns="91425">
+            <a:normAutofit/>
+          </a:bodyPr>
+          <a:lstStyle/>
+          <a:p>
+            <a:pPr indent="0" lvl="0" marL="0" rtl="0" algn="ctr">
+              <a:spcBef>
+                <a:spcPts val="0"/>
+              </a:spcBef>
+              <a:spcAft>
+                <a:spcPts val="0"/>
+              </a:spcAft>
+              <a:buNone/>
+            </a:pPr>
+            <a:r>
+              <a:rPr lang="ru"/>
+              <a:t>Загрузка и использование файлов</a:t>
+            </a:r>
+            <a:endParaRPr/>
+          </a:p>
+        </p:txBody>
+      </p:sp>
+    </p:spTree>
+  </p:cSld>
+  <p:clrMapOvr>
+    <a:masterClrMapping/>
+  </p:clrMapOvr>
+</p:sld>
+</file>
+
+<file path=ppt/slides/slide19.xml><?xml version="1.0" encoding="utf-8"?>
+<p:sld xmlns:a="http://schemas.openxmlformats.org/drawingml/2006/main" xmlns:r="http://schemas.openxmlformats.org/officeDocument/2006/relationships" xmlns:mc="http://schemas.openxmlformats.org/markup-compatibility/2006" xmlns:mv="urn:schemas-microsoft-com:mac:vml" xmlns:p="http://schemas.openxmlformats.org/presentationml/2006/main" xmlns:c="http://schemas.openxmlformats.org/drawingml/2006/chart" xmlns:dgm="http://schemas.openxmlformats.org/drawingml/2006/diagram" xmlns:o="urn:schemas-microsoft-com:office:office" xmlns:v="urn:schemas-microsoft-com:vml" xmlns:pvml="urn:schemas-microsoft-com:office:powerpoint" xmlns:com="http://schemas.openxmlformats.org/drawingml/2006/compatibility" xmlns:p14="http://schemas.microsoft.com/office/powerpoint/2010/main" xmlns:p15="http://schemas.microsoft.com/office/powerpoint/2012/main" xmlns:ahyp="http://schemas.microsoft.com/office/drawing/2018/hyperlinkcolor">
+  <p:cSld>
+    <p:spTree>
+      <p:nvGrpSpPr>
+        <p:cNvPr id="183" name="Shape 183"/>
+        <p:cNvGrpSpPr/>
+        <p:nvPr/>
+      </p:nvGrpSpPr>
+      <p:grpSpPr>
+        <a:xfrm>
+          <a:off x="0" y="0"/>
+          <a:ext cx="0" cy="0"/>
+          <a:chOff x="0" y="0"/>
+          <a:chExt cx="0" cy="0"/>
+        </a:xfrm>
+      </p:grpSpPr>
+      <p:sp>
+        <p:nvSpPr>
+          <p:cNvPr id="184" name="Google Shape;184;p31"/>
+          <p:cNvSpPr txBox="1"/>
+          <p:nvPr>
+            <p:ph type="title"/>
+          </p:nvPr>
+        </p:nvSpPr>
+        <p:spPr>
+          <a:xfrm>
+            <a:off x="98250" y="16350"/>
+            <a:ext cx="8826600" cy="602700"/>
+          </a:xfrm>
+          <a:prstGeom prst="rect">
+            <a:avLst/>
+          </a:prstGeom>
+        </p:spPr>
+        <p:txBody>
+          <a:bodyPr anchorCtr="0" anchor="ctr" bIns="91425" lIns="91425" spcFirstLastPara="1" rIns="91425" wrap="square" tIns="91425">
+            <a:normAutofit/>
+          </a:bodyPr>
+          <a:lstStyle/>
+          <a:p>
+            <a:pPr indent="0" lvl="0" marL="0" rtl="0" algn="ctr">
+              <a:spcBef>
+                <a:spcPts val="0"/>
+              </a:spcBef>
+              <a:spcAft>
+                <a:spcPts val="0"/>
+              </a:spcAft>
+              <a:buNone/>
+            </a:pPr>
+            <a:r>
+              <a:rPr lang="ru"/>
+              <a:t>REST API. Swagger UI</a:t>
+            </a:r>
+            <a:endParaRPr/>
+          </a:p>
+        </p:txBody>
+      </p:sp>
+      <p:pic>
+        <p:nvPicPr>
+          <p:cNvPr id="185" name="Google Shape;185;p31"/>
+          <p:cNvPicPr preferRelativeResize="0"/>
+          <p:nvPr/>
+        </p:nvPicPr>
+        <p:blipFill>
+          <a:blip r:embed="rId3">
+            <a:alphaModFix/>
+          </a:blip>
+          <a:stretch>
+            <a:fillRect/>
+          </a:stretch>
+        </p:blipFill>
+        <p:spPr>
+          <a:xfrm>
+            <a:off x="1560650" y="792275"/>
+            <a:ext cx="5901783" cy="4219648"/>
+          </a:xfrm>
+          <a:prstGeom prst="rect">
+            <a:avLst/>
+          </a:prstGeom>
+          <a:noFill/>
+          <a:ln>
+            <a:noFill/>
+          </a:ln>
+        </p:spPr>
+      </p:pic>
+    </p:spTree>
+  </p:cSld>
+  <p:clrMapOvr>
+    <a:masterClrMapping/>
+  </p:clrMapOvr>
+</p:sld>
+</file>
+
 <file path=ppt/slides/slide2.xml><?xml version="1.0" encoding="utf-8"?>
 <p:sld xmlns:a="http://schemas.openxmlformats.org/drawingml/2006/main" xmlns:r="http://schemas.openxmlformats.org/officeDocument/2006/relationships" xmlns:mc="http://schemas.openxmlformats.org/markup-compatibility/2006" xmlns:mv="urn:schemas-microsoft-com:mac:vml" xmlns:p="http://schemas.openxmlformats.org/presentationml/2006/main" xmlns:c="http://schemas.openxmlformats.org/drawingml/2006/chart" xmlns:dgm="http://schemas.openxmlformats.org/drawingml/2006/diagram" xmlns:o="urn:schemas-microsoft-com:office:office" xmlns:v="urn:schemas-microsoft-com:vml" xmlns:pvml="urn:schemas-microsoft-com:office:powerpoint" xmlns:com="http://schemas.openxmlformats.org/drawingml/2006/compatibility" xmlns:p14="http://schemas.microsoft.com/office/powerpoint/2010/main" xmlns:p15="http://schemas.microsoft.com/office/powerpoint/2012/main" xmlns:ahyp="http://schemas.microsoft.com/office/drawing/2018/hyperlinkcolor">
   <p:cSld>
@@ -7520,6 +10381,604 @@
               <a:cs typeface="Roboto"/>
               <a:sym typeface="Roboto"/>
             </a:endParaRPr>
+          </a:p>
+        </p:txBody>
+      </p:sp>
+    </p:spTree>
+  </p:cSld>
+  <p:clrMapOvr>
+    <a:masterClrMapping/>
+  </p:clrMapOvr>
+</p:sld>
+</file>
+
+<file path=ppt/slides/slide20.xml><?xml version="1.0" encoding="utf-8"?>
+<p:sld xmlns:a="http://schemas.openxmlformats.org/drawingml/2006/main" xmlns:r="http://schemas.openxmlformats.org/officeDocument/2006/relationships" xmlns:mc="http://schemas.openxmlformats.org/markup-compatibility/2006" xmlns:mv="urn:schemas-microsoft-com:mac:vml" xmlns:p="http://schemas.openxmlformats.org/presentationml/2006/main" xmlns:c="http://schemas.openxmlformats.org/drawingml/2006/chart" xmlns:dgm="http://schemas.openxmlformats.org/drawingml/2006/diagram" xmlns:o="urn:schemas-microsoft-com:office:office" xmlns:v="urn:schemas-microsoft-com:vml" xmlns:pvml="urn:schemas-microsoft-com:office:powerpoint" xmlns:com="http://schemas.openxmlformats.org/drawingml/2006/compatibility" xmlns:p14="http://schemas.microsoft.com/office/powerpoint/2010/main" xmlns:p15="http://schemas.microsoft.com/office/powerpoint/2012/main" xmlns:ahyp="http://schemas.microsoft.com/office/drawing/2018/hyperlinkcolor">
+  <p:cSld>
+    <p:spTree>
+      <p:nvGrpSpPr>
+        <p:cNvPr id="189" name="Shape 189"/>
+        <p:cNvGrpSpPr/>
+        <p:nvPr/>
+      </p:nvGrpSpPr>
+      <p:grpSpPr>
+        <a:xfrm>
+          <a:off x="0" y="0"/>
+          <a:ext cx="0" cy="0"/>
+          <a:chOff x="0" y="0"/>
+          <a:chExt cx="0" cy="0"/>
+        </a:xfrm>
+      </p:grpSpPr>
+      <p:sp>
+        <p:nvSpPr>
+          <p:cNvPr id="190" name="Google Shape;190;p32"/>
+          <p:cNvSpPr txBox="1"/>
+          <p:nvPr>
+            <p:ph type="title"/>
+          </p:nvPr>
+        </p:nvSpPr>
+        <p:spPr>
+          <a:xfrm>
+            <a:off x="226078" y="357800"/>
+            <a:ext cx="2808000" cy="953400"/>
+          </a:xfrm>
+          <a:prstGeom prst="rect">
+            <a:avLst/>
+          </a:prstGeom>
+        </p:spPr>
+        <p:txBody>
+          <a:bodyPr anchorCtr="0" anchor="b" bIns="91425" lIns="91425" spcFirstLastPara="1" rIns="91425" wrap="square" tIns="91425">
+            <a:normAutofit/>
+          </a:bodyPr>
+          <a:lstStyle/>
+          <a:p>
+            <a:pPr indent="0" lvl="0" marL="0" rtl="0" algn="l">
+              <a:spcBef>
+                <a:spcPts val="0"/>
+              </a:spcBef>
+              <a:spcAft>
+                <a:spcPts val="0"/>
+              </a:spcAft>
+              <a:buNone/>
+            </a:pPr>
+            <a:r>
+              <a:rPr lang="ru"/>
+              <a:t>Хранение данных</a:t>
+            </a:r>
+            <a:endParaRPr/>
+          </a:p>
+        </p:txBody>
+      </p:sp>
+      <p:sp>
+        <p:nvSpPr>
+          <p:cNvPr id="191" name="Google Shape;191;p32"/>
+          <p:cNvSpPr txBox="1"/>
+          <p:nvPr>
+            <p:ph idx="1" type="body"/>
+          </p:nvPr>
+        </p:nvSpPr>
+        <p:spPr>
+          <a:xfrm>
+            <a:off x="226075" y="1465800"/>
+            <a:ext cx="2808000" cy="3163500"/>
+          </a:xfrm>
+          <a:prstGeom prst="rect">
+            <a:avLst/>
+          </a:prstGeom>
+        </p:spPr>
+        <p:txBody>
+          <a:bodyPr anchorCtr="0" anchor="t" bIns="91425" lIns="91425" spcFirstLastPara="1" rIns="91425" wrap="square" tIns="91425">
+            <a:normAutofit/>
+          </a:bodyPr>
+          <a:lstStyle/>
+          <a:p>
+            <a:pPr indent="-304800" lvl="0" marL="457200" rtl="0" algn="l">
+              <a:spcBef>
+                <a:spcPts val="0"/>
+              </a:spcBef>
+              <a:spcAft>
+                <a:spcPts val="0"/>
+              </a:spcAft>
+              <a:buSzPts val="1200"/>
+              <a:buChar char="●"/>
+            </a:pPr>
+            <a:r>
+              <a:rPr lang="ru"/>
+              <a:t>БД</a:t>
+            </a:r>
+            <a:endParaRPr/>
+          </a:p>
+          <a:p>
+            <a:pPr indent="-304800" lvl="0" marL="457200" rtl="0" algn="l">
+              <a:spcBef>
+                <a:spcPts val="0"/>
+              </a:spcBef>
+              <a:spcAft>
+                <a:spcPts val="0"/>
+              </a:spcAft>
+              <a:buSzPts val="1200"/>
+              <a:buChar char="●"/>
+            </a:pPr>
+            <a:r>
+              <a:rPr lang="ru"/>
+              <a:t>Реляционная</a:t>
+            </a:r>
+            <a:endParaRPr/>
+          </a:p>
+        </p:txBody>
+      </p:sp>
+      <p:pic>
+        <p:nvPicPr>
+          <p:cNvPr id="192" name="Google Shape;192;p32"/>
+          <p:cNvPicPr preferRelativeResize="0"/>
+          <p:nvPr/>
+        </p:nvPicPr>
+        <p:blipFill>
+          <a:blip r:embed="rId3">
+            <a:alphaModFix/>
+          </a:blip>
+          <a:stretch>
+            <a:fillRect/>
+          </a:stretch>
+        </p:blipFill>
+        <p:spPr>
+          <a:xfrm>
+            <a:off x="4800753" y="152400"/>
+            <a:ext cx="2962110" cy="4838700"/>
+          </a:xfrm>
+          <a:prstGeom prst="rect">
+            <a:avLst/>
+          </a:prstGeom>
+          <a:noFill/>
+          <a:ln>
+            <a:noFill/>
+          </a:ln>
+        </p:spPr>
+      </p:pic>
+    </p:spTree>
+  </p:cSld>
+  <p:clrMapOvr>
+    <a:masterClrMapping/>
+  </p:clrMapOvr>
+</p:sld>
+</file>
+
+<file path=ppt/slides/slide21.xml><?xml version="1.0" encoding="utf-8"?>
+<p:sld xmlns:a="http://schemas.openxmlformats.org/drawingml/2006/main" xmlns:r="http://schemas.openxmlformats.org/officeDocument/2006/relationships" xmlns:mc="http://schemas.openxmlformats.org/markup-compatibility/2006" xmlns:mv="urn:schemas-microsoft-com:mac:vml" xmlns:p="http://schemas.openxmlformats.org/presentationml/2006/main" xmlns:c="http://schemas.openxmlformats.org/drawingml/2006/chart" xmlns:dgm="http://schemas.openxmlformats.org/drawingml/2006/diagram" xmlns:o="urn:schemas-microsoft-com:office:office" xmlns:v="urn:schemas-microsoft-com:vml" xmlns:pvml="urn:schemas-microsoft-com:office:powerpoint" xmlns:com="http://schemas.openxmlformats.org/drawingml/2006/compatibility" xmlns:p14="http://schemas.microsoft.com/office/powerpoint/2010/main" xmlns:p15="http://schemas.microsoft.com/office/powerpoint/2012/main" xmlns:ahyp="http://schemas.microsoft.com/office/drawing/2018/hyperlinkcolor">
+  <p:cSld>
+    <p:spTree>
+      <p:nvGrpSpPr>
+        <p:cNvPr id="196" name="Shape 196"/>
+        <p:cNvGrpSpPr/>
+        <p:nvPr/>
+      </p:nvGrpSpPr>
+      <p:grpSpPr>
+        <a:xfrm>
+          <a:off x="0" y="0"/>
+          <a:ext cx="0" cy="0"/>
+          <a:chOff x="0" y="0"/>
+          <a:chExt cx="0" cy="0"/>
+        </a:xfrm>
+      </p:grpSpPr>
+      <p:sp>
+        <p:nvSpPr>
+          <p:cNvPr id="197" name="Google Shape;197;p33"/>
+          <p:cNvSpPr txBox="1"/>
+          <p:nvPr>
+            <p:ph type="title"/>
+          </p:nvPr>
+        </p:nvSpPr>
+        <p:spPr>
+          <a:xfrm>
+            <a:off x="98250" y="16350"/>
+            <a:ext cx="8826600" cy="602700"/>
+          </a:xfrm>
+          <a:prstGeom prst="rect">
+            <a:avLst/>
+          </a:prstGeom>
+        </p:spPr>
+        <p:txBody>
+          <a:bodyPr anchorCtr="0" anchor="ctr" bIns="91425" lIns="91425" spcFirstLastPara="1" rIns="91425" wrap="square" tIns="91425">
+            <a:normAutofit/>
+          </a:bodyPr>
+          <a:lstStyle/>
+          <a:p>
+            <a:pPr indent="0" lvl="0" marL="0" rtl="0" algn="ctr">
+              <a:spcBef>
+                <a:spcPts val="0"/>
+              </a:spcBef>
+              <a:spcAft>
+                <a:spcPts val="0"/>
+              </a:spcAft>
+              <a:buNone/>
+            </a:pPr>
+            <a:r>
+              <a:rPr lang="ru"/>
+              <a:t>Хостинг</a:t>
+            </a:r>
+            <a:endParaRPr/>
+          </a:p>
+        </p:txBody>
+      </p:sp>
+      <p:pic>
+        <p:nvPicPr>
+          <p:cNvPr id="198" name="Google Shape;198;p33"/>
+          <p:cNvPicPr preferRelativeResize="0"/>
+          <p:nvPr/>
+        </p:nvPicPr>
+        <p:blipFill>
+          <a:blip r:embed="rId3">
+            <a:alphaModFix/>
+          </a:blip>
+          <a:stretch>
+            <a:fillRect/>
+          </a:stretch>
+        </p:blipFill>
+        <p:spPr>
+          <a:xfrm>
+            <a:off x="2711550" y="1054825"/>
+            <a:ext cx="3600000" cy="3600000"/>
+          </a:xfrm>
+          <a:prstGeom prst="rect">
+            <a:avLst/>
+          </a:prstGeom>
+          <a:noFill/>
+          <a:ln>
+            <a:noFill/>
+          </a:ln>
+        </p:spPr>
+      </p:pic>
+    </p:spTree>
+  </p:cSld>
+  <p:clrMapOvr>
+    <a:masterClrMapping/>
+  </p:clrMapOvr>
+</p:sld>
+</file>
+
+<file path=ppt/slides/slide22.xml><?xml version="1.0" encoding="utf-8"?>
+<p:sld xmlns:a="http://schemas.openxmlformats.org/drawingml/2006/main" xmlns:r="http://schemas.openxmlformats.org/officeDocument/2006/relationships" xmlns:mc="http://schemas.openxmlformats.org/markup-compatibility/2006" xmlns:mv="urn:schemas-microsoft-com:mac:vml" xmlns:p="http://schemas.openxmlformats.org/presentationml/2006/main" xmlns:c="http://schemas.openxmlformats.org/drawingml/2006/chart" xmlns:dgm="http://schemas.openxmlformats.org/drawingml/2006/diagram" xmlns:o="urn:schemas-microsoft-com:office:office" xmlns:v="urn:schemas-microsoft-com:vml" xmlns:pvml="urn:schemas-microsoft-com:office:powerpoint" xmlns:com="http://schemas.openxmlformats.org/drawingml/2006/compatibility" xmlns:p14="http://schemas.microsoft.com/office/powerpoint/2010/main" xmlns:p15="http://schemas.microsoft.com/office/powerpoint/2012/main" xmlns:ahyp="http://schemas.microsoft.com/office/drawing/2018/hyperlinkcolor">
+  <p:cSld>
+    <p:spTree>
+      <p:nvGrpSpPr>
+        <p:cNvPr id="202" name="Shape 202"/>
+        <p:cNvGrpSpPr/>
+        <p:nvPr/>
+      </p:nvGrpSpPr>
+      <p:grpSpPr>
+        <a:xfrm>
+          <a:off x="0" y="0"/>
+          <a:ext cx="0" cy="0"/>
+          <a:chOff x="0" y="0"/>
+          <a:chExt cx="0" cy="0"/>
+        </a:xfrm>
+      </p:grpSpPr>
+      <p:sp>
+        <p:nvSpPr>
+          <p:cNvPr id="203" name="Google Shape;203;p34"/>
+          <p:cNvSpPr txBox="1"/>
+          <p:nvPr>
+            <p:ph type="title"/>
+          </p:nvPr>
+        </p:nvSpPr>
+        <p:spPr>
+          <a:xfrm>
+            <a:off x="98250" y="16350"/>
+            <a:ext cx="8826600" cy="602700"/>
+          </a:xfrm>
+          <a:prstGeom prst="rect">
+            <a:avLst/>
+          </a:prstGeom>
+        </p:spPr>
+        <p:txBody>
+          <a:bodyPr anchorCtr="0" anchor="ctr" bIns="91425" lIns="91425" spcFirstLastPara="1" rIns="91425" wrap="square" tIns="91425">
+            <a:normAutofit/>
+          </a:bodyPr>
+          <a:lstStyle/>
+          <a:p>
+            <a:pPr indent="0" lvl="0" marL="0" rtl="0" algn="ctr">
+              <a:spcBef>
+                <a:spcPts val="0"/>
+              </a:spcBef>
+              <a:spcAft>
+                <a:spcPts val="0"/>
+              </a:spcAft>
+              <a:buNone/>
+            </a:pPr>
+            <a:r>
+              <a:rPr lang="ru"/>
+              <a:t>Материалы</a:t>
+            </a:r>
+            <a:endParaRPr/>
+          </a:p>
+        </p:txBody>
+      </p:sp>
+      <p:pic>
+        <p:nvPicPr>
+          <p:cNvPr id="204" name="Google Shape;204;p34"/>
+          <p:cNvPicPr preferRelativeResize="0"/>
+          <p:nvPr/>
+        </p:nvPicPr>
+        <p:blipFill>
+          <a:blip r:embed="rId3">
+            <a:alphaModFix/>
+          </a:blip>
+          <a:stretch>
+            <a:fillRect/>
+          </a:stretch>
+        </p:blipFill>
+        <p:spPr>
+          <a:xfrm>
+            <a:off x="712175" y="1036600"/>
+            <a:ext cx="2520000" cy="2520000"/>
+          </a:xfrm>
+          <a:prstGeom prst="rect">
+            <a:avLst/>
+          </a:prstGeom>
+          <a:noFill/>
+          <a:ln>
+            <a:noFill/>
+          </a:ln>
+        </p:spPr>
+      </p:pic>
+      <p:sp>
+        <p:nvSpPr>
+          <p:cNvPr id="205" name="Google Shape;205;p34"/>
+          <p:cNvSpPr txBox="1"/>
+          <p:nvPr/>
+        </p:nvSpPr>
+        <p:spPr>
+          <a:xfrm>
+            <a:off x="733625" y="3856750"/>
+            <a:ext cx="2520000" cy="431100"/>
+          </a:xfrm>
+          <a:prstGeom prst="rect">
+            <a:avLst/>
+          </a:prstGeom>
+          <a:noFill/>
+          <a:ln>
+            <a:noFill/>
+          </a:ln>
+        </p:spPr>
+        <p:txBody>
+          <a:bodyPr anchorCtr="0" anchor="t" bIns="91425" lIns="91425" spcFirstLastPara="1" rIns="91425" wrap="square" tIns="91425">
+            <a:spAutoFit/>
+          </a:bodyPr>
+          <a:lstStyle/>
+          <a:p>
+            <a:pPr indent="0" lvl="0" marL="0" rtl="0" algn="ctr">
+              <a:spcBef>
+                <a:spcPts val="0"/>
+              </a:spcBef>
+              <a:spcAft>
+                <a:spcPts val="0"/>
+              </a:spcAft>
+              <a:buNone/>
+            </a:pPr>
+            <a:r>
+              <a:rPr lang="ru" sz="1600">
+                <a:latin typeface="Roboto"/>
+                <a:ea typeface="Roboto"/>
+                <a:cs typeface="Roboto"/>
+                <a:sym typeface="Roboto"/>
+              </a:rPr>
+              <a:t>Репозиторий</a:t>
+            </a:r>
+            <a:endParaRPr sz="1600">
+              <a:latin typeface="Roboto"/>
+              <a:ea typeface="Roboto"/>
+              <a:cs typeface="Roboto"/>
+              <a:sym typeface="Roboto"/>
+            </a:endParaRPr>
+          </a:p>
+        </p:txBody>
+      </p:sp>
+      <p:pic>
+        <p:nvPicPr>
+          <p:cNvPr id="206" name="Google Shape;206;p34"/>
+          <p:cNvPicPr preferRelativeResize="0"/>
+          <p:nvPr/>
+        </p:nvPicPr>
+        <p:blipFill>
+          <a:blip r:embed="rId4">
+            <a:alphaModFix/>
+          </a:blip>
+          <a:stretch>
+            <a:fillRect/>
+          </a:stretch>
+        </p:blipFill>
+        <p:spPr>
+          <a:xfrm>
+            <a:off x="5880425" y="1036600"/>
+            <a:ext cx="2520000" cy="2520000"/>
+          </a:xfrm>
+          <a:prstGeom prst="rect">
+            <a:avLst/>
+          </a:prstGeom>
+          <a:noFill/>
+          <a:ln>
+            <a:noFill/>
+          </a:ln>
+        </p:spPr>
+      </p:pic>
+      <p:sp>
+        <p:nvSpPr>
+          <p:cNvPr id="207" name="Google Shape;207;p34"/>
+          <p:cNvSpPr txBox="1"/>
+          <p:nvPr/>
+        </p:nvSpPr>
+        <p:spPr>
+          <a:xfrm>
+            <a:off x="5848225" y="3884800"/>
+            <a:ext cx="2520000" cy="400200"/>
+          </a:xfrm>
+          <a:prstGeom prst="rect">
+            <a:avLst/>
+          </a:prstGeom>
+          <a:noFill/>
+          <a:ln>
+            <a:noFill/>
+          </a:ln>
+        </p:spPr>
+        <p:txBody>
+          <a:bodyPr anchorCtr="0" anchor="t" bIns="91425" lIns="91425" spcFirstLastPara="1" rIns="91425" wrap="square" tIns="91425">
+            <a:spAutoFit/>
+          </a:bodyPr>
+          <a:lstStyle/>
+          <a:p>
+            <a:pPr indent="0" lvl="0" marL="0" rtl="0" algn="ctr">
+              <a:spcBef>
+                <a:spcPts val="0"/>
+              </a:spcBef>
+              <a:spcAft>
+                <a:spcPts val="0"/>
+              </a:spcAft>
+              <a:buNone/>
+            </a:pPr>
+            <a:r>
+              <a:rPr lang="ru">
+                <a:latin typeface="Roboto"/>
+                <a:ea typeface="Roboto"/>
+                <a:cs typeface="Roboto"/>
+                <a:sym typeface="Roboto"/>
+              </a:rPr>
+              <a:t>Материалы Презентации</a:t>
+            </a:r>
+            <a:endParaRPr>
+              <a:latin typeface="Roboto"/>
+              <a:ea typeface="Roboto"/>
+              <a:cs typeface="Roboto"/>
+              <a:sym typeface="Roboto"/>
+            </a:endParaRPr>
+          </a:p>
+        </p:txBody>
+      </p:sp>
+    </p:spTree>
+  </p:cSld>
+  <p:clrMapOvr>
+    <a:masterClrMapping/>
+  </p:clrMapOvr>
+</p:sld>
+</file>
+
+<file path=ppt/slides/slide23.xml><?xml version="1.0" encoding="utf-8"?>
+<p:sld xmlns:a="http://schemas.openxmlformats.org/drawingml/2006/main" xmlns:r="http://schemas.openxmlformats.org/officeDocument/2006/relationships" xmlns:mc="http://schemas.openxmlformats.org/markup-compatibility/2006" xmlns:mv="urn:schemas-microsoft-com:mac:vml" xmlns:p="http://schemas.openxmlformats.org/presentationml/2006/main" xmlns:c="http://schemas.openxmlformats.org/drawingml/2006/chart" xmlns:dgm="http://schemas.openxmlformats.org/drawingml/2006/diagram" xmlns:o="urn:schemas-microsoft-com:office:office" xmlns:v="urn:schemas-microsoft-com:vml" xmlns:pvml="urn:schemas-microsoft-com:office:powerpoint" xmlns:com="http://schemas.openxmlformats.org/drawingml/2006/compatibility" xmlns:p14="http://schemas.microsoft.com/office/powerpoint/2010/main" xmlns:p15="http://schemas.microsoft.com/office/powerpoint/2012/main" xmlns:ahyp="http://schemas.microsoft.com/office/drawing/2018/hyperlinkcolor">
+  <p:cSld>
+    <p:spTree>
+      <p:nvGrpSpPr>
+        <p:cNvPr id="211" name="Shape 211"/>
+        <p:cNvGrpSpPr/>
+        <p:nvPr/>
+      </p:nvGrpSpPr>
+      <p:grpSpPr>
+        <a:xfrm>
+          <a:off x="0" y="0"/>
+          <a:ext cx="0" cy="0"/>
+          <a:chOff x="0" y="0"/>
+          <a:chExt cx="0" cy="0"/>
+        </a:xfrm>
+      </p:grpSpPr>
+      <p:sp>
+        <p:nvSpPr>
+          <p:cNvPr id="212" name="Google Shape;212;p35"/>
+          <p:cNvSpPr txBox="1"/>
+          <p:nvPr>
+            <p:ph type="title"/>
+          </p:nvPr>
+        </p:nvSpPr>
+        <p:spPr>
+          <a:xfrm>
+            <a:off x="471900" y="738725"/>
+            <a:ext cx="8222100" cy="767700"/>
+          </a:xfrm>
+          <a:prstGeom prst="rect">
+            <a:avLst/>
+          </a:prstGeom>
+        </p:spPr>
+        <p:txBody>
+          <a:bodyPr anchorCtr="0" anchor="b" bIns="91425" lIns="91425" spcFirstLastPara="1" rIns="91425" wrap="square" tIns="91425">
+            <a:normAutofit/>
+          </a:bodyPr>
+          <a:lstStyle/>
+          <a:p>
+            <a:pPr indent="0" lvl="0" marL="0" rtl="0" algn="ctr">
+              <a:spcBef>
+                <a:spcPts val="0"/>
+              </a:spcBef>
+              <a:spcAft>
+                <a:spcPts val="0"/>
+              </a:spcAft>
+              <a:buNone/>
+            </a:pPr>
+            <a:r>
+              <a:rPr lang="ru"/>
+              <a:t>Список литературы</a:t>
+            </a:r>
+            <a:endParaRPr/>
+          </a:p>
+        </p:txBody>
+      </p:sp>
+      <p:sp>
+        <p:nvSpPr>
+          <p:cNvPr id="213" name="Google Shape;213;p35"/>
+          <p:cNvSpPr txBox="1"/>
+          <p:nvPr>
+            <p:ph idx="1" type="body"/>
+          </p:nvPr>
+        </p:nvSpPr>
+        <p:spPr>
+          <a:xfrm>
+            <a:off x="471900" y="1919075"/>
+            <a:ext cx="8222100" cy="2710200"/>
+          </a:xfrm>
+          <a:prstGeom prst="rect">
+            <a:avLst/>
+          </a:prstGeom>
+        </p:spPr>
+        <p:txBody>
+          <a:bodyPr anchorCtr="0" anchor="t" bIns="91425" lIns="91425" spcFirstLastPara="1" rIns="91425" wrap="square" tIns="91425">
+            <a:normAutofit/>
+          </a:bodyPr>
+          <a:lstStyle/>
+          <a:p>
+            <a:pPr indent="-342900" lvl="0" marL="457200" rtl="0" algn="l">
+              <a:lnSpc>
+                <a:spcPct val="122000"/>
+              </a:lnSpc>
+              <a:spcBef>
+                <a:spcPts val="200"/>
+              </a:spcBef>
+              <a:spcAft>
+                <a:spcPts val="0"/>
+              </a:spcAft>
+              <a:buSzPts val="1800"/>
+              <a:buChar char="●"/>
+            </a:pPr>
+            <a:r>
+              <a:rPr lang="ru"/>
+              <a:t>"Python для чайников" - Джон Мюллер.</a:t>
+            </a:r>
+            <a:endParaRPr/>
+          </a:p>
+          <a:p>
+            <a:pPr indent="-342900" lvl="0" marL="457200" marR="101600" rtl="0" algn="l">
+              <a:lnSpc>
+                <a:spcPct val="112500"/>
+              </a:lnSpc>
+              <a:spcBef>
+                <a:spcPts val="0"/>
+              </a:spcBef>
+              <a:spcAft>
+                <a:spcPts val="0"/>
+              </a:spcAft>
+              <a:buSzPts val="1800"/>
+              <a:buChar char="●"/>
+            </a:pPr>
+            <a:r>
+              <a:rPr lang="ru"/>
+              <a:t>Мигель Гринберг: Разработка веб-приложений с использованием Flask на языке Python</a:t>
+            </a:r>
+            <a:endParaRPr/>
           </a:p>
         </p:txBody>
       </p:sp>
@@ -7780,13 +11239,12 @@
           <p:cNvPicPr preferRelativeResize="0"/>
           <p:nvPr/>
         </p:nvPicPr>
-        <p:blipFill>
+        <p:blipFill rotWithShape="1">
           <a:blip r:embed="rId3">
             <a:alphaModFix/>
           </a:blip>
-          <a:stretch>
-            <a:fillRect/>
-          </a:stretch>
+          <a:srcRect b="893" l="0" r="0" t="903"/>
+          <a:stretch/>
         </p:blipFill>
         <p:spPr>
           <a:xfrm>
@@ -7985,6 +11443,1038 @@
       </p:par>
     </p:tnLst>
   </p:timing>
+</p:sld>
+</file>
+
+<file path=ppt/slides/slide7.xml><?xml version="1.0" encoding="utf-8"?>
+<p:sld xmlns:a="http://schemas.openxmlformats.org/drawingml/2006/main" xmlns:r="http://schemas.openxmlformats.org/officeDocument/2006/relationships" xmlns:mc="http://schemas.openxmlformats.org/markup-compatibility/2006" xmlns:mv="urn:schemas-microsoft-com:mac:vml" xmlns:p="http://schemas.openxmlformats.org/presentationml/2006/main" xmlns:c="http://schemas.openxmlformats.org/drawingml/2006/chart" xmlns:dgm="http://schemas.openxmlformats.org/drawingml/2006/diagram" xmlns:o="urn:schemas-microsoft-com:office:office" xmlns:v="urn:schemas-microsoft-com:vml" xmlns:pvml="urn:schemas-microsoft-com:office:powerpoint" xmlns:com="http://schemas.openxmlformats.org/drawingml/2006/compatibility" xmlns:p14="http://schemas.microsoft.com/office/powerpoint/2010/main" xmlns:p15="http://schemas.microsoft.com/office/powerpoint/2012/main" xmlns:ahyp="http://schemas.microsoft.com/office/drawing/2018/hyperlinkcolor">
+  <p:cSld>
+    <p:spTree>
+      <p:nvGrpSpPr>
+        <p:cNvPr id="105" name="Shape 105"/>
+        <p:cNvGrpSpPr/>
+        <p:nvPr/>
+      </p:nvGrpSpPr>
+      <p:grpSpPr>
+        <a:xfrm>
+          <a:off x="0" y="0"/>
+          <a:ext cx="0" cy="0"/>
+          <a:chOff x="0" y="0"/>
+          <a:chExt cx="0" cy="0"/>
+        </a:xfrm>
+      </p:grpSpPr>
+      <p:sp>
+        <p:nvSpPr>
+          <p:cNvPr id="106" name="Google Shape;106;p19"/>
+          <p:cNvSpPr txBox="1"/>
+          <p:nvPr>
+            <p:ph type="title"/>
+          </p:nvPr>
+        </p:nvSpPr>
+        <p:spPr>
+          <a:xfrm>
+            <a:off x="226078" y="357800"/>
+            <a:ext cx="2808000" cy="953400"/>
+          </a:xfrm>
+          <a:prstGeom prst="rect">
+            <a:avLst/>
+          </a:prstGeom>
+        </p:spPr>
+        <p:txBody>
+          <a:bodyPr anchorCtr="0" anchor="b" bIns="91425" lIns="91425" spcFirstLastPara="1" rIns="91425" wrap="square" tIns="91425">
+            <a:normAutofit/>
+          </a:bodyPr>
+          <a:lstStyle/>
+          <a:p>
+            <a:pPr indent="0" lvl="0" marL="0" rtl="0" algn="l">
+              <a:spcBef>
+                <a:spcPts val="0"/>
+              </a:spcBef>
+              <a:spcAft>
+                <a:spcPts val="0"/>
+              </a:spcAft>
+              <a:buNone/>
+            </a:pPr>
+            <a:r>
+              <a:rPr lang="ru"/>
+              <a:t>requirements.txt</a:t>
+            </a:r>
+            <a:endParaRPr/>
+          </a:p>
+        </p:txBody>
+      </p:sp>
+      <p:sp>
+        <p:nvSpPr>
+          <p:cNvPr id="107" name="Google Shape;107;p19"/>
+          <p:cNvSpPr txBox="1"/>
+          <p:nvPr>
+            <p:ph idx="1" type="body"/>
+          </p:nvPr>
+        </p:nvSpPr>
+        <p:spPr>
+          <a:xfrm>
+            <a:off x="226075" y="1465800"/>
+            <a:ext cx="2808000" cy="3163500"/>
+          </a:xfrm>
+          <a:prstGeom prst="rect">
+            <a:avLst/>
+          </a:prstGeom>
+        </p:spPr>
+        <p:txBody>
+          <a:bodyPr anchorCtr="0" anchor="t" bIns="91425" lIns="91425" spcFirstLastPara="1" rIns="91425" wrap="square" tIns="91425">
+            <a:normAutofit/>
+          </a:bodyPr>
+          <a:lstStyle/>
+          <a:p>
+            <a:pPr indent="0" lvl="0" marL="0" rtl="0" algn="l">
+              <a:spcBef>
+                <a:spcPts val="0"/>
+              </a:spcBef>
+              <a:spcAft>
+                <a:spcPts val="1200"/>
+              </a:spcAft>
+              <a:buNone/>
+            </a:pPr>
+            <a:r>
+              <a:rPr lang="ru"/>
+              <a:t>Библиотеки, используемые проектом.</a:t>
+            </a:r>
+            <a:endParaRPr/>
+          </a:p>
+        </p:txBody>
+      </p:sp>
+      <p:sp>
+        <p:nvSpPr>
+          <p:cNvPr id="108" name="Google Shape;108;p19"/>
+          <p:cNvSpPr txBox="1"/>
+          <p:nvPr/>
+        </p:nvSpPr>
+        <p:spPr>
+          <a:xfrm>
+            <a:off x="3484325" y="1178700"/>
+            <a:ext cx="5506500" cy="2986200"/>
+          </a:xfrm>
+          <a:prstGeom prst="rect">
+            <a:avLst/>
+          </a:prstGeom>
+          <a:noFill/>
+          <a:ln>
+            <a:noFill/>
+          </a:ln>
+        </p:spPr>
+        <p:txBody>
+          <a:bodyPr anchorCtr="0" anchor="t" bIns="91425" lIns="91425" spcFirstLastPara="1" rIns="91425" wrap="square" tIns="91425">
+            <a:spAutoFit/>
+          </a:bodyPr>
+          <a:lstStyle/>
+          <a:p>
+            <a:pPr indent="0" lvl="0" marL="0" rtl="0" algn="l">
+              <a:spcBef>
+                <a:spcPts val="0"/>
+              </a:spcBef>
+              <a:spcAft>
+                <a:spcPts val="0"/>
+              </a:spcAft>
+              <a:buNone/>
+            </a:pPr>
+            <a:r>
+              <a:rPr lang="ru">
+                <a:solidFill>
+                  <a:schemeClr val="dk2"/>
+                </a:solidFill>
+                <a:latin typeface="Roboto"/>
+                <a:ea typeface="Roboto"/>
+                <a:cs typeface="Roboto"/>
+                <a:sym typeface="Roboto"/>
+              </a:rPr>
+              <a:t>flask==2.0.3</a:t>
+            </a:r>
+            <a:endParaRPr>
+              <a:solidFill>
+                <a:schemeClr val="dk2"/>
+              </a:solidFill>
+              <a:latin typeface="Roboto"/>
+              <a:ea typeface="Roboto"/>
+              <a:cs typeface="Roboto"/>
+              <a:sym typeface="Roboto"/>
+            </a:endParaRPr>
+          </a:p>
+          <a:p>
+            <a:pPr indent="0" lvl="0" marL="0" rtl="0" algn="l">
+              <a:spcBef>
+                <a:spcPts val="0"/>
+              </a:spcBef>
+              <a:spcAft>
+                <a:spcPts val="0"/>
+              </a:spcAft>
+              <a:buNone/>
+            </a:pPr>
+            <a:r>
+              <a:rPr lang="ru">
+                <a:solidFill>
+                  <a:schemeClr val="dk2"/>
+                </a:solidFill>
+                <a:latin typeface="Roboto"/>
+                <a:ea typeface="Roboto"/>
+                <a:cs typeface="Roboto"/>
+                <a:sym typeface="Roboto"/>
+              </a:rPr>
+              <a:t>python-dotenv==0.19.2</a:t>
+            </a:r>
+            <a:endParaRPr>
+              <a:solidFill>
+                <a:schemeClr val="dk2"/>
+              </a:solidFill>
+              <a:latin typeface="Roboto"/>
+              <a:ea typeface="Roboto"/>
+              <a:cs typeface="Roboto"/>
+              <a:sym typeface="Roboto"/>
+            </a:endParaRPr>
+          </a:p>
+          <a:p>
+            <a:pPr indent="0" lvl="0" marL="0" rtl="0" algn="l">
+              <a:spcBef>
+                <a:spcPts val="0"/>
+              </a:spcBef>
+              <a:spcAft>
+                <a:spcPts val="0"/>
+              </a:spcAft>
+              <a:buNone/>
+            </a:pPr>
+            <a:r>
+              <a:rPr lang="ru">
+                <a:solidFill>
+                  <a:schemeClr val="dk2"/>
+                </a:solidFill>
+                <a:latin typeface="Roboto"/>
+                <a:ea typeface="Roboto"/>
+                <a:cs typeface="Roboto"/>
+                <a:sym typeface="Roboto"/>
+              </a:rPr>
+              <a:t>flask-wtf==1.0.0</a:t>
+            </a:r>
+            <a:endParaRPr>
+              <a:solidFill>
+                <a:schemeClr val="dk2"/>
+              </a:solidFill>
+              <a:latin typeface="Roboto"/>
+              <a:ea typeface="Roboto"/>
+              <a:cs typeface="Roboto"/>
+              <a:sym typeface="Roboto"/>
+            </a:endParaRPr>
+          </a:p>
+          <a:p>
+            <a:pPr indent="0" lvl="0" marL="0" rtl="0" algn="l">
+              <a:spcBef>
+                <a:spcPts val="0"/>
+              </a:spcBef>
+              <a:spcAft>
+                <a:spcPts val="0"/>
+              </a:spcAft>
+              <a:buNone/>
+            </a:pPr>
+            <a:r>
+              <a:rPr lang="ru">
+                <a:solidFill>
+                  <a:schemeClr val="dk2"/>
+                </a:solidFill>
+                <a:latin typeface="Roboto"/>
+                <a:ea typeface="Roboto"/>
+                <a:cs typeface="Roboto"/>
+                <a:sym typeface="Roboto"/>
+              </a:rPr>
+              <a:t>bootstrap-flask==2.0.1</a:t>
+            </a:r>
+            <a:endParaRPr>
+              <a:solidFill>
+                <a:schemeClr val="dk2"/>
+              </a:solidFill>
+              <a:latin typeface="Roboto"/>
+              <a:ea typeface="Roboto"/>
+              <a:cs typeface="Roboto"/>
+              <a:sym typeface="Roboto"/>
+            </a:endParaRPr>
+          </a:p>
+          <a:p>
+            <a:pPr indent="0" lvl="0" marL="0" rtl="0" algn="l">
+              <a:spcBef>
+                <a:spcPts val="0"/>
+              </a:spcBef>
+              <a:spcAft>
+                <a:spcPts val="0"/>
+              </a:spcAft>
+              <a:buNone/>
+            </a:pPr>
+            <a:r>
+              <a:rPr lang="ru">
+                <a:solidFill>
+                  <a:schemeClr val="dk2"/>
+                </a:solidFill>
+                <a:latin typeface="Roboto"/>
+                <a:ea typeface="Roboto"/>
+                <a:cs typeface="Roboto"/>
+                <a:sym typeface="Roboto"/>
+              </a:rPr>
+              <a:t>sqlalchemy==1.4.31</a:t>
+            </a:r>
+            <a:endParaRPr>
+              <a:solidFill>
+                <a:schemeClr val="dk2"/>
+              </a:solidFill>
+              <a:latin typeface="Roboto"/>
+              <a:ea typeface="Roboto"/>
+              <a:cs typeface="Roboto"/>
+              <a:sym typeface="Roboto"/>
+            </a:endParaRPr>
+          </a:p>
+          <a:p>
+            <a:pPr indent="0" lvl="0" marL="0" rtl="0" algn="l">
+              <a:spcBef>
+                <a:spcPts val="0"/>
+              </a:spcBef>
+              <a:spcAft>
+                <a:spcPts val="0"/>
+              </a:spcAft>
+              <a:buNone/>
+            </a:pPr>
+            <a:r>
+              <a:rPr lang="ru">
+                <a:solidFill>
+                  <a:schemeClr val="dk2"/>
+                </a:solidFill>
+                <a:latin typeface="Roboto"/>
+                <a:ea typeface="Roboto"/>
+                <a:cs typeface="Roboto"/>
+                <a:sym typeface="Roboto"/>
+              </a:rPr>
+              <a:t>Flask-SQLAlchemy</a:t>
+            </a:r>
+            <a:endParaRPr>
+              <a:solidFill>
+                <a:schemeClr val="dk2"/>
+              </a:solidFill>
+              <a:latin typeface="Roboto"/>
+              <a:ea typeface="Roboto"/>
+              <a:cs typeface="Roboto"/>
+              <a:sym typeface="Roboto"/>
+            </a:endParaRPr>
+          </a:p>
+          <a:p>
+            <a:pPr indent="0" lvl="0" marL="0" rtl="0" algn="l">
+              <a:spcBef>
+                <a:spcPts val="0"/>
+              </a:spcBef>
+              <a:spcAft>
+                <a:spcPts val="0"/>
+              </a:spcAft>
+              <a:buNone/>
+            </a:pPr>
+            <a:r>
+              <a:rPr lang="ru">
+                <a:solidFill>
+                  <a:schemeClr val="dk2"/>
+                </a:solidFill>
+                <a:latin typeface="Roboto"/>
+                <a:ea typeface="Roboto"/>
+                <a:cs typeface="Roboto"/>
+                <a:sym typeface="Roboto"/>
+              </a:rPr>
+              <a:t>flask-migrate</a:t>
+            </a:r>
+            <a:endParaRPr>
+              <a:solidFill>
+                <a:schemeClr val="dk2"/>
+              </a:solidFill>
+              <a:latin typeface="Roboto"/>
+              <a:ea typeface="Roboto"/>
+              <a:cs typeface="Roboto"/>
+              <a:sym typeface="Roboto"/>
+            </a:endParaRPr>
+          </a:p>
+          <a:p>
+            <a:pPr indent="0" lvl="0" marL="0" rtl="0" algn="l">
+              <a:spcBef>
+                <a:spcPts val="0"/>
+              </a:spcBef>
+              <a:spcAft>
+                <a:spcPts val="0"/>
+              </a:spcAft>
+              <a:buNone/>
+            </a:pPr>
+            <a:r>
+              <a:rPr lang="ru">
+                <a:solidFill>
+                  <a:schemeClr val="dk2"/>
+                </a:solidFill>
+                <a:latin typeface="Roboto"/>
+                <a:ea typeface="Roboto"/>
+                <a:cs typeface="Roboto"/>
+                <a:sym typeface="Roboto"/>
+              </a:rPr>
+              <a:t>flask-login==0.6.0</a:t>
+            </a:r>
+            <a:endParaRPr>
+              <a:solidFill>
+                <a:schemeClr val="dk2"/>
+              </a:solidFill>
+              <a:latin typeface="Roboto"/>
+              <a:ea typeface="Roboto"/>
+              <a:cs typeface="Roboto"/>
+              <a:sym typeface="Roboto"/>
+            </a:endParaRPr>
+          </a:p>
+          <a:p>
+            <a:pPr indent="0" lvl="0" marL="0" rtl="0" algn="l">
+              <a:spcBef>
+                <a:spcPts val="0"/>
+              </a:spcBef>
+              <a:spcAft>
+                <a:spcPts val="0"/>
+              </a:spcAft>
+              <a:buNone/>
+            </a:pPr>
+            <a:r>
+              <a:rPr lang="ru">
+                <a:solidFill>
+                  <a:schemeClr val="dk2"/>
+                </a:solidFill>
+                <a:latin typeface="Roboto"/>
+                <a:ea typeface="Roboto"/>
+                <a:cs typeface="Roboto"/>
+                <a:sym typeface="Roboto"/>
+              </a:rPr>
+              <a:t>flask-restful==0.3.9</a:t>
+            </a:r>
+            <a:endParaRPr>
+              <a:solidFill>
+                <a:schemeClr val="dk2"/>
+              </a:solidFill>
+              <a:latin typeface="Roboto"/>
+              <a:ea typeface="Roboto"/>
+              <a:cs typeface="Roboto"/>
+              <a:sym typeface="Roboto"/>
+            </a:endParaRPr>
+          </a:p>
+          <a:p>
+            <a:pPr indent="0" lvl="0" marL="0" rtl="0" algn="l">
+              <a:spcBef>
+                <a:spcPts val="0"/>
+              </a:spcBef>
+              <a:spcAft>
+                <a:spcPts val="0"/>
+              </a:spcAft>
+              <a:buNone/>
+            </a:pPr>
+            <a:r>
+              <a:rPr lang="ru">
+                <a:solidFill>
+                  <a:schemeClr val="dk2"/>
+                </a:solidFill>
+                <a:latin typeface="Roboto"/>
+                <a:ea typeface="Roboto"/>
+                <a:cs typeface="Roboto"/>
+                <a:sym typeface="Roboto"/>
+              </a:rPr>
+              <a:t>flask-apispec==0.11.0</a:t>
+            </a:r>
+            <a:endParaRPr>
+              <a:solidFill>
+                <a:schemeClr val="dk2"/>
+              </a:solidFill>
+              <a:latin typeface="Roboto"/>
+              <a:ea typeface="Roboto"/>
+              <a:cs typeface="Roboto"/>
+              <a:sym typeface="Roboto"/>
+            </a:endParaRPr>
+          </a:p>
+          <a:p>
+            <a:pPr indent="0" lvl="0" marL="0" rtl="0" algn="l">
+              <a:spcBef>
+                <a:spcPts val="0"/>
+              </a:spcBef>
+              <a:spcAft>
+                <a:spcPts val="0"/>
+              </a:spcAft>
+              <a:buNone/>
+            </a:pPr>
+            <a:r>
+              <a:rPr lang="ru">
+                <a:solidFill>
+                  <a:schemeClr val="dk2"/>
+                </a:solidFill>
+                <a:latin typeface="Roboto"/>
+                <a:ea typeface="Roboto"/>
+                <a:cs typeface="Roboto"/>
+                <a:sym typeface="Roboto"/>
+              </a:rPr>
+              <a:t>flask-marshmallow==0.14.0</a:t>
+            </a:r>
+            <a:endParaRPr>
+              <a:solidFill>
+                <a:schemeClr val="dk2"/>
+              </a:solidFill>
+              <a:latin typeface="Roboto"/>
+              <a:ea typeface="Roboto"/>
+              <a:cs typeface="Roboto"/>
+              <a:sym typeface="Roboto"/>
+            </a:endParaRPr>
+          </a:p>
+          <a:p>
+            <a:pPr indent="0" lvl="0" marL="0" rtl="0" algn="l">
+              <a:spcBef>
+                <a:spcPts val="0"/>
+              </a:spcBef>
+              <a:spcAft>
+                <a:spcPts val="0"/>
+              </a:spcAft>
+              <a:buNone/>
+            </a:pPr>
+            <a:r>
+              <a:rPr lang="ru">
+                <a:solidFill>
+                  <a:schemeClr val="dk2"/>
+                </a:solidFill>
+                <a:latin typeface="Roboto"/>
+                <a:ea typeface="Roboto"/>
+                <a:cs typeface="Roboto"/>
+                <a:sym typeface="Roboto"/>
+              </a:rPr>
+              <a:t>marshmallow-sqlalchemy==0.28.0</a:t>
+            </a:r>
+            <a:endParaRPr>
+              <a:solidFill>
+                <a:schemeClr val="dk2"/>
+              </a:solidFill>
+              <a:latin typeface="Roboto"/>
+              <a:ea typeface="Roboto"/>
+              <a:cs typeface="Roboto"/>
+              <a:sym typeface="Roboto"/>
+            </a:endParaRPr>
+          </a:p>
+          <a:p>
+            <a:pPr indent="0" lvl="0" marL="0" rtl="0" algn="l">
+              <a:spcBef>
+                <a:spcPts val="0"/>
+              </a:spcBef>
+              <a:spcAft>
+                <a:spcPts val="0"/>
+              </a:spcAft>
+              <a:buNone/>
+            </a:pPr>
+            <a:r>
+              <a:rPr lang="ru">
+                <a:solidFill>
+                  <a:schemeClr val="dk2"/>
+                </a:solidFill>
+                <a:latin typeface="Roboto"/>
+                <a:ea typeface="Roboto"/>
+                <a:cs typeface="Roboto"/>
+                <a:sym typeface="Roboto"/>
+              </a:rPr>
+              <a:t>flask-jwt-extended==4.3.1</a:t>
+            </a:r>
+            <a:endParaRPr>
+              <a:solidFill>
+                <a:schemeClr val="dk2"/>
+              </a:solidFill>
+              <a:latin typeface="Roboto"/>
+              <a:ea typeface="Roboto"/>
+              <a:cs typeface="Roboto"/>
+              <a:sym typeface="Roboto"/>
+            </a:endParaRPr>
+          </a:p>
+        </p:txBody>
+      </p:sp>
+    </p:spTree>
+  </p:cSld>
+  <p:clrMapOvr>
+    <a:masterClrMapping/>
+  </p:clrMapOvr>
+</p:sld>
+</file>
+
+<file path=ppt/slides/slide8.xml><?xml version="1.0" encoding="utf-8"?>
+<p:sld xmlns:a="http://schemas.openxmlformats.org/drawingml/2006/main" xmlns:r="http://schemas.openxmlformats.org/officeDocument/2006/relationships" xmlns:mc="http://schemas.openxmlformats.org/markup-compatibility/2006" xmlns:mv="urn:schemas-microsoft-com:mac:vml" xmlns:p="http://schemas.openxmlformats.org/presentationml/2006/main" xmlns:c="http://schemas.openxmlformats.org/drawingml/2006/chart" xmlns:dgm="http://schemas.openxmlformats.org/drawingml/2006/diagram" xmlns:o="urn:schemas-microsoft-com:office:office" xmlns:v="urn:schemas-microsoft-com:vml" xmlns:pvml="urn:schemas-microsoft-com:office:powerpoint" xmlns:com="http://schemas.openxmlformats.org/drawingml/2006/compatibility" xmlns:p14="http://schemas.microsoft.com/office/powerpoint/2010/main" xmlns:p15="http://schemas.microsoft.com/office/powerpoint/2012/main" xmlns:ahyp="http://schemas.microsoft.com/office/drawing/2018/hyperlinkcolor">
+  <p:cSld>
+    <p:spTree>
+      <p:nvGrpSpPr>
+        <p:cNvPr id="112" name="Shape 112"/>
+        <p:cNvGrpSpPr/>
+        <p:nvPr/>
+      </p:nvGrpSpPr>
+      <p:grpSpPr>
+        <a:xfrm>
+          <a:off x="0" y="0"/>
+          <a:ext cx="0" cy="0"/>
+          <a:chOff x="0" y="0"/>
+          <a:chExt cx="0" cy="0"/>
+        </a:xfrm>
+      </p:grpSpPr>
+      <p:sp>
+        <p:nvSpPr>
+          <p:cNvPr id="113" name="Google Shape;113;p20"/>
+          <p:cNvSpPr txBox="1"/>
+          <p:nvPr>
+            <p:ph type="title"/>
+          </p:nvPr>
+        </p:nvSpPr>
+        <p:spPr>
+          <a:xfrm>
+            <a:off x="98250" y="16350"/>
+            <a:ext cx="8826600" cy="602700"/>
+          </a:xfrm>
+          <a:prstGeom prst="rect">
+            <a:avLst/>
+          </a:prstGeom>
+        </p:spPr>
+        <p:txBody>
+          <a:bodyPr anchorCtr="0" anchor="ctr" bIns="91425" lIns="91425" spcFirstLastPara="1" rIns="91425" wrap="square" tIns="91425">
+            <a:normAutofit/>
+          </a:bodyPr>
+          <a:lstStyle/>
+          <a:p>
+            <a:pPr indent="0" lvl="0" marL="0" rtl="0" algn="ctr">
+              <a:spcBef>
+                <a:spcPts val="0"/>
+              </a:spcBef>
+              <a:spcAft>
+                <a:spcPts val="0"/>
+              </a:spcAft>
+              <a:buNone/>
+            </a:pPr>
+            <a:r>
+              <a:rPr lang="ru"/>
+              <a:t>requirements.txt</a:t>
+            </a:r>
+            <a:endParaRPr/>
+          </a:p>
+        </p:txBody>
+      </p:sp>
+      <p:pic>
+        <p:nvPicPr>
+          <p:cNvPr id="114" name="Google Shape;114;p20"/>
+          <p:cNvPicPr preferRelativeResize="0"/>
+          <p:nvPr/>
+        </p:nvPicPr>
+        <p:blipFill>
+          <a:blip r:embed="rId3">
+            <a:alphaModFix/>
+          </a:blip>
+          <a:stretch>
+            <a:fillRect/>
+          </a:stretch>
+        </p:blipFill>
+        <p:spPr>
+          <a:xfrm>
+            <a:off x="152400" y="1243888"/>
+            <a:ext cx="8839199" cy="2655725"/>
+          </a:xfrm>
+          <a:prstGeom prst="rect">
+            <a:avLst/>
+          </a:prstGeom>
+          <a:noFill/>
+          <a:ln>
+            <a:noFill/>
+          </a:ln>
+        </p:spPr>
+      </p:pic>
+    </p:spTree>
+  </p:cSld>
+  <p:clrMapOvr>
+    <a:masterClrMapping/>
+  </p:clrMapOvr>
+</p:sld>
+</file>
+
+<file path=ppt/slides/slide9.xml><?xml version="1.0" encoding="utf-8"?>
+<p:sld xmlns:a="http://schemas.openxmlformats.org/drawingml/2006/main" xmlns:r="http://schemas.openxmlformats.org/officeDocument/2006/relationships" xmlns:mc="http://schemas.openxmlformats.org/markup-compatibility/2006" xmlns:mv="urn:schemas-microsoft-com:mac:vml" xmlns:p="http://schemas.openxmlformats.org/presentationml/2006/main" xmlns:c="http://schemas.openxmlformats.org/drawingml/2006/chart" xmlns:dgm="http://schemas.openxmlformats.org/drawingml/2006/diagram" xmlns:o="urn:schemas-microsoft-com:office:office" xmlns:v="urn:schemas-microsoft-com:vml" xmlns:pvml="urn:schemas-microsoft-com:office:powerpoint" xmlns:com="http://schemas.openxmlformats.org/drawingml/2006/compatibility" xmlns:p14="http://schemas.microsoft.com/office/powerpoint/2010/main" xmlns:p15="http://schemas.microsoft.com/office/powerpoint/2012/main" xmlns:ahyp="http://schemas.microsoft.com/office/drawing/2018/hyperlinkcolor">
+  <p:cSld>
+    <p:spTree>
+      <p:nvGrpSpPr>
+        <p:cNvPr id="118" name="Shape 118"/>
+        <p:cNvGrpSpPr/>
+        <p:nvPr/>
+      </p:nvGrpSpPr>
+      <p:grpSpPr>
+        <a:xfrm>
+          <a:off x="0" y="0"/>
+          <a:ext cx="0" cy="0"/>
+          <a:chOff x="0" y="0"/>
+          <a:chExt cx="0" cy="0"/>
+        </a:xfrm>
+      </p:grpSpPr>
+      <p:sp>
+        <p:nvSpPr>
+          <p:cNvPr id="119" name="Google Shape;119;p21"/>
+          <p:cNvSpPr txBox="1"/>
+          <p:nvPr>
+            <p:ph type="title"/>
+          </p:nvPr>
+        </p:nvSpPr>
+        <p:spPr>
+          <a:xfrm>
+            <a:off x="98250" y="16350"/>
+            <a:ext cx="8826600" cy="602700"/>
+          </a:xfrm>
+          <a:prstGeom prst="rect">
+            <a:avLst/>
+          </a:prstGeom>
+        </p:spPr>
+        <p:txBody>
+          <a:bodyPr anchorCtr="0" anchor="ctr" bIns="91425" lIns="91425" spcFirstLastPara="1" rIns="91425" wrap="square" tIns="91425">
+            <a:normAutofit/>
+          </a:bodyPr>
+          <a:lstStyle/>
+          <a:p>
+            <a:pPr indent="0" lvl="0" marL="0" rtl="0" algn="ctr">
+              <a:spcBef>
+                <a:spcPts val="0"/>
+              </a:spcBef>
+              <a:spcAft>
+                <a:spcPts val="0"/>
+              </a:spcAft>
+              <a:buNone/>
+            </a:pPr>
+            <a:r>
+              <a:rPr lang="ru"/>
+              <a:t>bootstrap</a:t>
+            </a:r>
+            <a:endParaRPr/>
+          </a:p>
+        </p:txBody>
+      </p:sp>
+      <p:sp>
+        <p:nvSpPr>
+          <p:cNvPr id="120" name="Google Shape;120;p21"/>
+          <p:cNvSpPr txBox="1"/>
+          <p:nvPr/>
+        </p:nvSpPr>
+        <p:spPr>
+          <a:xfrm>
+            <a:off x="197700" y="881450"/>
+            <a:ext cx="4947000" cy="400200"/>
+          </a:xfrm>
+          <a:prstGeom prst="rect">
+            <a:avLst/>
+          </a:prstGeom>
+          <a:noFill/>
+          <a:ln>
+            <a:noFill/>
+          </a:ln>
+        </p:spPr>
+        <p:txBody>
+          <a:bodyPr anchorCtr="0" anchor="t" bIns="91425" lIns="91425" spcFirstLastPara="1" rIns="91425" wrap="square" tIns="91425">
+            <a:spAutoFit/>
+          </a:bodyPr>
+          <a:lstStyle/>
+          <a:p>
+            <a:pPr indent="-317500" lvl="0" marL="457200" rtl="0" algn="l">
+              <a:spcBef>
+                <a:spcPts val="0"/>
+              </a:spcBef>
+              <a:spcAft>
+                <a:spcPts val="0"/>
+              </a:spcAft>
+              <a:buSzPts val="1400"/>
+              <a:buFont typeface="Roboto"/>
+              <a:buChar char="●"/>
+            </a:pPr>
+            <a:r>
+              <a:rPr lang="ru">
+                <a:latin typeface="Roboto"/>
+                <a:ea typeface="Roboto"/>
+                <a:cs typeface="Roboto"/>
+                <a:sym typeface="Roboto"/>
+              </a:rPr>
+              <a:t>Панель навигации. (</a:t>
+            </a:r>
+            <a:r>
+              <a:rPr lang="ru">
+                <a:solidFill>
+                  <a:schemeClr val="dk2"/>
+                </a:solidFill>
+                <a:latin typeface="Roboto"/>
+                <a:ea typeface="Roboto"/>
+                <a:cs typeface="Roboto"/>
+                <a:sym typeface="Roboto"/>
+              </a:rPr>
+              <a:t>docs/5.1/components/navbar/</a:t>
+            </a:r>
+            <a:r>
+              <a:rPr lang="ru">
+                <a:latin typeface="Roboto"/>
+                <a:ea typeface="Roboto"/>
+                <a:cs typeface="Roboto"/>
+                <a:sym typeface="Roboto"/>
+              </a:rPr>
+              <a:t>)</a:t>
+            </a:r>
+            <a:endParaRPr>
+              <a:latin typeface="Roboto"/>
+              <a:ea typeface="Roboto"/>
+              <a:cs typeface="Roboto"/>
+              <a:sym typeface="Roboto"/>
+            </a:endParaRPr>
+          </a:p>
+        </p:txBody>
+      </p:sp>
+      <p:pic>
+        <p:nvPicPr>
+          <p:cNvPr id="121" name="Google Shape;121;p21"/>
+          <p:cNvPicPr preferRelativeResize="0"/>
+          <p:nvPr/>
+        </p:nvPicPr>
+        <p:blipFill>
+          <a:blip r:embed="rId3">
+            <a:alphaModFix/>
+          </a:blip>
+          <a:stretch>
+            <a:fillRect/>
+          </a:stretch>
+        </p:blipFill>
+        <p:spPr>
+          <a:xfrm>
+            <a:off x="197700" y="1442825"/>
+            <a:ext cx="8627698" cy="328325"/>
+          </a:xfrm>
+          <a:prstGeom prst="rect">
+            <a:avLst/>
+          </a:prstGeom>
+          <a:noFill/>
+          <a:ln>
+            <a:noFill/>
+          </a:ln>
+        </p:spPr>
+      </p:pic>
+      <p:pic>
+        <p:nvPicPr>
+          <p:cNvPr id="122" name="Google Shape;122;p21"/>
+          <p:cNvPicPr preferRelativeResize="0"/>
+          <p:nvPr/>
+        </p:nvPicPr>
+        <p:blipFill>
+          <a:blip r:embed="rId4">
+            <a:alphaModFix/>
+          </a:blip>
+          <a:stretch>
+            <a:fillRect/>
+          </a:stretch>
+        </p:blipFill>
+        <p:spPr>
+          <a:xfrm>
+            <a:off x="832650" y="2737006"/>
+            <a:ext cx="2667000" cy="1747837"/>
+          </a:xfrm>
+          <a:prstGeom prst="rect">
+            <a:avLst/>
+          </a:prstGeom>
+          <a:noFill/>
+          <a:ln>
+            <a:noFill/>
+          </a:ln>
+        </p:spPr>
+      </p:pic>
+      <p:sp>
+        <p:nvSpPr>
+          <p:cNvPr id="123" name="Google Shape;123;p21"/>
+          <p:cNvSpPr txBox="1"/>
+          <p:nvPr/>
+        </p:nvSpPr>
+        <p:spPr>
+          <a:xfrm>
+            <a:off x="197700" y="1982950"/>
+            <a:ext cx="3936900" cy="400200"/>
+          </a:xfrm>
+          <a:prstGeom prst="rect">
+            <a:avLst/>
+          </a:prstGeom>
+          <a:noFill/>
+          <a:ln>
+            <a:noFill/>
+          </a:ln>
+        </p:spPr>
+        <p:txBody>
+          <a:bodyPr anchorCtr="0" anchor="t" bIns="91425" lIns="91425" spcFirstLastPara="1" rIns="91425" wrap="square" tIns="91425">
+            <a:spAutoFit/>
+          </a:bodyPr>
+          <a:lstStyle/>
+          <a:p>
+            <a:pPr indent="-317500" lvl="0" marL="457200" rtl="0" algn="l">
+              <a:spcBef>
+                <a:spcPts val="0"/>
+              </a:spcBef>
+              <a:spcAft>
+                <a:spcPts val="0"/>
+              </a:spcAft>
+              <a:buSzPts val="1400"/>
+              <a:buFont typeface="Roboto"/>
+              <a:buChar char="●"/>
+            </a:pPr>
+            <a:r>
+              <a:rPr lang="ru">
+                <a:latin typeface="Roboto"/>
+                <a:ea typeface="Roboto"/>
+                <a:cs typeface="Roboto"/>
+                <a:sym typeface="Roboto"/>
+              </a:rPr>
+              <a:t>Карточка</a:t>
+            </a:r>
+            <a:r>
+              <a:rPr lang="ru">
+                <a:latin typeface="Roboto"/>
+                <a:ea typeface="Roboto"/>
+                <a:cs typeface="Roboto"/>
+                <a:sym typeface="Roboto"/>
+              </a:rPr>
+              <a:t>. (</a:t>
+            </a:r>
+            <a:r>
+              <a:rPr lang="ru">
+                <a:solidFill>
+                  <a:schemeClr val="dk2"/>
+                </a:solidFill>
+                <a:latin typeface="Roboto"/>
+                <a:ea typeface="Roboto"/>
+                <a:cs typeface="Roboto"/>
+                <a:sym typeface="Roboto"/>
+              </a:rPr>
+              <a:t>docs/5.1/components/card/</a:t>
+            </a:r>
+            <a:r>
+              <a:rPr lang="ru">
+                <a:latin typeface="Roboto"/>
+                <a:ea typeface="Roboto"/>
+                <a:cs typeface="Roboto"/>
+                <a:sym typeface="Roboto"/>
+              </a:rPr>
+              <a:t>)</a:t>
+            </a:r>
+            <a:endParaRPr>
+              <a:latin typeface="Roboto"/>
+              <a:ea typeface="Roboto"/>
+              <a:cs typeface="Roboto"/>
+              <a:sym typeface="Roboto"/>
+            </a:endParaRPr>
+          </a:p>
+        </p:txBody>
+      </p:sp>
+      <p:sp>
+        <p:nvSpPr>
+          <p:cNvPr id="124" name="Google Shape;124;p21"/>
+          <p:cNvSpPr txBox="1"/>
+          <p:nvPr/>
+        </p:nvSpPr>
+        <p:spPr>
+          <a:xfrm>
+            <a:off x="4572000" y="1982950"/>
+            <a:ext cx="3936900" cy="400200"/>
+          </a:xfrm>
+          <a:prstGeom prst="rect">
+            <a:avLst/>
+          </a:prstGeom>
+          <a:noFill/>
+          <a:ln>
+            <a:noFill/>
+          </a:ln>
+        </p:spPr>
+        <p:txBody>
+          <a:bodyPr anchorCtr="0" anchor="t" bIns="91425" lIns="91425" spcFirstLastPara="1" rIns="91425" wrap="square" tIns="91425">
+            <a:spAutoFit/>
+          </a:bodyPr>
+          <a:lstStyle/>
+          <a:p>
+            <a:pPr indent="-317500" lvl="0" marL="457200" rtl="0" algn="l">
+              <a:spcBef>
+                <a:spcPts val="0"/>
+              </a:spcBef>
+              <a:spcAft>
+                <a:spcPts val="0"/>
+              </a:spcAft>
+              <a:buSzPts val="1400"/>
+              <a:buFont typeface="Roboto"/>
+              <a:buChar char="●"/>
+            </a:pPr>
+            <a:r>
+              <a:rPr lang="ru">
+                <a:latin typeface="Roboto"/>
+                <a:ea typeface="Roboto"/>
+                <a:cs typeface="Roboto"/>
+                <a:sym typeface="Roboto"/>
+              </a:rPr>
+              <a:t>Форма</a:t>
+            </a:r>
+            <a:r>
+              <a:rPr lang="ru">
+                <a:latin typeface="Roboto"/>
+                <a:ea typeface="Roboto"/>
+                <a:cs typeface="Roboto"/>
+                <a:sym typeface="Roboto"/>
+              </a:rPr>
+              <a:t>. (</a:t>
+            </a:r>
+            <a:r>
+              <a:rPr lang="ru">
+                <a:solidFill>
+                  <a:schemeClr val="dk2"/>
+                </a:solidFill>
+                <a:latin typeface="Roboto"/>
+                <a:ea typeface="Roboto"/>
+                <a:cs typeface="Roboto"/>
+                <a:sym typeface="Roboto"/>
+              </a:rPr>
+              <a:t>docs/5.1/forms/</a:t>
+            </a:r>
+            <a:r>
+              <a:rPr lang="ru">
+                <a:latin typeface="Roboto"/>
+                <a:ea typeface="Roboto"/>
+                <a:cs typeface="Roboto"/>
+                <a:sym typeface="Roboto"/>
+              </a:rPr>
+              <a:t>)</a:t>
+            </a:r>
+            <a:endParaRPr>
+              <a:latin typeface="Roboto"/>
+              <a:ea typeface="Roboto"/>
+              <a:cs typeface="Roboto"/>
+              <a:sym typeface="Roboto"/>
+            </a:endParaRPr>
+          </a:p>
+        </p:txBody>
+      </p:sp>
+      <p:pic>
+        <p:nvPicPr>
+          <p:cNvPr id="125" name="Google Shape;125;p21"/>
+          <p:cNvPicPr preferRelativeResize="0"/>
+          <p:nvPr/>
+        </p:nvPicPr>
+        <p:blipFill>
+          <a:blip r:embed="rId5">
+            <a:alphaModFix/>
+          </a:blip>
+          <a:stretch>
+            <a:fillRect/>
+          </a:stretch>
+        </p:blipFill>
+        <p:spPr>
+          <a:xfrm>
+            <a:off x="5581088" y="2383150"/>
+            <a:ext cx="1918730" cy="2455550"/>
+          </a:xfrm>
+          <a:prstGeom prst="rect">
+            <a:avLst/>
+          </a:prstGeom>
+          <a:noFill/>
+          <a:ln>
+            <a:noFill/>
+          </a:ln>
+        </p:spPr>
+      </p:pic>
+    </p:spTree>
+  </p:cSld>
+  <p:clrMapOvr>
+    <a:masterClrMapping/>
+  </p:clrMapOvr>
 </p:sld>
 </file>
 

</xml_diff>

<commit_message>
update presentation. redesign consultation edit buttons.
</commit_message>
<xml_diff>
--- a/materials/presentation/presentation.pptx
+++ b/materials/presentation/presentation.pptx
@@ -10980,6 +10980,26 @@
             </a:r>
             <a:endParaRPr/>
           </a:p>
+          <a:p>
+            <a:pPr indent="-342900" lvl="0" marL="457200" marR="101600" rtl="0" algn="l">
+              <a:lnSpc>
+                <a:spcPct val="112500"/>
+              </a:lnSpc>
+              <a:spcBef>
+                <a:spcPts val="0"/>
+              </a:spcBef>
+              <a:spcAft>
+                <a:spcPts val="0"/>
+              </a:spcAft>
+              <a:buSzPts val="1800"/>
+              <a:buChar char="●"/>
+            </a:pPr>
+            <a:r>
+              <a:rPr lang="ru"/>
+              <a:t>Людмила Петрушевская ПОРОСЁНОК ПЁТР ЕДЕТ В ГОСТИ</a:t>
+            </a:r>
+            <a:endParaRPr/>
+          </a:p>
         </p:txBody>
       </p:sp>
     </p:spTree>
@@ -12479,6 +12499,285 @@
 </file>
 
 <file path=ppt/theme/theme1.xml><?xml version="1.0" encoding="utf-8"?>
+<a:theme xmlns:a="http://schemas.openxmlformats.org/drawingml/2006/main" xmlns:r="http://schemas.openxmlformats.org/officeDocument/2006/relationships">
+  <a:themeElements>
+    <a:clrScheme name="Default">
+      <a:dk1>
+        <a:srgbClr val="000000"/>
+      </a:dk1>
+      <a:lt1>
+        <a:srgbClr val="FFFFFF"/>
+      </a:lt1>
+      <a:dk2>
+        <a:srgbClr val="158158"/>
+      </a:dk2>
+      <a:lt2>
+        <a:srgbClr val="F3F3F3"/>
+      </a:lt2>
+      <a:accent1>
+        <a:srgbClr val="058DC7"/>
+      </a:accent1>
+      <a:accent2>
+        <a:srgbClr val="50B432"/>
+      </a:accent2>
+      <a:accent3>
+        <a:srgbClr val="ED561B"/>
+      </a:accent3>
+      <a:accent4>
+        <a:srgbClr val="EDEF00"/>
+      </a:accent4>
+      <a:accent5>
+        <a:srgbClr val="24CBE5"/>
+      </a:accent5>
+      <a:accent6>
+        <a:srgbClr val="64E572"/>
+      </a:accent6>
+      <a:hlink>
+        <a:srgbClr val="2200CC"/>
+      </a:hlink>
+      <a:folHlink>
+        <a:srgbClr val="551A8B"/>
+      </a:folHlink>
+    </a:clrScheme>
+    <a:fontScheme name="Office">
+      <a:majorFont>
+        <a:latin typeface="Arial"/>
+        <a:ea typeface=""/>
+        <a:cs typeface=""/>
+        <a:font script="Jpan" typeface="ＭＳ Ｐゴシック"/>
+        <a:font script="Hang" typeface="맑은 고딕"/>
+        <a:font script="Hans" typeface="宋体"/>
+        <a:font script="Hant" typeface="新細明體"/>
+        <a:font script="Arab" typeface="Times New Roman"/>
+        <a:font script="Hebr" typeface="Times New Roman"/>
+        <a:font script="Thai" typeface="Angsana New"/>
+        <a:font script="Ethi" typeface="Nyala"/>
+        <a:font script="Beng" typeface="Vrinda"/>
+        <a:font script="Gujr" typeface="Shruti"/>
+        <a:font script="Khmr" typeface="MoolBoran"/>
+        <a:font script="Knda" typeface="Tunga"/>
+        <a:font script="Guru" typeface="Raavi"/>
+        <a:font script="Cans" typeface="Euphemia"/>
+        <a:font script="Cher" typeface="Plantagenet Cherokee"/>
+        <a:font script="Yiii" typeface="Microsoft Yi Baiti"/>
+        <a:font script="Tibt" typeface="Microsoft Himalaya"/>
+        <a:font script="Thaa" typeface="MV Boli"/>
+        <a:font script="Deva" typeface="Mangal"/>
+        <a:font script="Telu" typeface="Gautami"/>
+        <a:font script="Taml" typeface="Latha"/>
+        <a:font script="Syrc" typeface="Estrangelo Edessa"/>
+        <a:font script="Orya" typeface="Kalinga"/>
+        <a:font script="Mlym" typeface="Kartika"/>
+        <a:font script="Laoo" typeface="DokChampa"/>
+        <a:font script="Sinh" typeface="Iskoola Pota"/>
+        <a:font script="Mong" typeface="Mongolian Baiti"/>
+        <a:font script="Viet" typeface="Times New Roman"/>
+        <a:font script="Uigh" typeface="Microsoft Uighur"/>
+        <a:font script="Geor" typeface="Sylfaen"/>
+      </a:majorFont>
+      <a:minorFont>
+        <a:latin typeface="Arial"/>
+        <a:ea typeface=""/>
+        <a:cs typeface=""/>
+        <a:font script="Jpan" typeface="ＭＳ Ｐゴシック"/>
+        <a:font script="Hang" typeface="맑은 고딕"/>
+        <a:font script="Hans" typeface="宋体"/>
+        <a:font script="Hant" typeface="新細明體"/>
+        <a:font script="Arab" typeface="Arial"/>
+        <a:font script="Hebr" typeface="Arial"/>
+        <a:font script="Thai" typeface="Cordia New"/>
+        <a:font script="Ethi" typeface="Nyala"/>
+        <a:font script="Beng" typeface="Vrinda"/>
+        <a:font script="Gujr" typeface="Shruti"/>
+        <a:font script="Khmr" typeface="DaunPenh"/>
+        <a:font script="Knda" typeface="Tunga"/>
+        <a:font script="Guru" typeface="Raavi"/>
+        <a:font script="Cans" typeface="Euphemia"/>
+        <a:font script="Cher" typeface="Plantagenet Cherokee"/>
+        <a:font script="Yiii" typeface="Microsoft Yi Baiti"/>
+        <a:font script="Tibt" typeface="Microsoft Himalaya"/>
+        <a:font script="Thaa" typeface="MV Boli"/>
+        <a:font script="Deva" typeface="Mangal"/>
+        <a:font script="Telu" typeface="Gautami"/>
+        <a:font script="Taml" typeface="Latha"/>
+        <a:font script="Syrc" typeface="Estrangelo Edessa"/>
+        <a:font script="Orya" typeface="Kalinga"/>
+        <a:font script="Mlym" typeface="Kartika"/>
+        <a:font script="Laoo" typeface="DokChampa"/>
+        <a:font script="Sinh" typeface="Iskoola Pota"/>
+        <a:font script="Mong" typeface="Mongolian Baiti"/>
+        <a:font script="Viet" typeface="Arial"/>
+        <a:font script="Uigh" typeface="Microsoft Uighur"/>
+        <a:font script="Geor" typeface="Sylfaen"/>
+      </a:minorFont>
+    </a:fontScheme>
+    <a:fmtScheme name="Office">
+      <a:fillStyleLst>
+        <a:solidFill>
+          <a:schemeClr val="phClr"/>
+        </a:solidFill>
+        <a:gradFill rotWithShape="1">
+          <a:gsLst>
+            <a:gs pos="0">
+              <a:schemeClr val="phClr">
+                <a:tint val="50000"/>
+                <a:satMod val="300000"/>
+              </a:schemeClr>
+            </a:gs>
+            <a:gs pos="35000">
+              <a:schemeClr val="phClr">
+                <a:tint val="37000"/>
+                <a:satMod val="300000"/>
+              </a:schemeClr>
+            </a:gs>
+            <a:gs pos="100000">
+              <a:schemeClr val="phClr">
+                <a:tint val="15000"/>
+                <a:satMod val="350000"/>
+              </a:schemeClr>
+            </a:gs>
+          </a:gsLst>
+          <a:lin ang="16200000" scaled="1"/>
+        </a:gradFill>
+        <a:gradFill rotWithShape="1">
+          <a:gsLst>
+            <a:gs pos="0">
+              <a:schemeClr val="phClr">
+                <a:tint val="100000"/>
+                <a:shade val="100000"/>
+                <a:satMod val="130000"/>
+              </a:schemeClr>
+            </a:gs>
+            <a:gs pos="100000">
+              <a:schemeClr val="phClr">
+                <a:tint val="50000"/>
+                <a:shade val="100000"/>
+                <a:satMod val="350000"/>
+              </a:schemeClr>
+            </a:gs>
+          </a:gsLst>
+          <a:lin ang="16200000" scaled="0"/>
+        </a:gradFill>
+      </a:fillStyleLst>
+      <a:lnStyleLst>
+        <a:ln w="9525" cap="flat" cmpd="sng" algn="ctr">
+          <a:solidFill>
+            <a:schemeClr val="phClr">
+              <a:shade val="95000"/>
+              <a:satMod val="105000"/>
+            </a:schemeClr>
+          </a:solidFill>
+          <a:prstDash val="solid"/>
+        </a:ln>
+        <a:ln w="25400" cap="flat" cmpd="sng" algn="ctr">
+          <a:solidFill>
+            <a:schemeClr val="phClr"/>
+          </a:solidFill>
+          <a:prstDash val="solid"/>
+        </a:ln>
+        <a:ln w="38100" cap="flat" cmpd="sng" algn="ctr">
+          <a:solidFill>
+            <a:schemeClr val="phClr"/>
+          </a:solidFill>
+          <a:prstDash val="solid"/>
+        </a:ln>
+      </a:lnStyleLst>
+      <a:effectStyleLst>
+        <a:effectStyle>
+          <a:effectLst>
+            <a:outerShdw blurRad="40000" dist="20000" dir="5400000" rotWithShape="0">
+              <a:srgbClr val="000000">
+                <a:alpha val="38000"/>
+              </a:srgbClr>
+            </a:outerShdw>
+          </a:effectLst>
+        </a:effectStyle>
+        <a:effectStyle>
+          <a:effectLst>
+            <a:outerShdw blurRad="40000" dist="23000" dir="5400000" rotWithShape="0">
+              <a:srgbClr val="000000">
+                <a:alpha val="35000"/>
+              </a:srgbClr>
+            </a:outerShdw>
+          </a:effectLst>
+        </a:effectStyle>
+        <a:effectStyle>
+          <a:effectLst>
+            <a:outerShdw blurRad="40000" dist="23000" dir="5400000" rotWithShape="0">
+              <a:srgbClr val="000000">
+                <a:alpha val="35000"/>
+              </a:srgbClr>
+            </a:outerShdw>
+          </a:effectLst>
+          <a:scene3d>
+            <a:camera prst="orthographicFront">
+              <a:rot lat="0" lon="0" rev="0"/>
+            </a:camera>
+            <a:lightRig rig="threePt" dir="t">
+              <a:rot lat="0" lon="0" rev="1200000"/>
+            </a:lightRig>
+          </a:scene3d>
+          <a:sp3d>
+            <a:bevelT w="63500" h="25400"/>
+          </a:sp3d>
+        </a:effectStyle>
+      </a:effectStyleLst>
+      <a:bgFillStyleLst>
+        <a:solidFill>
+          <a:schemeClr val="phClr"/>
+        </a:solidFill>
+        <a:gradFill rotWithShape="1">
+          <a:gsLst>
+            <a:gs pos="0">
+              <a:schemeClr val="phClr">
+                <a:tint val="40000"/>
+                <a:satMod val="350000"/>
+              </a:schemeClr>
+            </a:gs>
+            <a:gs pos="40000">
+              <a:schemeClr val="phClr">
+                <a:tint val="45000"/>
+                <a:shade val="99000"/>
+                <a:satMod val="350000"/>
+              </a:schemeClr>
+            </a:gs>
+            <a:gs pos="100000">
+              <a:schemeClr val="phClr">
+                <a:shade val="20000"/>
+                <a:satMod val="255000"/>
+              </a:schemeClr>
+            </a:gs>
+          </a:gsLst>
+          <a:path path="circle">
+            <a:fillToRect l="50000" t="-80000" r="50000" b="180000"/>
+          </a:path>
+        </a:gradFill>
+        <a:gradFill rotWithShape="1">
+          <a:gsLst>
+            <a:gs pos="0">
+              <a:schemeClr val="phClr">
+                <a:tint val="80000"/>
+                <a:satMod val="300000"/>
+              </a:schemeClr>
+            </a:gs>
+            <a:gs pos="100000">
+              <a:schemeClr val="phClr">
+                <a:shade val="30000"/>
+                <a:satMod val="200000"/>
+              </a:schemeClr>
+            </a:gs>
+          </a:gsLst>
+          <a:path path="circle">
+            <a:fillToRect l="50000" t="50000" r="50000" b="50000"/>
+          </a:path>
+        </a:gradFill>
+      </a:bgFillStyleLst>
+    </a:fmtScheme>
+  </a:themeElements>
+</a:theme>
+</file>
+
+<file path=ppt/theme/theme2.xml><?xml version="1.0" encoding="utf-8"?>
 <a:theme xmlns:a="http://schemas.openxmlformats.org/drawingml/2006/main" xmlns:r="http://schemas.openxmlformats.org/officeDocument/2006/relationships" name="Material">
   <a:themeElements>
     <a:clrScheme name="Material">
@@ -12755,283 +13054,4 @@
     </a:fmtScheme>
   </a:themeElements>
 </a:theme>
-</file>
-
-<file path=ppt/theme/theme2.xml><?xml version="1.0" encoding="utf-8"?>
-<a:theme xmlns:a="http://schemas.openxmlformats.org/drawingml/2006/main" xmlns:r="http://schemas.openxmlformats.org/officeDocument/2006/relationships">
-  <a:themeElements>
-    <a:clrScheme name="Default">
-      <a:dk1>
-        <a:srgbClr val="000000"/>
-      </a:dk1>
-      <a:lt1>
-        <a:srgbClr val="FFFFFF"/>
-      </a:lt1>
-      <a:dk2>
-        <a:srgbClr val="158158"/>
-      </a:dk2>
-      <a:lt2>
-        <a:srgbClr val="F3F3F3"/>
-      </a:lt2>
-      <a:accent1>
-        <a:srgbClr val="058DC7"/>
-      </a:accent1>
-      <a:accent2>
-        <a:srgbClr val="50B432"/>
-      </a:accent2>
-      <a:accent3>
-        <a:srgbClr val="ED561B"/>
-      </a:accent3>
-      <a:accent4>
-        <a:srgbClr val="EDEF00"/>
-      </a:accent4>
-      <a:accent5>
-        <a:srgbClr val="24CBE5"/>
-      </a:accent5>
-      <a:accent6>
-        <a:srgbClr val="64E572"/>
-      </a:accent6>
-      <a:hlink>
-        <a:srgbClr val="2200CC"/>
-      </a:hlink>
-      <a:folHlink>
-        <a:srgbClr val="551A8B"/>
-      </a:folHlink>
-    </a:clrScheme>
-    <a:fontScheme name="Office">
-      <a:majorFont>
-        <a:latin typeface="Arial"/>
-        <a:ea typeface=""/>
-        <a:cs typeface=""/>
-        <a:font script="Jpan" typeface="ＭＳ Ｐゴシック"/>
-        <a:font script="Hang" typeface="맑은 고딕"/>
-        <a:font script="Hans" typeface="宋体"/>
-        <a:font script="Hant" typeface="新細明體"/>
-        <a:font script="Arab" typeface="Times New Roman"/>
-        <a:font script="Hebr" typeface="Times New Roman"/>
-        <a:font script="Thai" typeface="Angsana New"/>
-        <a:font script="Ethi" typeface="Nyala"/>
-        <a:font script="Beng" typeface="Vrinda"/>
-        <a:font script="Gujr" typeface="Shruti"/>
-        <a:font script="Khmr" typeface="MoolBoran"/>
-        <a:font script="Knda" typeface="Tunga"/>
-        <a:font script="Guru" typeface="Raavi"/>
-        <a:font script="Cans" typeface="Euphemia"/>
-        <a:font script="Cher" typeface="Plantagenet Cherokee"/>
-        <a:font script="Yiii" typeface="Microsoft Yi Baiti"/>
-        <a:font script="Tibt" typeface="Microsoft Himalaya"/>
-        <a:font script="Thaa" typeface="MV Boli"/>
-        <a:font script="Deva" typeface="Mangal"/>
-        <a:font script="Telu" typeface="Gautami"/>
-        <a:font script="Taml" typeface="Latha"/>
-        <a:font script="Syrc" typeface="Estrangelo Edessa"/>
-        <a:font script="Orya" typeface="Kalinga"/>
-        <a:font script="Mlym" typeface="Kartika"/>
-        <a:font script="Laoo" typeface="DokChampa"/>
-        <a:font script="Sinh" typeface="Iskoola Pota"/>
-        <a:font script="Mong" typeface="Mongolian Baiti"/>
-        <a:font script="Viet" typeface="Times New Roman"/>
-        <a:font script="Uigh" typeface="Microsoft Uighur"/>
-        <a:font script="Geor" typeface="Sylfaen"/>
-      </a:majorFont>
-      <a:minorFont>
-        <a:latin typeface="Arial"/>
-        <a:ea typeface=""/>
-        <a:cs typeface=""/>
-        <a:font script="Jpan" typeface="ＭＳ Ｐゴシック"/>
-        <a:font script="Hang" typeface="맑은 고딕"/>
-        <a:font script="Hans" typeface="宋体"/>
-        <a:font script="Hant" typeface="新細明體"/>
-        <a:font script="Arab" typeface="Arial"/>
-        <a:font script="Hebr" typeface="Arial"/>
-        <a:font script="Thai" typeface="Cordia New"/>
-        <a:font script="Ethi" typeface="Nyala"/>
-        <a:font script="Beng" typeface="Vrinda"/>
-        <a:font script="Gujr" typeface="Shruti"/>
-        <a:font script="Khmr" typeface="DaunPenh"/>
-        <a:font script="Knda" typeface="Tunga"/>
-        <a:font script="Guru" typeface="Raavi"/>
-        <a:font script="Cans" typeface="Euphemia"/>
-        <a:font script="Cher" typeface="Plantagenet Cherokee"/>
-        <a:font script="Yiii" typeface="Microsoft Yi Baiti"/>
-        <a:font script="Tibt" typeface="Microsoft Himalaya"/>
-        <a:font script="Thaa" typeface="MV Boli"/>
-        <a:font script="Deva" typeface="Mangal"/>
-        <a:font script="Telu" typeface="Gautami"/>
-        <a:font script="Taml" typeface="Latha"/>
-        <a:font script="Syrc" typeface="Estrangelo Edessa"/>
-        <a:font script="Orya" typeface="Kalinga"/>
-        <a:font script="Mlym" typeface="Kartika"/>
-        <a:font script="Laoo" typeface="DokChampa"/>
-        <a:font script="Sinh" typeface="Iskoola Pota"/>
-        <a:font script="Mong" typeface="Mongolian Baiti"/>
-        <a:font script="Viet" typeface="Arial"/>
-        <a:font script="Uigh" typeface="Microsoft Uighur"/>
-        <a:font script="Geor" typeface="Sylfaen"/>
-      </a:minorFont>
-    </a:fontScheme>
-    <a:fmtScheme name="Office">
-      <a:fillStyleLst>
-        <a:solidFill>
-          <a:schemeClr val="phClr"/>
-        </a:solidFill>
-        <a:gradFill rotWithShape="1">
-          <a:gsLst>
-            <a:gs pos="0">
-              <a:schemeClr val="phClr">
-                <a:tint val="50000"/>
-                <a:satMod val="300000"/>
-              </a:schemeClr>
-            </a:gs>
-            <a:gs pos="35000">
-              <a:schemeClr val="phClr">
-                <a:tint val="37000"/>
-                <a:satMod val="300000"/>
-              </a:schemeClr>
-            </a:gs>
-            <a:gs pos="100000">
-              <a:schemeClr val="phClr">
-                <a:tint val="15000"/>
-                <a:satMod val="350000"/>
-              </a:schemeClr>
-            </a:gs>
-          </a:gsLst>
-          <a:lin ang="16200000" scaled="1"/>
-        </a:gradFill>
-        <a:gradFill rotWithShape="1">
-          <a:gsLst>
-            <a:gs pos="0">
-              <a:schemeClr val="phClr">
-                <a:tint val="100000"/>
-                <a:shade val="100000"/>
-                <a:satMod val="130000"/>
-              </a:schemeClr>
-            </a:gs>
-            <a:gs pos="100000">
-              <a:schemeClr val="phClr">
-                <a:tint val="50000"/>
-                <a:shade val="100000"/>
-                <a:satMod val="350000"/>
-              </a:schemeClr>
-            </a:gs>
-          </a:gsLst>
-          <a:lin ang="16200000" scaled="0"/>
-        </a:gradFill>
-      </a:fillStyleLst>
-      <a:lnStyleLst>
-        <a:ln w="9525" cap="flat" cmpd="sng" algn="ctr">
-          <a:solidFill>
-            <a:schemeClr val="phClr">
-              <a:shade val="95000"/>
-              <a:satMod val="105000"/>
-            </a:schemeClr>
-          </a:solidFill>
-          <a:prstDash val="solid"/>
-        </a:ln>
-        <a:ln w="25400" cap="flat" cmpd="sng" algn="ctr">
-          <a:solidFill>
-            <a:schemeClr val="phClr"/>
-          </a:solidFill>
-          <a:prstDash val="solid"/>
-        </a:ln>
-        <a:ln w="38100" cap="flat" cmpd="sng" algn="ctr">
-          <a:solidFill>
-            <a:schemeClr val="phClr"/>
-          </a:solidFill>
-          <a:prstDash val="solid"/>
-        </a:ln>
-      </a:lnStyleLst>
-      <a:effectStyleLst>
-        <a:effectStyle>
-          <a:effectLst>
-            <a:outerShdw blurRad="40000" dist="20000" dir="5400000" rotWithShape="0">
-              <a:srgbClr val="000000">
-                <a:alpha val="38000"/>
-              </a:srgbClr>
-            </a:outerShdw>
-          </a:effectLst>
-        </a:effectStyle>
-        <a:effectStyle>
-          <a:effectLst>
-            <a:outerShdw blurRad="40000" dist="23000" dir="5400000" rotWithShape="0">
-              <a:srgbClr val="000000">
-                <a:alpha val="35000"/>
-              </a:srgbClr>
-            </a:outerShdw>
-          </a:effectLst>
-        </a:effectStyle>
-        <a:effectStyle>
-          <a:effectLst>
-            <a:outerShdw blurRad="40000" dist="23000" dir="5400000" rotWithShape="0">
-              <a:srgbClr val="000000">
-                <a:alpha val="35000"/>
-              </a:srgbClr>
-            </a:outerShdw>
-          </a:effectLst>
-          <a:scene3d>
-            <a:camera prst="orthographicFront">
-              <a:rot lat="0" lon="0" rev="0"/>
-            </a:camera>
-            <a:lightRig rig="threePt" dir="t">
-              <a:rot lat="0" lon="0" rev="1200000"/>
-            </a:lightRig>
-          </a:scene3d>
-          <a:sp3d>
-            <a:bevelT w="63500" h="25400"/>
-          </a:sp3d>
-        </a:effectStyle>
-      </a:effectStyleLst>
-      <a:bgFillStyleLst>
-        <a:solidFill>
-          <a:schemeClr val="phClr"/>
-        </a:solidFill>
-        <a:gradFill rotWithShape="1">
-          <a:gsLst>
-            <a:gs pos="0">
-              <a:schemeClr val="phClr">
-                <a:tint val="40000"/>
-                <a:satMod val="350000"/>
-              </a:schemeClr>
-            </a:gs>
-            <a:gs pos="40000">
-              <a:schemeClr val="phClr">
-                <a:tint val="45000"/>
-                <a:shade val="99000"/>
-                <a:satMod val="350000"/>
-              </a:schemeClr>
-            </a:gs>
-            <a:gs pos="100000">
-              <a:schemeClr val="phClr">
-                <a:shade val="20000"/>
-                <a:satMod val="255000"/>
-              </a:schemeClr>
-            </a:gs>
-          </a:gsLst>
-          <a:path path="circle">
-            <a:fillToRect l="50000" t="-80000" r="50000" b="180000"/>
-          </a:path>
-        </a:gradFill>
-        <a:gradFill rotWithShape="1">
-          <a:gsLst>
-            <a:gs pos="0">
-              <a:schemeClr val="phClr">
-                <a:tint val="80000"/>
-                <a:satMod val="300000"/>
-              </a:schemeClr>
-            </a:gs>
-            <a:gs pos="100000">
-              <a:schemeClr val="phClr">
-                <a:shade val="30000"/>
-                <a:satMod val="200000"/>
-              </a:schemeClr>
-            </a:gs>
-          </a:gsLst>
-          <a:path path="circle">
-            <a:fillToRect l="50000" t="50000" r="50000" b="50000"/>
-          </a:path>
-        </a:gradFill>
-      </a:bgFillStyleLst>
-    </a:fmtScheme>
-  </a:themeElements>
-</a:theme>
 </file>
</xml_diff>

<commit_message>
some changes for presentation. translate subjects in teacher signup.
</commit_message>
<xml_diff>
--- a/materials/presentation/presentation.pptx
+++ b/materials/presentation/presentation.pptx
@@ -1712,7 +1712,7 @@
   <p:cSld>
     <p:spTree>
       <p:nvGrpSpPr>
-        <p:cNvPr id="180" name="Shape 180"/>
+        <p:cNvPr id="181" name="Shape 181"/>
         <p:cNvGrpSpPr/>
         <p:nvPr/>
       </p:nvGrpSpPr>
@@ -1726,7 +1726,7 @@
       </p:grpSpPr>
       <p:sp>
         <p:nvSpPr>
-          <p:cNvPr id="181" name="Google Shape;181;g11b3a1e9a09_0_79:notes"/>
+          <p:cNvPr id="182" name="Google Shape;182;g11b3a1e9a09_0_79:notes"/>
           <p:cNvSpPr/>
           <p:nvPr>
             <p:ph idx="2" type="sldImg"/>
@@ -1761,7 +1761,7 @@
       </p:sp>
       <p:sp>
         <p:nvSpPr>
-          <p:cNvPr id="182" name="Google Shape;182;g11b3a1e9a09_0_79:notes"/>
+          <p:cNvPr id="183" name="Google Shape;183;g11b3a1e9a09_0_79:notes"/>
           <p:cNvSpPr txBox="1"/>
           <p:nvPr>
             <p:ph idx="1" type="body"/>
@@ -1910,7 +1910,7 @@
   <p:cSld>
     <p:spTree>
       <p:nvGrpSpPr>
-        <p:cNvPr id="186" name="Shape 186"/>
+        <p:cNvPr id="187" name="Shape 187"/>
         <p:cNvGrpSpPr/>
         <p:nvPr/>
       </p:nvGrpSpPr>
@@ -1924,7 +1924,7 @@
       </p:grpSpPr>
       <p:sp>
         <p:nvSpPr>
-          <p:cNvPr id="187" name="Google Shape;187;g11b3a1e9a09_0_84:notes"/>
+          <p:cNvPr id="188" name="Google Shape;188;g11b3a1e9a09_0_84:notes"/>
           <p:cNvSpPr/>
           <p:nvPr>
             <p:ph idx="2" type="sldImg"/>
@@ -1959,7 +1959,7 @@
       </p:sp>
       <p:sp>
         <p:nvSpPr>
-          <p:cNvPr id="188" name="Google Shape;188;g11b3a1e9a09_0_84:notes"/>
+          <p:cNvPr id="189" name="Google Shape;189;g11b3a1e9a09_0_84:notes"/>
           <p:cNvSpPr txBox="1"/>
           <p:nvPr>
             <p:ph idx="1" type="body"/>
@@ -2009,7 +2009,7 @@
   <p:cSld>
     <p:spTree>
       <p:nvGrpSpPr>
-        <p:cNvPr id="193" name="Shape 193"/>
+        <p:cNvPr id="194" name="Shape 194"/>
         <p:cNvGrpSpPr/>
         <p:nvPr/>
       </p:nvGrpSpPr>
@@ -2023,7 +2023,7 @@
       </p:grpSpPr>
       <p:sp>
         <p:nvSpPr>
-          <p:cNvPr id="194" name="Google Shape;194;g11b3a1e9a09_0_90:notes"/>
+          <p:cNvPr id="195" name="Google Shape;195;g11b3a1e9a09_0_90:notes"/>
           <p:cNvSpPr/>
           <p:nvPr>
             <p:ph idx="2" type="sldImg"/>
@@ -2058,7 +2058,7 @@
       </p:sp>
       <p:sp>
         <p:nvSpPr>
-          <p:cNvPr id="195" name="Google Shape;195;g11b3a1e9a09_0_90:notes"/>
+          <p:cNvPr id="196" name="Google Shape;196;g11b3a1e9a09_0_90:notes"/>
           <p:cNvSpPr txBox="1"/>
           <p:nvPr>
             <p:ph idx="1" type="body"/>
@@ -2108,7 +2108,7 @@
   <p:cSld>
     <p:spTree>
       <p:nvGrpSpPr>
-        <p:cNvPr id="199" name="Shape 199"/>
+        <p:cNvPr id="200" name="Shape 200"/>
         <p:cNvGrpSpPr/>
         <p:nvPr/>
       </p:nvGrpSpPr>
@@ -2122,7 +2122,7 @@
       </p:grpSpPr>
       <p:sp>
         <p:nvSpPr>
-          <p:cNvPr id="200" name="Google Shape;200;g11b3a1e9a09_0_95:notes"/>
+          <p:cNvPr id="201" name="Google Shape;201;g11b3a1e9a09_0_95:notes"/>
           <p:cNvSpPr/>
           <p:nvPr>
             <p:ph idx="2" type="sldImg"/>
@@ -2157,7 +2157,7 @@
       </p:sp>
       <p:sp>
         <p:nvSpPr>
-          <p:cNvPr id="201" name="Google Shape;201;g11b3a1e9a09_0_95:notes"/>
+          <p:cNvPr id="202" name="Google Shape;202;g11b3a1e9a09_0_95:notes"/>
           <p:cNvSpPr txBox="1"/>
           <p:nvPr>
             <p:ph idx="1" type="body"/>
@@ -2207,7 +2207,7 @@
   <p:cSld>
     <p:spTree>
       <p:nvGrpSpPr>
-        <p:cNvPr id="208" name="Shape 208"/>
+        <p:cNvPr id="209" name="Shape 209"/>
         <p:cNvGrpSpPr/>
         <p:nvPr/>
       </p:nvGrpSpPr>
@@ -2221,7 +2221,7 @@
       </p:grpSpPr>
       <p:sp>
         <p:nvSpPr>
-          <p:cNvPr id="209" name="Google Shape;209;g11b3a1e9a09_0_105:notes"/>
+          <p:cNvPr id="210" name="Google Shape;210;g11b3a1e9a09_0_105:notes"/>
           <p:cNvSpPr/>
           <p:nvPr>
             <p:ph idx="2" type="sldImg"/>
@@ -2256,7 +2256,7 @@
       </p:sp>
       <p:sp>
         <p:nvSpPr>
-          <p:cNvPr id="210" name="Google Shape;210;g11b3a1e9a09_0_105:notes"/>
+          <p:cNvPr id="211" name="Google Shape;211;g11b3a1e9a09_0_105:notes"/>
           <p:cNvSpPr txBox="1"/>
           <p:nvPr>
             <p:ph idx="1" type="body"/>
@@ -8909,6 +8909,13 @@
 <file path=ppt/slides/slide1.xml><?xml version="1.0" encoding="utf-8"?>
 <p:sld xmlns:a="http://schemas.openxmlformats.org/drawingml/2006/main" xmlns:r="http://schemas.openxmlformats.org/officeDocument/2006/relationships" xmlns:mc="http://schemas.openxmlformats.org/markup-compatibility/2006" xmlns:mv="urn:schemas-microsoft-com:mac:vml" xmlns:p="http://schemas.openxmlformats.org/presentationml/2006/main" xmlns:c="http://schemas.openxmlformats.org/drawingml/2006/chart" xmlns:dgm="http://schemas.openxmlformats.org/drawingml/2006/diagram" xmlns:o="urn:schemas-microsoft-com:office:office" xmlns:v="urn:schemas-microsoft-com:vml" xmlns:pvml="urn:schemas-microsoft-com:office:powerpoint" xmlns:com="http://schemas.openxmlformats.org/drawingml/2006/compatibility" xmlns:p14="http://schemas.microsoft.com/office/powerpoint/2010/main" xmlns:p15="http://schemas.microsoft.com/office/powerpoint/2012/main" xmlns:ahyp="http://schemas.microsoft.com/office/drawing/2018/hyperlinkcolor">
   <p:cSld>
+    <p:bg>
+      <p:bgPr>
+        <a:solidFill>
+          <a:srgbClr val="84B3F9"/>
+        </a:solidFill>
+      </p:bgPr>
+    </p:bg>
     <p:spTree>
       <p:nvGrpSpPr>
         <p:cNvPr id="66" name="Shape 66"/>
@@ -9427,13 +9434,12 @@
           <p:cNvPicPr preferRelativeResize="0"/>
           <p:nvPr/>
         </p:nvPicPr>
-        <p:blipFill>
+        <p:blipFill rotWithShape="1">
           <a:blip r:embed="rId3">
             <a:alphaModFix/>
           </a:blip>
-          <a:stretch>
-            <a:fillRect/>
-          </a:stretch>
+          <a:srcRect b="0" l="0" r="0" t="0"/>
+          <a:stretch/>
         </p:blipFill>
         <p:spPr>
           <a:xfrm>
@@ -9520,13 +9526,12 @@
           <p:cNvPicPr preferRelativeResize="0"/>
           <p:nvPr/>
         </p:nvPicPr>
-        <p:blipFill>
+        <p:blipFill rotWithShape="1">
           <a:blip r:embed="rId3">
             <a:alphaModFix/>
           </a:blip>
-          <a:stretch>
-            <a:fillRect/>
-          </a:stretch>
+          <a:srcRect b="189" l="0" r="0" t="189"/>
+          <a:stretch/>
         </p:blipFill>
         <p:spPr>
           <a:xfrm>
@@ -9706,13 +9711,12 @@
           <p:cNvPicPr preferRelativeResize="0"/>
           <p:nvPr/>
         </p:nvPicPr>
-        <p:blipFill>
+        <p:blipFill rotWithShape="1">
           <a:blip r:embed="rId3">
             <a:alphaModFix/>
           </a:blip>
-          <a:stretch>
-            <a:fillRect/>
-          </a:stretch>
+          <a:srcRect b="0" l="0" r="0" t="0"/>
+          <a:stretch/>
         </p:blipFill>
         <p:spPr>
           <a:xfrm>
@@ -9799,18 +9803,17 @@
           <p:cNvPicPr preferRelativeResize="0"/>
           <p:nvPr/>
         </p:nvPicPr>
-        <p:blipFill>
+        <p:blipFill rotWithShape="1">
           <a:blip r:embed="rId3">
             <a:alphaModFix/>
           </a:blip>
-          <a:stretch>
-            <a:fillRect/>
-          </a:stretch>
+          <a:srcRect b="903" l="0" r="0" t="913"/>
+          <a:stretch/>
         </p:blipFill>
         <p:spPr>
           <a:xfrm>
             <a:off x="1613075" y="761050"/>
-            <a:ext cx="5796942" cy="4219649"/>
+            <a:ext cx="5796942" cy="4219648"/>
           </a:xfrm>
           <a:prstGeom prst="rect">
             <a:avLst/>
@@ -9892,18 +9895,17 @@
           <p:cNvPicPr preferRelativeResize="0"/>
           <p:nvPr/>
         </p:nvPicPr>
-        <p:blipFill>
+        <p:blipFill rotWithShape="1">
           <a:blip r:embed="rId3">
             <a:alphaModFix/>
           </a:blip>
-          <a:stretch>
-            <a:fillRect/>
-          </a:stretch>
+          <a:srcRect b="258" l="0" r="0" t="258"/>
+          <a:stretch/>
         </p:blipFill>
         <p:spPr>
           <a:xfrm>
             <a:off x="535050" y="761075"/>
-            <a:ext cx="8073888" cy="4219650"/>
+            <a:ext cx="8073888" cy="4219651"/>
           </a:xfrm>
           <a:prstGeom prst="rect">
             <a:avLst/>
@@ -10071,6 +10073,34 @@
           </a:p>
         </p:txBody>
       </p:sp>
+      <p:pic>
+        <p:nvPicPr>
+          <p:cNvPr id="180" name="Google Shape;180;p30"/>
+          <p:cNvPicPr preferRelativeResize="0"/>
+          <p:nvPr/>
+        </p:nvPicPr>
+        <p:blipFill>
+          <a:blip r:embed="rId3">
+            <a:alphaModFix/>
+          </a:blip>
+          <a:stretch>
+            <a:fillRect/>
+          </a:stretch>
+        </p:blipFill>
+        <p:spPr>
+          <a:xfrm>
+            <a:off x="223325" y="823300"/>
+            <a:ext cx="8576448" cy="4219649"/>
+          </a:xfrm>
+          <a:prstGeom prst="rect">
+            <a:avLst/>
+          </a:prstGeom>
+          <a:noFill/>
+          <a:ln>
+            <a:noFill/>
+          </a:ln>
+        </p:spPr>
+      </p:pic>
     </p:spTree>
   </p:cSld>
   <p:clrMapOvr>
@@ -10084,7 +10114,7 @@
   <p:cSld>
     <p:spTree>
       <p:nvGrpSpPr>
-        <p:cNvPr id="183" name="Shape 183"/>
+        <p:cNvPr id="184" name="Shape 184"/>
         <p:cNvGrpSpPr/>
         <p:nvPr/>
       </p:nvGrpSpPr>
@@ -10098,7 +10128,7 @@
       </p:grpSpPr>
       <p:sp>
         <p:nvSpPr>
-          <p:cNvPr id="184" name="Google Shape;184;p31"/>
+          <p:cNvPr id="185" name="Google Shape;185;p31"/>
           <p:cNvSpPr txBox="1"/>
           <p:nvPr>
             <p:ph type="title"/>
@@ -10138,7 +10168,7 @@
       </p:sp>
       <p:pic>
         <p:nvPicPr>
-          <p:cNvPr id="185" name="Google Shape;185;p31"/>
+          <p:cNvPr id="186" name="Google Shape;186;p31"/>
           <p:cNvPicPr preferRelativeResize="0"/>
           <p:nvPr/>
         </p:nvPicPr>
@@ -10400,7 +10430,7 @@
   <p:cSld>
     <p:spTree>
       <p:nvGrpSpPr>
-        <p:cNvPr id="189" name="Shape 189"/>
+        <p:cNvPr id="190" name="Shape 190"/>
         <p:cNvGrpSpPr/>
         <p:nvPr/>
       </p:nvGrpSpPr>
@@ -10414,7 +10444,7 @@
       </p:grpSpPr>
       <p:sp>
         <p:nvSpPr>
-          <p:cNvPr id="190" name="Google Shape;190;p32"/>
+          <p:cNvPr id="191" name="Google Shape;191;p32"/>
           <p:cNvSpPr txBox="1"/>
           <p:nvPr>
             <p:ph type="title"/>
@@ -10454,7 +10484,7 @@
       </p:sp>
       <p:sp>
         <p:nvSpPr>
-          <p:cNvPr id="191" name="Google Shape;191;p32"/>
+          <p:cNvPr id="192" name="Google Shape;192;p32"/>
           <p:cNvSpPr txBox="1"/>
           <p:nvPr>
             <p:ph idx="1" type="body"/>
@@ -10512,7 +10542,7 @@
       </p:sp>
       <p:pic>
         <p:nvPicPr>
-          <p:cNvPr id="192" name="Google Shape;192;p32"/>
+          <p:cNvPr id="193" name="Google Shape;193;p32"/>
           <p:cNvPicPr preferRelativeResize="0"/>
           <p:nvPr/>
         </p:nvPicPr>
@@ -10551,7 +10581,7 @@
   <p:cSld>
     <p:spTree>
       <p:nvGrpSpPr>
-        <p:cNvPr id="196" name="Shape 196"/>
+        <p:cNvPr id="197" name="Shape 197"/>
         <p:cNvGrpSpPr/>
         <p:nvPr/>
       </p:nvGrpSpPr>
@@ -10565,7 +10595,7 @@
       </p:grpSpPr>
       <p:sp>
         <p:nvSpPr>
-          <p:cNvPr id="197" name="Google Shape;197;p33"/>
+          <p:cNvPr id="198" name="Google Shape;198;p33"/>
           <p:cNvSpPr txBox="1"/>
           <p:nvPr>
             <p:ph type="title"/>
@@ -10605,7 +10635,7 @@
       </p:sp>
       <p:pic>
         <p:nvPicPr>
-          <p:cNvPr id="198" name="Google Shape;198;p33"/>
+          <p:cNvPr id="199" name="Google Shape;199;p33"/>
           <p:cNvPicPr preferRelativeResize="0"/>
           <p:nvPr/>
         </p:nvPicPr>
@@ -10644,7 +10674,7 @@
   <p:cSld>
     <p:spTree>
       <p:nvGrpSpPr>
-        <p:cNvPr id="202" name="Shape 202"/>
+        <p:cNvPr id="203" name="Shape 203"/>
         <p:cNvGrpSpPr/>
         <p:nvPr/>
       </p:nvGrpSpPr>
@@ -10658,7 +10688,7 @@
       </p:grpSpPr>
       <p:sp>
         <p:nvSpPr>
-          <p:cNvPr id="203" name="Google Shape;203;p34"/>
+          <p:cNvPr id="204" name="Google Shape;204;p34"/>
           <p:cNvSpPr txBox="1"/>
           <p:nvPr>
             <p:ph type="title"/>
@@ -10698,7 +10728,7 @@
       </p:sp>
       <p:pic>
         <p:nvPicPr>
-          <p:cNvPr id="204" name="Google Shape;204;p34"/>
+          <p:cNvPr id="205" name="Google Shape;205;p34"/>
           <p:cNvPicPr preferRelativeResize="0"/>
           <p:nvPr/>
         </p:nvPicPr>
@@ -10726,7 +10756,7 @@
       </p:pic>
       <p:sp>
         <p:nvSpPr>
-          <p:cNvPr id="205" name="Google Shape;205;p34"/>
+          <p:cNvPr id="206" name="Google Shape;206;p34"/>
           <p:cNvSpPr txBox="1"/>
           <p:nvPr/>
         </p:nvSpPr>
@@ -10778,7 +10808,7 @@
       </p:sp>
       <p:pic>
         <p:nvPicPr>
-          <p:cNvPr id="206" name="Google Shape;206;p34"/>
+          <p:cNvPr id="207" name="Google Shape;207;p34"/>
           <p:cNvPicPr preferRelativeResize="0"/>
           <p:nvPr/>
         </p:nvPicPr>
@@ -10806,7 +10836,7 @@
       </p:pic>
       <p:sp>
         <p:nvSpPr>
-          <p:cNvPr id="207" name="Google Shape;207;p34"/>
+          <p:cNvPr id="208" name="Google Shape;208;p34"/>
           <p:cNvSpPr txBox="1"/>
           <p:nvPr/>
         </p:nvSpPr>
@@ -10869,7 +10899,7 @@
   <p:cSld>
     <p:spTree>
       <p:nvGrpSpPr>
-        <p:cNvPr id="211" name="Shape 211"/>
+        <p:cNvPr id="212" name="Shape 212"/>
         <p:cNvGrpSpPr/>
         <p:nvPr/>
       </p:nvGrpSpPr>
@@ -10883,7 +10913,7 @@
       </p:grpSpPr>
       <p:sp>
         <p:nvSpPr>
-          <p:cNvPr id="212" name="Google Shape;212;p35"/>
+          <p:cNvPr id="213" name="Google Shape;213;p35"/>
           <p:cNvSpPr txBox="1"/>
           <p:nvPr>
             <p:ph type="title"/>
@@ -10923,7 +10953,7 @@
       </p:sp>
       <p:sp>
         <p:nvSpPr>
-          <p:cNvPr id="213" name="Google Shape;213;p35"/>
+          <p:cNvPr id="214" name="Google Shape;214;p35"/>
           <p:cNvSpPr txBox="1"/>
           <p:nvPr>
             <p:ph idx="1" type="body"/>
@@ -10980,26 +11010,6 @@
             <a:r>
               <a:rPr lang="ru"/>
               <a:t>Мигель Гринберг: Разработка веб-приложений с использованием Flask на языке Python</a:t>
-            </a:r>
-            <a:endParaRPr/>
-          </a:p>
-          <a:p>
-            <a:pPr indent="-342900" lvl="0" marL="457200" marR="101600" rtl="0" algn="l">
-              <a:lnSpc>
-                <a:spcPct val="112500"/>
-              </a:lnSpc>
-              <a:spcBef>
-                <a:spcPts val="0"/>
-              </a:spcBef>
-              <a:spcAft>
-                <a:spcPts val="0"/>
-              </a:spcAft>
-              <a:buSzPts val="1800"/>
-              <a:buChar char="●"/>
-            </a:pPr>
-            <a:r>
-              <a:rPr lang="ru"/>
-              <a:t>Людмила Петрушевская ПОРОСЁНОК ПЁТР ЕДЕТ В ГОСТИ</a:t>
             </a:r>
             <a:endParaRPr/>
           </a:p>
@@ -11169,13 +11179,12 @@
           <p:cNvPicPr preferRelativeResize="0"/>
           <p:nvPr/>
         </p:nvPicPr>
-        <p:blipFill>
+        <p:blipFill rotWithShape="1">
           <a:blip r:embed="rId3">
             <a:alphaModFix/>
           </a:blip>
-          <a:stretch>
-            <a:fillRect/>
-          </a:stretch>
+          <a:srcRect b="189" l="0" r="0" t="189"/>
+          <a:stretch/>
         </p:blipFill>
         <p:spPr>
           <a:xfrm>
@@ -11266,13 +11275,13 @@
           <a:blip r:embed="rId3">
             <a:alphaModFix/>
           </a:blip>
-          <a:srcRect b="893" l="0" r="0" t="903"/>
+          <a:srcRect b="680" l="0" r="0" t="680"/>
           <a:stretch/>
         </p:blipFill>
         <p:spPr>
           <a:xfrm>
             <a:off x="1534413" y="1204550"/>
-            <a:ext cx="6075166" cy="3567851"/>
+            <a:ext cx="6075166" cy="3567852"/>
           </a:xfrm>
           <a:prstGeom prst="rect">
             <a:avLst/>
@@ -11366,8 +11375,8 @@
         </p:blipFill>
         <p:spPr>
           <a:xfrm>
-            <a:off x="2286000" y="1924175"/>
-            <a:ext cx="4572000" cy="2296425"/>
+            <a:off x="980938" y="1322925"/>
+            <a:ext cx="7182135" cy="3567850"/>
           </a:xfrm>
           <a:prstGeom prst="rect">
             <a:avLst/>
@@ -12502,6 +12511,285 @@
 </file>
 
 <file path=ppt/theme/theme1.xml><?xml version="1.0" encoding="utf-8"?>
+<a:theme xmlns:a="http://schemas.openxmlformats.org/drawingml/2006/main" xmlns:r="http://schemas.openxmlformats.org/officeDocument/2006/relationships">
+  <a:themeElements>
+    <a:clrScheme name="Default">
+      <a:dk1>
+        <a:srgbClr val="000000"/>
+      </a:dk1>
+      <a:lt1>
+        <a:srgbClr val="FFFFFF"/>
+      </a:lt1>
+      <a:dk2>
+        <a:srgbClr val="158158"/>
+      </a:dk2>
+      <a:lt2>
+        <a:srgbClr val="F3F3F3"/>
+      </a:lt2>
+      <a:accent1>
+        <a:srgbClr val="058DC7"/>
+      </a:accent1>
+      <a:accent2>
+        <a:srgbClr val="50B432"/>
+      </a:accent2>
+      <a:accent3>
+        <a:srgbClr val="ED561B"/>
+      </a:accent3>
+      <a:accent4>
+        <a:srgbClr val="EDEF00"/>
+      </a:accent4>
+      <a:accent5>
+        <a:srgbClr val="24CBE5"/>
+      </a:accent5>
+      <a:accent6>
+        <a:srgbClr val="64E572"/>
+      </a:accent6>
+      <a:hlink>
+        <a:srgbClr val="2200CC"/>
+      </a:hlink>
+      <a:folHlink>
+        <a:srgbClr val="551A8B"/>
+      </a:folHlink>
+    </a:clrScheme>
+    <a:fontScheme name="Office">
+      <a:majorFont>
+        <a:latin typeface="Arial"/>
+        <a:ea typeface=""/>
+        <a:cs typeface=""/>
+        <a:font script="Jpan" typeface="ＭＳ Ｐゴシック"/>
+        <a:font script="Hang" typeface="맑은 고딕"/>
+        <a:font script="Hans" typeface="宋体"/>
+        <a:font script="Hant" typeface="新細明體"/>
+        <a:font script="Arab" typeface="Times New Roman"/>
+        <a:font script="Hebr" typeface="Times New Roman"/>
+        <a:font script="Thai" typeface="Angsana New"/>
+        <a:font script="Ethi" typeface="Nyala"/>
+        <a:font script="Beng" typeface="Vrinda"/>
+        <a:font script="Gujr" typeface="Shruti"/>
+        <a:font script="Khmr" typeface="MoolBoran"/>
+        <a:font script="Knda" typeface="Tunga"/>
+        <a:font script="Guru" typeface="Raavi"/>
+        <a:font script="Cans" typeface="Euphemia"/>
+        <a:font script="Cher" typeface="Plantagenet Cherokee"/>
+        <a:font script="Yiii" typeface="Microsoft Yi Baiti"/>
+        <a:font script="Tibt" typeface="Microsoft Himalaya"/>
+        <a:font script="Thaa" typeface="MV Boli"/>
+        <a:font script="Deva" typeface="Mangal"/>
+        <a:font script="Telu" typeface="Gautami"/>
+        <a:font script="Taml" typeface="Latha"/>
+        <a:font script="Syrc" typeface="Estrangelo Edessa"/>
+        <a:font script="Orya" typeface="Kalinga"/>
+        <a:font script="Mlym" typeface="Kartika"/>
+        <a:font script="Laoo" typeface="DokChampa"/>
+        <a:font script="Sinh" typeface="Iskoola Pota"/>
+        <a:font script="Mong" typeface="Mongolian Baiti"/>
+        <a:font script="Viet" typeface="Times New Roman"/>
+        <a:font script="Uigh" typeface="Microsoft Uighur"/>
+        <a:font script="Geor" typeface="Sylfaen"/>
+      </a:majorFont>
+      <a:minorFont>
+        <a:latin typeface="Arial"/>
+        <a:ea typeface=""/>
+        <a:cs typeface=""/>
+        <a:font script="Jpan" typeface="ＭＳ Ｐゴシック"/>
+        <a:font script="Hang" typeface="맑은 고딕"/>
+        <a:font script="Hans" typeface="宋体"/>
+        <a:font script="Hant" typeface="新細明體"/>
+        <a:font script="Arab" typeface="Arial"/>
+        <a:font script="Hebr" typeface="Arial"/>
+        <a:font script="Thai" typeface="Cordia New"/>
+        <a:font script="Ethi" typeface="Nyala"/>
+        <a:font script="Beng" typeface="Vrinda"/>
+        <a:font script="Gujr" typeface="Shruti"/>
+        <a:font script="Khmr" typeface="DaunPenh"/>
+        <a:font script="Knda" typeface="Tunga"/>
+        <a:font script="Guru" typeface="Raavi"/>
+        <a:font script="Cans" typeface="Euphemia"/>
+        <a:font script="Cher" typeface="Plantagenet Cherokee"/>
+        <a:font script="Yiii" typeface="Microsoft Yi Baiti"/>
+        <a:font script="Tibt" typeface="Microsoft Himalaya"/>
+        <a:font script="Thaa" typeface="MV Boli"/>
+        <a:font script="Deva" typeface="Mangal"/>
+        <a:font script="Telu" typeface="Gautami"/>
+        <a:font script="Taml" typeface="Latha"/>
+        <a:font script="Syrc" typeface="Estrangelo Edessa"/>
+        <a:font script="Orya" typeface="Kalinga"/>
+        <a:font script="Mlym" typeface="Kartika"/>
+        <a:font script="Laoo" typeface="DokChampa"/>
+        <a:font script="Sinh" typeface="Iskoola Pota"/>
+        <a:font script="Mong" typeface="Mongolian Baiti"/>
+        <a:font script="Viet" typeface="Arial"/>
+        <a:font script="Uigh" typeface="Microsoft Uighur"/>
+        <a:font script="Geor" typeface="Sylfaen"/>
+      </a:minorFont>
+    </a:fontScheme>
+    <a:fmtScheme name="Office">
+      <a:fillStyleLst>
+        <a:solidFill>
+          <a:schemeClr val="phClr"/>
+        </a:solidFill>
+        <a:gradFill rotWithShape="1">
+          <a:gsLst>
+            <a:gs pos="0">
+              <a:schemeClr val="phClr">
+                <a:tint val="50000"/>
+                <a:satMod val="300000"/>
+              </a:schemeClr>
+            </a:gs>
+            <a:gs pos="35000">
+              <a:schemeClr val="phClr">
+                <a:tint val="37000"/>
+                <a:satMod val="300000"/>
+              </a:schemeClr>
+            </a:gs>
+            <a:gs pos="100000">
+              <a:schemeClr val="phClr">
+                <a:tint val="15000"/>
+                <a:satMod val="350000"/>
+              </a:schemeClr>
+            </a:gs>
+          </a:gsLst>
+          <a:lin ang="16200000" scaled="1"/>
+        </a:gradFill>
+        <a:gradFill rotWithShape="1">
+          <a:gsLst>
+            <a:gs pos="0">
+              <a:schemeClr val="phClr">
+                <a:tint val="100000"/>
+                <a:shade val="100000"/>
+                <a:satMod val="130000"/>
+              </a:schemeClr>
+            </a:gs>
+            <a:gs pos="100000">
+              <a:schemeClr val="phClr">
+                <a:tint val="50000"/>
+                <a:shade val="100000"/>
+                <a:satMod val="350000"/>
+              </a:schemeClr>
+            </a:gs>
+          </a:gsLst>
+          <a:lin ang="16200000" scaled="0"/>
+        </a:gradFill>
+      </a:fillStyleLst>
+      <a:lnStyleLst>
+        <a:ln w="9525" cap="flat" cmpd="sng" algn="ctr">
+          <a:solidFill>
+            <a:schemeClr val="phClr">
+              <a:shade val="95000"/>
+              <a:satMod val="105000"/>
+            </a:schemeClr>
+          </a:solidFill>
+          <a:prstDash val="solid"/>
+        </a:ln>
+        <a:ln w="25400" cap="flat" cmpd="sng" algn="ctr">
+          <a:solidFill>
+            <a:schemeClr val="phClr"/>
+          </a:solidFill>
+          <a:prstDash val="solid"/>
+        </a:ln>
+        <a:ln w="38100" cap="flat" cmpd="sng" algn="ctr">
+          <a:solidFill>
+            <a:schemeClr val="phClr"/>
+          </a:solidFill>
+          <a:prstDash val="solid"/>
+        </a:ln>
+      </a:lnStyleLst>
+      <a:effectStyleLst>
+        <a:effectStyle>
+          <a:effectLst>
+            <a:outerShdw blurRad="40000" dist="20000" dir="5400000" rotWithShape="0">
+              <a:srgbClr val="000000">
+                <a:alpha val="38000"/>
+              </a:srgbClr>
+            </a:outerShdw>
+          </a:effectLst>
+        </a:effectStyle>
+        <a:effectStyle>
+          <a:effectLst>
+            <a:outerShdw blurRad="40000" dist="23000" dir="5400000" rotWithShape="0">
+              <a:srgbClr val="000000">
+                <a:alpha val="35000"/>
+              </a:srgbClr>
+            </a:outerShdw>
+          </a:effectLst>
+        </a:effectStyle>
+        <a:effectStyle>
+          <a:effectLst>
+            <a:outerShdw blurRad="40000" dist="23000" dir="5400000" rotWithShape="0">
+              <a:srgbClr val="000000">
+                <a:alpha val="35000"/>
+              </a:srgbClr>
+            </a:outerShdw>
+          </a:effectLst>
+          <a:scene3d>
+            <a:camera prst="orthographicFront">
+              <a:rot lat="0" lon="0" rev="0"/>
+            </a:camera>
+            <a:lightRig rig="threePt" dir="t">
+              <a:rot lat="0" lon="0" rev="1200000"/>
+            </a:lightRig>
+          </a:scene3d>
+          <a:sp3d>
+            <a:bevelT w="63500" h="25400"/>
+          </a:sp3d>
+        </a:effectStyle>
+      </a:effectStyleLst>
+      <a:bgFillStyleLst>
+        <a:solidFill>
+          <a:schemeClr val="phClr"/>
+        </a:solidFill>
+        <a:gradFill rotWithShape="1">
+          <a:gsLst>
+            <a:gs pos="0">
+              <a:schemeClr val="phClr">
+                <a:tint val="40000"/>
+                <a:satMod val="350000"/>
+              </a:schemeClr>
+            </a:gs>
+            <a:gs pos="40000">
+              <a:schemeClr val="phClr">
+                <a:tint val="45000"/>
+                <a:shade val="99000"/>
+                <a:satMod val="350000"/>
+              </a:schemeClr>
+            </a:gs>
+            <a:gs pos="100000">
+              <a:schemeClr val="phClr">
+                <a:shade val="20000"/>
+                <a:satMod val="255000"/>
+              </a:schemeClr>
+            </a:gs>
+          </a:gsLst>
+          <a:path path="circle">
+            <a:fillToRect l="50000" t="-80000" r="50000" b="180000"/>
+          </a:path>
+        </a:gradFill>
+        <a:gradFill rotWithShape="1">
+          <a:gsLst>
+            <a:gs pos="0">
+              <a:schemeClr val="phClr">
+                <a:tint val="80000"/>
+                <a:satMod val="300000"/>
+              </a:schemeClr>
+            </a:gs>
+            <a:gs pos="100000">
+              <a:schemeClr val="phClr">
+                <a:shade val="30000"/>
+                <a:satMod val="200000"/>
+              </a:schemeClr>
+            </a:gs>
+          </a:gsLst>
+          <a:path path="circle">
+            <a:fillToRect l="50000" t="50000" r="50000" b="50000"/>
+          </a:path>
+        </a:gradFill>
+      </a:bgFillStyleLst>
+    </a:fmtScheme>
+  </a:themeElements>
+</a:theme>
+</file>
+
+<file path=ppt/theme/theme2.xml><?xml version="1.0" encoding="utf-8"?>
 <a:theme xmlns:a="http://schemas.openxmlformats.org/drawingml/2006/main" xmlns:r="http://schemas.openxmlformats.org/officeDocument/2006/relationships" name="Material">
   <a:themeElements>
     <a:clrScheme name="Material">
@@ -12778,283 +13066,4 @@
     </a:fmtScheme>
   </a:themeElements>
 </a:theme>
-</file>
-
-<file path=ppt/theme/theme2.xml><?xml version="1.0" encoding="utf-8"?>
-<a:theme xmlns:a="http://schemas.openxmlformats.org/drawingml/2006/main" xmlns:r="http://schemas.openxmlformats.org/officeDocument/2006/relationships">
-  <a:themeElements>
-    <a:clrScheme name="Default">
-      <a:dk1>
-        <a:srgbClr val="000000"/>
-      </a:dk1>
-      <a:lt1>
-        <a:srgbClr val="FFFFFF"/>
-      </a:lt1>
-      <a:dk2>
-        <a:srgbClr val="158158"/>
-      </a:dk2>
-      <a:lt2>
-        <a:srgbClr val="F3F3F3"/>
-      </a:lt2>
-      <a:accent1>
-        <a:srgbClr val="058DC7"/>
-      </a:accent1>
-      <a:accent2>
-        <a:srgbClr val="50B432"/>
-      </a:accent2>
-      <a:accent3>
-        <a:srgbClr val="ED561B"/>
-      </a:accent3>
-      <a:accent4>
-        <a:srgbClr val="EDEF00"/>
-      </a:accent4>
-      <a:accent5>
-        <a:srgbClr val="24CBE5"/>
-      </a:accent5>
-      <a:accent6>
-        <a:srgbClr val="64E572"/>
-      </a:accent6>
-      <a:hlink>
-        <a:srgbClr val="2200CC"/>
-      </a:hlink>
-      <a:folHlink>
-        <a:srgbClr val="551A8B"/>
-      </a:folHlink>
-    </a:clrScheme>
-    <a:fontScheme name="Office">
-      <a:majorFont>
-        <a:latin typeface="Arial"/>
-        <a:ea typeface=""/>
-        <a:cs typeface=""/>
-        <a:font script="Jpan" typeface="ＭＳ Ｐゴシック"/>
-        <a:font script="Hang" typeface="맑은 고딕"/>
-        <a:font script="Hans" typeface="宋体"/>
-        <a:font script="Hant" typeface="新細明體"/>
-        <a:font script="Arab" typeface="Times New Roman"/>
-        <a:font script="Hebr" typeface="Times New Roman"/>
-        <a:font script="Thai" typeface="Angsana New"/>
-        <a:font script="Ethi" typeface="Nyala"/>
-        <a:font script="Beng" typeface="Vrinda"/>
-        <a:font script="Gujr" typeface="Shruti"/>
-        <a:font script="Khmr" typeface="MoolBoran"/>
-        <a:font script="Knda" typeface="Tunga"/>
-        <a:font script="Guru" typeface="Raavi"/>
-        <a:font script="Cans" typeface="Euphemia"/>
-        <a:font script="Cher" typeface="Plantagenet Cherokee"/>
-        <a:font script="Yiii" typeface="Microsoft Yi Baiti"/>
-        <a:font script="Tibt" typeface="Microsoft Himalaya"/>
-        <a:font script="Thaa" typeface="MV Boli"/>
-        <a:font script="Deva" typeface="Mangal"/>
-        <a:font script="Telu" typeface="Gautami"/>
-        <a:font script="Taml" typeface="Latha"/>
-        <a:font script="Syrc" typeface="Estrangelo Edessa"/>
-        <a:font script="Orya" typeface="Kalinga"/>
-        <a:font script="Mlym" typeface="Kartika"/>
-        <a:font script="Laoo" typeface="DokChampa"/>
-        <a:font script="Sinh" typeface="Iskoola Pota"/>
-        <a:font script="Mong" typeface="Mongolian Baiti"/>
-        <a:font script="Viet" typeface="Times New Roman"/>
-        <a:font script="Uigh" typeface="Microsoft Uighur"/>
-        <a:font script="Geor" typeface="Sylfaen"/>
-      </a:majorFont>
-      <a:minorFont>
-        <a:latin typeface="Arial"/>
-        <a:ea typeface=""/>
-        <a:cs typeface=""/>
-        <a:font script="Jpan" typeface="ＭＳ Ｐゴシック"/>
-        <a:font script="Hang" typeface="맑은 고딕"/>
-        <a:font script="Hans" typeface="宋体"/>
-        <a:font script="Hant" typeface="新細明體"/>
-        <a:font script="Arab" typeface="Arial"/>
-        <a:font script="Hebr" typeface="Arial"/>
-        <a:font script="Thai" typeface="Cordia New"/>
-        <a:font script="Ethi" typeface="Nyala"/>
-        <a:font script="Beng" typeface="Vrinda"/>
-        <a:font script="Gujr" typeface="Shruti"/>
-        <a:font script="Khmr" typeface="DaunPenh"/>
-        <a:font script="Knda" typeface="Tunga"/>
-        <a:font script="Guru" typeface="Raavi"/>
-        <a:font script="Cans" typeface="Euphemia"/>
-        <a:font script="Cher" typeface="Plantagenet Cherokee"/>
-        <a:font script="Yiii" typeface="Microsoft Yi Baiti"/>
-        <a:font script="Tibt" typeface="Microsoft Himalaya"/>
-        <a:font script="Thaa" typeface="MV Boli"/>
-        <a:font script="Deva" typeface="Mangal"/>
-        <a:font script="Telu" typeface="Gautami"/>
-        <a:font script="Taml" typeface="Latha"/>
-        <a:font script="Syrc" typeface="Estrangelo Edessa"/>
-        <a:font script="Orya" typeface="Kalinga"/>
-        <a:font script="Mlym" typeface="Kartika"/>
-        <a:font script="Laoo" typeface="DokChampa"/>
-        <a:font script="Sinh" typeface="Iskoola Pota"/>
-        <a:font script="Mong" typeface="Mongolian Baiti"/>
-        <a:font script="Viet" typeface="Arial"/>
-        <a:font script="Uigh" typeface="Microsoft Uighur"/>
-        <a:font script="Geor" typeface="Sylfaen"/>
-      </a:minorFont>
-    </a:fontScheme>
-    <a:fmtScheme name="Office">
-      <a:fillStyleLst>
-        <a:solidFill>
-          <a:schemeClr val="phClr"/>
-        </a:solidFill>
-        <a:gradFill rotWithShape="1">
-          <a:gsLst>
-            <a:gs pos="0">
-              <a:schemeClr val="phClr">
-                <a:tint val="50000"/>
-                <a:satMod val="300000"/>
-              </a:schemeClr>
-            </a:gs>
-            <a:gs pos="35000">
-              <a:schemeClr val="phClr">
-                <a:tint val="37000"/>
-                <a:satMod val="300000"/>
-              </a:schemeClr>
-            </a:gs>
-            <a:gs pos="100000">
-              <a:schemeClr val="phClr">
-                <a:tint val="15000"/>
-                <a:satMod val="350000"/>
-              </a:schemeClr>
-            </a:gs>
-          </a:gsLst>
-          <a:lin ang="16200000" scaled="1"/>
-        </a:gradFill>
-        <a:gradFill rotWithShape="1">
-          <a:gsLst>
-            <a:gs pos="0">
-              <a:schemeClr val="phClr">
-                <a:tint val="100000"/>
-                <a:shade val="100000"/>
-                <a:satMod val="130000"/>
-              </a:schemeClr>
-            </a:gs>
-            <a:gs pos="100000">
-              <a:schemeClr val="phClr">
-                <a:tint val="50000"/>
-                <a:shade val="100000"/>
-                <a:satMod val="350000"/>
-              </a:schemeClr>
-            </a:gs>
-          </a:gsLst>
-          <a:lin ang="16200000" scaled="0"/>
-        </a:gradFill>
-      </a:fillStyleLst>
-      <a:lnStyleLst>
-        <a:ln w="9525" cap="flat" cmpd="sng" algn="ctr">
-          <a:solidFill>
-            <a:schemeClr val="phClr">
-              <a:shade val="95000"/>
-              <a:satMod val="105000"/>
-            </a:schemeClr>
-          </a:solidFill>
-          <a:prstDash val="solid"/>
-        </a:ln>
-        <a:ln w="25400" cap="flat" cmpd="sng" algn="ctr">
-          <a:solidFill>
-            <a:schemeClr val="phClr"/>
-          </a:solidFill>
-          <a:prstDash val="solid"/>
-        </a:ln>
-        <a:ln w="38100" cap="flat" cmpd="sng" algn="ctr">
-          <a:solidFill>
-            <a:schemeClr val="phClr"/>
-          </a:solidFill>
-          <a:prstDash val="solid"/>
-        </a:ln>
-      </a:lnStyleLst>
-      <a:effectStyleLst>
-        <a:effectStyle>
-          <a:effectLst>
-            <a:outerShdw blurRad="40000" dist="20000" dir="5400000" rotWithShape="0">
-              <a:srgbClr val="000000">
-                <a:alpha val="38000"/>
-              </a:srgbClr>
-            </a:outerShdw>
-          </a:effectLst>
-        </a:effectStyle>
-        <a:effectStyle>
-          <a:effectLst>
-            <a:outerShdw blurRad="40000" dist="23000" dir="5400000" rotWithShape="0">
-              <a:srgbClr val="000000">
-                <a:alpha val="35000"/>
-              </a:srgbClr>
-            </a:outerShdw>
-          </a:effectLst>
-        </a:effectStyle>
-        <a:effectStyle>
-          <a:effectLst>
-            <a:outerShdw blurRad="40000" dist="23000" dir="5400000" rotWithShape="0">
-              <a:srgbClr val="000000">
-                <a:alpha val="35000"/>
-              </a:srgbClr>
-            </a:outerShdw>
-          </a:effectLst>
-          <a:scene3d>
-            <a:camera prst="orthographicFront">
-              <a:rot lat="0" lon="0" rev="0"/>
-            </a:camera>
-            <a:lightRig rig="threePt" dir="t">
-              <a:rot lat="0" lon="0" rev="1200000"/>
-            </a:lightRig>
-          </a:scene3d>
-          <a:sp3d>
-            <a:bevelT w="63500" h="25400"/>
-          </a:sp3d>
-        </a:effectStyle>
-      </a:effectStyleLst>
-      <a:bgFillStyleLst>
-        <a:solidFill>
-          <a:schemeClr val="phClr"/>
-        </a:solidFill>
-        <a:gradFill rotWithShape="1">
-          <a:gsLst>
-            <a:gs pos="0">
-              <a:schemeClr val="phClr">
-                <a:tint val="40000"/>
-                <a:satMod val="350000"/>
-              </a:schemeClr>
-            </a:gs>
-            <a:gs pos="40000">
-              <a:schemeClr val="phClr">
-                <a:tint val="45000"/>
-                <a:shade val="99000"/>
-                <a:satMod val="350000"/>
-              </a:schemeClr>
-            </a:gs>
-            <a:gs pos="100000">
-              <a:schemeClr val="phClr">
-                <a:shade val="20000"/>
-                <a:satMod val="255000"/>
-              </a:schemeClr>
-            </a:gs>
-          </a:gsLst>
-          <a:path path="circle">
-            <a:fillToRect l="50000" t="-80000" r="50000" b="180000"/>
-          </a:path>
-        </a:gradFill>
-        <a:gradFill rotWithShape="1">
-          <a:gsLst>
-            <a:gs pos="0">
-              <a:schemeClr val="phClr">
-                <a:tint val="80000"/>
-                <a:satMod val="300000"/>
-              </a:schemeClr>
-            </a:gs>
-            <a:gs pos="100000">
-              <a:schemeClr val="phClr">
-                <a:shade val="30000"/>
-                <a:satMod val="200000"/>
-              </a:schemeClr>
-            </a:gs>
-          </a:gsLst>
-          <a:path path="circle">
-            <a:fillToRect l="50000" t="50000" r="50000" b="50000"/>
-          </a:path>
-        </a:gradFill>
-      </a:bgFillStyleLst>
-    </a:fmtScheme>
-  </a:themeElements>
-</a:theme>
 </file>
</xml_diff>